<commit_message>
Atualizando os slides para apresentação
</commit_message>
<xml_diff>
--- a/Apresentação/Apresentação Grupo 7_MOD.pptx
+++ b/Apresentação/Apresentação Grupo 7_MOD.pptx
@@ -7,11 +7,15 @@
   <p:sldIdLst>
     <p:sldId id="256" r:id="rId2"/>
     <p:sldId id="257" r:id="rId3"/>
-    <p:sldId id="259" r:id="rId4"/>
-    <p:sldId id="258" r:id="rId5"/>
-    <p:sldId id="260" r:id="rId6"/>
-    <p:sldId id="261" r:id="rId7"/>
-    <p:sldId id="262" r:id="rId8"/>
+    <p:sldId id="263" r:id="rId4"/>
+    <p:sldId id="264" r:id="rId5"/>
+    <p:sldId id="265" r:id="rId6"/>
+    <p:sldId id="266" r:id="rId7"/>
+    <p:sldId id="259" r:id="rId8"/>
+    <p:sldId id="258" r:id="rId9"/>
+    <p:sldId id="260" r:id="rId10"/>
+    <p:sldId id="261" r:id="rId11"/>
+    <p:sldId id="262" r:id="rId12"/>
   </p:sldIdLst>
   <p:sldSz cx="9144000" cy="6858000" type="screen4x3"/>
   <p:notesSz cx="6858000" cy="9144000"/>
@@ -112,7 +116,7 @@
   </p:defaultTextStyle>
   <p:extLst>
     <p:ext uri="{EFAFB233-063F-42B5-8137-9DF3F51BA10A}">
-      <p15:sldGuideLst xmlns:p15="http://schemas.microsoft.com/office/powerpoint/2012/main">
+      <p15:sldGuideLst xmlns:p15="http://schemas.microsoft.com/office/powerpoint/2012/main" xmlns="">
         <p15:guide id="1" orient="horz" pos="2160">
           <p15:clr>
             <a:srgbClr val="A4A3A4"/>
@@ -315,7 +319,7 @@
           <a:p>
             <a:fld id="{577BD821-37C5-42F2-A641-29C824859964}" type="datetimeFigureOut">
               <a:rPr lang="pt-BR" smtClean="0"/>
-              <a:t>02/12/2013</a:t>
+              <a:t>02/12/13</a:t>
             </a:fld>
             <a:endParaRPr lang="pt-BR"/>
           </a:p>
@@ -357,7 +361,7 @@
           <a:p>
             <a:fld id="{51B07BA0-685B-4FE1-8878-164331DD0579}" type="slidenum">
               <a:rPr lang="pt-BR" smtClean="0"/>
-              <a:t>‹nº›</a:t>
+              <a:t>‹#›</a:t>
             </a:fld>
             <a:endParaRPr lang="pt-BR"/>
           </a:p>
@@ -590,7 +594,7 @@
           <a:p>
             <a:fld id="{577BD821-37C5-42F2-A641-29C824859964}" type="datetimeFigureOut">
               <a:rPr lang="pt-BR" smtClean="0"/>
-              <a:t>02/12/2013</a:t>
+              <a:t>02/12/13</a:t>
             </a:fld>
             <a:endParaRPr lang="pt-BR"/>
           </a:p>
@@ -632,7 +636,7 @@
           <a:p>
             <a:fld id="{51B07BA0-685B-4FE1-8878-164331DD0579}" type="slidenum">
               <a:rPr lang="pt-BR" smtClean="0"/>
-              <a:t>‹nº›</a:t>
+              <a:t>‹#›</a:t>
             </a:fld>
             <a:endParaRPr lang="pt-BR"/>
           </a:p>
@@ -784,7 +788,7 @@
           <a:p>
             <a:fld id="{577BD821-37C5-42F2-A641-29C824859964}" type="datetimeFigureOut">
               <a:rPr lang="pt-BR" smtClean="0"/>
-              <a:t>02/12/2013</a:t>
+              <a:t>02/12/13</a:t>
             </a:fld>
             <a:endParaRPr lang="pt-BR"/>
           </a:p>
@@ -826,7 +830,7 @@
           <a:p>
             <a:fld id="{51B07BA0-685B-4FE1-8878-164331DD0579}" type="slidenum">
               <a:rPr lang="pt-BR" smtClean="0"/>
-              <a:t>‹nº›</a:t>
+              <a:t>‹#›</a:t>
             </a:fld>
             <a:endParaRPr lang="pt-BR"/>
           </a:p>
@@ -1057,7 +1061,7 @@
           <a:p>
             <a:fld id="{577BD821-37C5-42F2-A641-29C824859964}" type="datetimeFigureOut">
               <a:rPr lang="pt-BR" smtClean="0"/>
-              <a:t>02/12/2013</a:t>
+              <a:t>02/12/13</a:t>
             </a:fld>
             <a:endParaRPr lang="pt-BR"/>
           </a:p>
@@ -1099,7 +1103,7 @@
           <a:p>
             <a:fld id="{51B07BA0-685B-4FE1-8878-164331DD0579}" type="slidenum">
               <a:rPr lang="pt-BR" smtClean="0"/>
-              <a:t>‹nº›</a:t>
+              <a:t>‹#›</a:t>
             </a:fld>
             <a:endParaRPr lang="pt-BR"/>
           </a:p>
@@ -1398,7 +1402,7 @@
           <a:p>
             <a:fld id="{577BD821-37C5-42F2-A641-29C824859964}" type="datetimeFigureOut">
               <a:rPr lang="pt-BR" smtClean="0"/>
-              <a:t>02/12/2013</a:t>
+              <a:t>02/12/13</a:t>
             </a:fld>
             <a:endParaRPr lang="pt-BR"/>
           </a:p>
@@ -1440,7 +1444,7 @@
           <a:p>
             <a:fld id="{51B07BA0-685B-4FE1-8878-164331DD0579}" type="slidenum">
               <a:rPr lang="pt-BR" smtClean="0"/>
-              <a:t>‹nº›</a:t>
+              <a:t>‹#›</a:t>
             </a:fld>
             <a:endParaRPr lang="pt-BR"/>
           </a:p>
@@ -2021,7 +2025,7 @@
           <a:p>
             <a:fld id="{577BD821-37C5-42F2-A641-29C824859964}" type="datetimeFigureOut">
               <a:rPr lang="pt-BR" smtClean="0"/>
-              <a:t>02/12/2013</a:t>
+              <a:t>02/12/13</a:t>
             </a:fld>
             <a:endParaRPr lang="pt-BR"/>
           </a:p>
@@ -2063,7 +2067,7 @@
           <a:p>
             <a:fld id="{51B07BA0-685B-4FE1-8878-164331DD0579}" type="slidenum">
               <a:rPr lang="pt-BR" smtClean="0"/>
-              <a:t>‹nº›</a:t>
+              <a:t>‹#›</a:t>
             </a:fld>
             <a:endParaRPr lang="pt-BR"/>
           </a:p>
@@ -2881,7 +2885,7 @@
           <a:p>
             <a:fld id="{577BD821-37C5-42F2-A641-29C824859964}" type="datetimeFigureOut">
               <a:rPr lang="pt-BR" smtClean="0"/>
-              <a:t>02/12/2013</a:t>
+              <a:t>02/12/13</a:t>
             </a:fld>
             <a:endParaRPr lang="pt-BR"/>
           </a:p>
@@ -2923,7 +2927,7 @@
           <a:p>
             <a:fld id="{51B07BA0-685B-4FE1-8878-164331DD0579}" type="slidenum">
               <a:rPr lang="pt-BR" smtClean="0"/>
-              <a:t>‹nº›</a:t>
+              <a:t>‹#›</a:t>
             </a:fld>
             <a:endParaRPr lang="pt-BR"/>
           </a:p>
@@ -3051,7 +3055,7 @@
           <a:p>
             <a:fld id="{577BD821-37C5-42F2-A641-29C824859964}" type="datetimeFigureOut">
               <a:rPr lang="pt-BR" smtClean="0"/>
-              <a:t>02/12/2013</a:t>
+              <a:t>02/12/13</a:t>
             </a:fld>
             <a:endParaRPr lang="pt-BR"/>
           </a:p>
@@ -3093,7 +3097,7 @@
           <a:p>
             <a:fld id="{51B07BA0-685B-4FE1-8878-164331DD0579}" type="slidenum">
               <a:rPr lang="pt-BR" smtClean="0"/>
-              <a:t>‹nº›</a:t>
+              <a:t>‹#›</a:t>
             </a:fld>
             <a:endParaRPr lang="pt-BR"/>
           </a:p>
@@ -3231,7 +3235,7 @@
           <a:p>
             <a:fld id="{577BD821-37C5-42F2-A641-29C824859964}" type="datetimeFigureOut">
               <a:rPr lang="pt-BR" smtClean="0"/>
-              <a:t>02/12/2013</a:t>
+              <a:t>02/12/13</a:t>
             </a:fld>
             <a:endParaRPr lang="pt-BR"/>
           </a:p>
@@ -3273,7 +3277,7 @@
           <a:p>
             <a:fld id="{51B07BA0-685B-4FE1-8878-164331DD0579}" type="slidenum">
               <a:rPr lang="pt-BR" smtClean="0"/>
-              <a:t>‹nº›</a:t>
+              <a:t>‹#›</a:t>
             </a:fld>
             <a:endParaRPr lang="pt-BR"/>
           </a:p>
@@ -3401,7 +3405,7 @@
           <a:p>
             <a:fld id="{577BD821-37C5-42F2-A641-29C824859964}" type="datetimeFigureOut">
               <a:rPr lang="pt-BR" smtClean="0"/>
-              <a:t>02/12/2013</a:t>
+              <a:t>02/12/13</a:t>
             </a:fld>
             <a:endParaRPr lang="pt-BR"/>
           </a:p>
@@ -3443,7 +3447,7 @@
           <a:p>
             <a:fld id="{51B07BA0-685B-4FE1-8878-164331DD0579}" type="slidenum">
               <a:rPr lang="pt-BR" smtClean="0"/>
-              <a:t>‹nº›</a:t>
+              <a:t>‹#›</a:t>
             </a:fld>
             <a:endParaRPr lang="pt-BR"/>
           </a:p>
@@ -3648,7 +3652,7 @@
           <a:p>
             <a:fld id="{577BD821-37C5-42F2-A641-29C824859964}" type="datetimeFigureOut">
               <a:rPr lang="pt-BR" smtClean="0"/>
-              <a:t>02/12/2013</a:t>
+              <a:t>02/12/13</a:t>
             </a:fld>
             <a:endParaRPr lang="pt-BR"/>
           </a:p>
@@ -3690,7 +3694,7 @@
           <a:p>
             <a:fld id="{51B07BA0-685B-4FE1-8878-164331DD0579}" type="slidenum">
               <a:rPr lang="pt-BR" smtClean="0"/>
-              <a:t>‹nº›</a:t>
+              <a:t>‹#›</a:t>
             </a:fld>
             <a:endParaRPr lang="pt-BR"/>
           </a:p>
@@ -3940,7 +3944,7 @@
           <a:p>
             <a:fld id="{577BD821-37C5-42F2-A641-29C824859964}" type="datetimeFigureOut">
               <a:rPr lang="pt-BR" smtClean="0"/>
-              <a:t>02/12/2013</a:t>
+              <a:t>02/12/13</a:t>
             </a:fld>
             <a:endParaRPr lang="pt-BR"/>
           </a:p>
@@ -3982,7 +3986,7 @@
           <a:p>
             <a:fld id="{51B07BA0-685B-4FE1-8878-164331DD0579}" type="slidenum">
               <a:rPr lang="pt-BR" smtClean="0"/>
-              <a:t>‹nº›</a:t>
+              <a:t>‹#›</a:t>
             </a:fld>
             <a:endParaRPr lang="pt-BR"/>
           </a:p>
@@ -4384,7 +4388,7 @@
           <a:p>
             <a:fld id="{577BD821-37C5-42F2-A641-29C824859964}" type="datetimeFigureOut">
               <a:rPr lang="pt-BR" smtClean="0"/>
-              <a:t>02/12/2013</a:t>
+              <a:t>02/12/13</a:t>
             </a:fld>
             <a:endParaRPr lang="pt-BR"/>
           </a:p>
@@ -4426,7 +4430,7 @@
           <a:p>
             <a:fld id="{51B07BA0-685B-4FE1-8878-164331DD0579}" type="slidenum">
               <a:rPr lang="pt-BR" smtClean="0"/>
-              <a:t>‹nº›</a:t>
+              <a:t>‹#›</a:t>
             </a:fld>
             <a:endParaRPr lang="pt-BR"/>
           </a:p>
@@ -4502,7 +4506,7 @@
           <a:p>
             <a:fld id="{577BD821-37C5-42F2-A641-29C824859964}" type="datetimeFigureOut">
               <a:rPr lang="pt-BR" smtClean="0"/>
-              <a:t>02/12/2013</a:t>
+              <a:t>02/12/13</a:t>
             </a:fld>
             <a:endParaRPr lang="pt-BR"/>
           </a:p>
@@ -4544,7 +4548,7 @@
           <a:p>
             <a:fld id="{51B07BA0-685B-4FE1-8878-164331DD0579}" type="slidenum">
               <a:rPr lang="pt-BR" smtClean="0"/>
-              <a:t>‹nº›</a:t>
+              <a:t>‹#›</a:t>
             </a:fld>
             <a:endParaRPr lang="pt-BR"/>
           </a:p>
@@ -4597,7 +4601,7 @@
           <a:p>
             <a:fld id="{577BD821-37C5-42F2-A641-29C824859964}" type="datetimeFigureOut">
               <a:rPr lang="pt-BR" smtClean="0"/>
-              <a:t>02/12/2013</a:t>
+              <a:t>02/12/13</a:t>
             </a:fld>
             <a:endParaRPr lang="pt-BR"/>
           </a:p>
@@ -4639,7 +4643,7 @@
           <a:p>
             <a:fld id="{51B07BA0-685B-4FE1-8878-164331DD0579}" type="slidenum">
               <a:rPr lang="pt-BR" smtClean="0"/>
-              <a:t>‹nº›</a:t>
+              <a:t>‹#›</a:t>
             </a:fld>
             <a:endParaRPr lang="pt-BR"/>
           </a:p>
@@ -4876,7 +4880,7 @@
           <a:p>
             <a:fld id="{577BD821-37C5-42F2-A641-29C824859964}" type="datetimeFigureOut">
               <a:rPr lang="pt-BR" smtClean="0"/>
-              <a:t>02/12/2013</a:t>
+              <a:t>02/12/13</a:t>
             </a:fld>
             <a:endParaRPr lang="pt-BR"/>
           </a:p>
@@ -4918,7 +4922,7 @@
           <a:p>
             <a:fld id="{51B07BA0-685B-4FE1-8878-164331DD0579}" type="slidenum">
               <a:rPr lang="pt-BR" smtClean="0"/>
-              <a:t>‹nº›</a:t>
+              <a:t>‹#›</a:t>
             </a:fld>
             <a:endParaRPr lang="pt-BR"/>
           </a:p>
@@ -5151,7 +5155,7 @@
           <a:p>
             <a:fld id="{577BD821-37C5-42F2-A641-29C824859964}" type="datetimeFigureOut">
               <a:rPr lang="pt-BR" smtClean="0"/>
-              <a:t>02/12/2013</a:t>
+              <a:t>02/12/13</a:t>
             </a:fld>
             <a:endParaRPr lang="pt-BR"/>
           </a:p>
@@ -5193,7 +5197,7 @@
           <a:p>
             <a:fld id="{51B07BA0-685B-4FE1-8878-164331DD0579}" type="slidenum">
               <a:rPr lang="pt-BR" smtClean="0"/>
-              <a:t>‹nº›</a:t>
+              <a:t>‹#›</a:t>
             </a:fld>
             <a:endParaRPr lang="pt-BR"/>
           </a:p>
@@ -5716,7 +5720,7 @@
           <a:p>
             <a:fld id="{577BD821-37C5-42F2-A641-29C824859964}" type="datetimeFigureOut">
               <a:rPr lang="pt-BR" smtClean="0"/>
-              <a:t>02/12/2013</a:t>
+              <a:t>02/12/13</a:t>
             </a:fld>
             <a:endParaRPr lang="pt-BR"/>
           </a:p>
@@ -5795,7 +5799,7 @@
           <a:p>
             <a:fld id="{51B07BA0-685B-4FE1-8878-164331DD0579}" type="slidenum">
               <a:rPr lang="pt-BR" smtClean="0"/>
-              <a:t>‹nº›</a:t>
+              <a:t>‹#›</a:t>
             </a:fld>
             <a:endParaRPr lang="pt-BR"/>
           </a:p>
@@ -6266,7 +6270,15 @@
           <a:p>
             <a:r>
               <a:rPr lang="pt-BR" dirty="0" smtClean="0"/>
-              <a:t>Sistema de controle de Voo</a:t>
+              <a:t>Sistema de </a:t>
+            </a:r>
+            <a:r>
+              <a:rPr lang="pt-BR" dirty="0" smtClean="0"/>
+              <a:t>controle de </a:t>
+            </a:r>
+            <a:r>
+              <a:rPr lang="pt-BR" dirty="0" smtClean="0"/>
+              <a:t>Voo</a:t>
             </a:r>
             <a:endParaRPr lang="pt-BR" dirty="0"/>
           </a:p>
@@ -6326,6 +6338,269 @@
             </a:r>
           </a:p>
           <a:p>
+            <a:endParaRPr lang="pt-BR" dirty="0"/>
+          </a:p>
+        </p:txBody>
+      </p:sp>
+    </p:spTree>
+  </p:cSld>
+  <p:clrMapOvr>
+    <a:masterClrMapping/>
+  </p:clrMapOvr>
+</p:sld>
+</file>
+
+<file path=ppt/slides/slide10.xml><?xml version="1.0" encoding="utf-8"?>
+<p:sld xmlns:a="http://schemas.openxmlformats.org/drawingml/2006/main" xmlns:r="http://schemas.openxmlformats.org/officeDocument/2006/relationships" xmlns:p="http://schemas.openxmlformats.org/presentationml/2006/main">
+  <p:cSld>
+    <p:spTree>
+      <p:nvGrpSpPr>
+        <p:cNvPr id="1" name=""/>
+        <p:cNvGrpSpPr/>
+        <p:nvPr/>
+      </p:nvGrpSpPr>
+      <p:grpSpPr>
+        <a:xfrm>
+          <a:off x="0" y="0"/>
+          <a:ext cx="0" cy="0"/>
+          <a:chOff x="0" y="0"/>
+          <a:chExt cx="0" cy="0"/>
+        </a:xfrm>
+      </p:grpSpPr>
+      <p:sp>
+        <p:nvSpPr>
+          <p:cNvPr id="2" name="Título 1"/>
+          <p:cNvSpPr>
+            <a:spLocks noGrp="1"/>
+          </p:cNvSpPr>
+          <p:nvPr>
+            <p:ph type="ctrTitle"/>
+          </p:nvPr>
+        </p:nvSpPr>
+        <p:spPr>
+          <a:xfrm>
+            <a:off x="253752" y="44624"/>
+            <a:ext cx="7772400" cy="1470025"/>
+          </a:xfrm>
+        </p:spPr>
+        <p:txBody>
+          <a:bodyPr/>
+          <a:lstStyle/>
+          <a:p>
+            <a:r>
+              <a:rPr lang="pt-BR" sz="6000" dirty="0" smtClean="0"/>
+              <a:t>Resultados obtidos</a:t>
+            </a:r>
+            <a:endParaRPr lang="pt-BR" sz="6000" dirty="0"/>
+          </a:p>
+        </p:txBody>
+      </p:sp>
+      <p:sp>
+        <p:nvSpPr>
+          <p:cNvPr id="6" name="CaixaDeTexto 5"/>
+          <p:cNvSpPr txBox="1"/>
+          <p:nvPr/>
+        </p:nvSpPr>
+        <p:spPr>
+          <a:xfrm>
+            <a:off x="3059832" y="6454380"/>
+            <a:ext cx="3316909" cy="369332"/>
+          </a:xfrm>
+          <a:prstGeom prst="rect">
+            <a:avLst/>
+          </a:prstGeom>
+          <a:noFill/>
+        </p:spPr>
+        <p:txBody>
+          <a:bodyPr wrap="none" rtlCol="0">
+            <a:spAutoFit/>
+          </a:bodyPr>
+          <a:lstStyle/>
+          <a:p>
+            <a:r>
+              <a:rPr lang="pt-BR" b="1" dirty="0" smtClean="0"/>
+              <a:t>Fig. 01 </a:t>
+            </a:r>
+            <a:r>
+              <a:rPr lang="pt-BR" dirty="0" smtClean="0"/>
+              <a:t>Modelagem em UML</a:t>
+            </a:r>
+            <a:endParaRPr lang="pt-BR" dirty="0"/>
+          </a:p>
+        </p:txBody>
+      </p:sp>
+      <p:pic>
+        <p:nvPicPr>
+          <p:cNvPr id="3" name="Picture 2"/>
+          <p:cNvPicPr>
+            <a:picLocks noChangeAspect="1"/>
+          </p:cNvPicPr>
+          <p:nvPr/>
+        </p:nvPicPr>
+        <p:blipFill>
+          <a:blip r:embed="rId2"/>
+          <a:stretch>
+            <a:fillRect/>
+          </a:stretch>
+        </p:blipFill>
+        <p:spPr>
+          <a:xfrm>
+            <a:off x="1763688" y="1772816"/>
+            <a:ext cx="5397500" cy="4622800"/>
+          </a:xfrm>
+          <a:prstGeom prst="rect">
+            <a:avLst/>
+          </a:prstGeom>
+        </p:spPr>
+      </p:pic>
+    </p:spTree>
+  </p:cSld>
+  <p:clrMapOvr>
+    <a:masterClrMapping/>
+  </p:clrMapOvr>
+</p:sld>
+</file>
+
+<file path=ppt/slides/slide11.xml><?xml version="1.0" encoding="utf-8"?>
+<p:sld xmlns:a="http://schemas.openxmlformats.org/drawingml/2006/main" xmlns:r="http://schemas.openxmlformats.org/officeDocument/2006/relationships" xmlns:p="http://schemas.openxmlformats.org/presentationml/2006/main">
+  <p:cSld>
+    <p:spTree>
+      <p:nvGrpSpPr>
+        <p:cNvPr id="1" name=""/>
+        <p:cNvGrpSpPr/>
+        <p:nvPr/>
+      </p:nvGrpSpPr>
+      <p:grpSpPr>
+        <a:xfrm>
+          <a:off x="0" y="0"/>
+          <a:ext cx="0" cy="0"/>
+          <a:chOff x="0" y="0"/>
+          <a:chExt cx="0" cy="0"/>
+        </a:xfrm>
+      </p:grpSpPr>
+      <p:sp>
+        <p:nvSpPr>
+          <p:cNvPr id="2" name="Título 1"/>
+          <p:cNvSpPr>
+            <a:spLocks noGrp="1"/>
+          </p:cNvSpPr>
+          <p:nvPr>
+            <p:ph type="ctrTitle"/>
+          </p:nvPr>
+        </p:nvSpPr>
+        <p:spPr>
+          <a:xfrm>
+            <a:off x="467544" y="404664"/>
+            <a:ext cx="7772400" cy="1470025"/>
+          </a:xfrm>
+        </p:spPr>
+        <p:txBody>
+          <a:bodyPr/>
+          <a:lstStyle/>
+          <a:p>
+            <a:r>
+              <a:rPr lang="pt-BR" sz="6000" dirty="0" smtClean="0"/>
+              <a:t>Objetivos Futuros</a:t>
+            </a:r>
+            <a:endParaRPr lang="pt-BR" sz="6000" dirty="0"/>
+          </a:p>
+        </p:txBody>
+      </p:sp>
+      <p:sp>
+        <p:nvSpPr>
+          <p:cNvPr id="4" name="CaixaDeTexto 3"/>
+          <p:cNvSpPr txBox="1"/>
+          <p:nvPr/>
+        </p:nvSpPr>
+        <p:spPr>
+          <a:xfrm>
+            <a:off x="1214414" y="3000372"/>
+            <a:ext cx="2357454" cy="2031325"/>
+          </a:xfrm>
+          <a:prstGeom prst="rect">
+            <a:avLst/>
+          </a:prstGeom>
+          <a:noFill/>
+        </p:spPr>
+        <p:txBody>
+          <a:bodyPr wrap="square" rtlCol="0">
+            <a:spAutoFit/>
+          </a:bodyPr>
+          <a:lstStyle/>
+          <a:p>
+            <a:pPr>
+              <a:buFont typeface="Arial" pitchFamily="34" charset="0"/>
+              <a:buChar char="•"/>
+            </a:pPr>
+            <a:r>
+              <a:rPr lang="pt-BR" dirty="0" smtClean="0"/>
+              <a:t>Melhorar Teste de unidade;</a:t>
+            </a:r>
+          </a:p>
+          <a:p>
+            <a:endParaRPr lang="pt-BR" dirty="0"/>
+          </a:p>
+          <a:p>
+            <a:pPr>
+              <a:buFont typeface="Arial" pitchFamily="34" charset="0"/>
+              <a:buChar char="•"/>
+            </a:pPr>
+            <a:r>
+              <a:rPr lang="pt-BR" dirty="0" smtClean="0"/>
+              <a:t>Utilizar um banco de Dados;</a:t>
+            </a:r>
+          </a:p>
+          <a:p>
+            <a:endParaRPr lang="pt-BR" dirty="0"/>
+          </a:p>
+          <a:p>
+            <a:endParaRPr lang="pt-BR" dirty="0"/>
+          </a:p>
+        </p:txBody>
+      </p:sp>
+      <p:sp>
+        <p:nvSpPr>
+          <p:cNvPr id="6" name="CaixaDeTexto 5"/>
+          <p:cNvSpPr txBox="1"/>
+          <p:nvPr/>
+        </p:nvSpPr>
+        <p:spPr>
+          <a:xfrm>
+            <a:off x="4714876" y="3000372"/>
+            <a:ext cx="3071834" cy="1477328"/>
+          </a:xfrm>
+          <a:prstGeom prst="rect">
+            <a:avLst/>
+          </a:prstGeom>
+          <a:noFill/>
+        </p:spPr>
+        <p:txBody>
+          <a:bodyPr wrap="square" rtlCol="0">
+            <a:spAutoFit/>
+          </a:bodyPr>
+          <a:lstStyle/>
+          <a:p>
+            <a:pPr>
+              <a:buFont typeface="Arial" pitchFamily="34" charset="0"/>
+              <a:buChar char="•"/>
+            </a:pPr>
+            <a:r>
+              <a:rPr lang="pt-BR" dirty="0" smtClean="0"/>
+              <a:t>Aprimorar relacionamentos entre as classes;</a:t>
+            </a:r>
+          </a:p>
+          <a:p>
+            <a:endParaRPr lang="pt-BR" dirty="0"/>
+          </a:p>
+          <a:p>
+            <a:pPr>
+              <a:buFont typeface="Arial" pitchFamily="34" charset="0"/>
+              <a:buChar char="•"/>
+            </a:pPr>
+            <a:r>
+              <a:rPr lang="pt-BR" dirty="0" smtClean="0"/>
+              <a:t>Melhorar interfaces(swing) para com o publico final.</a:t>
+            </a:r>
             <a:endParaRPr lang="pt-BR" dirty="0"/>
           </a:p>
         </p:txBody>
@@ -6377,7 +6652,15 @@
           <a:p>
             <a:r>
               <a:rPr lang="pt-BR" dirty="0" smtClean="0"/>
-              <a:t>Sumario</a:t>
+              <a:t>Sum</a:t>
+            </a:r>
+            <a:r>
+              <a:rPr lang="pt-BR" dirty="0" smtClean="0"/>
+              <a:t>á</a:t>
+            </a:r>
+            <a:r>
+              <a:rPr lang="pt-BR" dirty="0" smtClean="0"/>
+              <a:t>rio</a:t>
             </a:r>
             <a:endParaRPr lang="pt-BR" dirty="0"/>
           </a:p>
@@ -6392,7 +6675,7 @@
         <p:spPr>
           <a:xfrm>
             <a:off x="1428728" y="3000372"/>
-            <a:ext cx="3071834" cy="2585323"/>
+            <a:ext cx="3071834" cy="3139321"/>
           </a:xfrm>
           <a:prstGeom prst="rect">
             <a:avLst/>
@@ -6407,7 +6690,24 @@
           <a:p>
             <a:r>
               <a:rPr lang="pt-BR" dirty="0" smtClean="0"/>
-              <a:t>Metodologia;</a:t>
+              <a:t>Introdu</a:t>
+            </a:r>
+            <a:r>
+              <a:rPr lang="pt-BR" dirty="0" smtClean="0"/>
+              <a:t>ção e Motivação;</a:t>
+            </a:r>
+          </a:p>
+          <a:p>
+            <a:endParaRPr lang="pt-BR" dirty="0"/>
+          </a:p>
+          <a:p>
+            <a:r>
+              <a:rPr lang="pt-BR" dirty="0" smtClean="0"/>
+              <a:t>Metodologia</a:t>
+            </a:r>
+            <a:r>
+              <a:rPr lang="pt-BR" dirty="0" smtClean="0"/>
+              <a:t>;</a:t>
             </a:r>
           </a:p>
           <a:p>
@@ -6486,7 +6786,7 @@
         <p:spPr>
           <a:xfrm>
             <a:off x="395536" y="332656"/>
-            <a:ext cx="7772400" cy="1470025"/>
+            <a:ext cx="7772400" cy="1800200"/>
           </a:xfrm>
         </p:spPr>
         <p:txBody>
@@ -6494,10 +6794,14 @@
           <a:lstStyle/>
           <a:p>
             <a:r>
-              <a:rPr lang="pt-BR" dirty="0" smtClean="0"/>
-              <a:t>Metodologia</a:t>
-            </a:r>
-            <a:endParaRPr lang="pt-BR" dirty="0"/>
+              <a:rPr lang="pt-BR" sz="6000" dirty="0" smtClean="0"/>
+              <a:t>Introdu</a:t>
+            </a:r>
+            <a:r>
+              <a:rPr lang="pt-BR" sz="6000" dirty="0" smtClean="0"/>
+              <a:t>ção e Motivação</a:t>
+            </a:r>
+            <a:endParaRPr lang="pt-BR" sz="6000" dirty="0"/>
           </a:p>
         </p:txBody>
       </p:sp>
@@ -6509,8 +6813,8 @@
         </p:nvSpPr>
         <p:spPr>
           <a:xfrm>
-            <a:off x="395536" y="2060848"/>
-            <a:ext cx="7488832" cy="2585323"/>
+            <a:off x="395536" y="2348880"/>
+            <a:ext cx="7488832" cy="4247317"/>
           </a:xfrm>
           <a:prstGeom prst="rect">
             <a:avLst/>
@@ -6525,22 +6829,20 @@
           <a:p>
             <a:r>
               <a:rPr lang="pt-BR" dirty="0" smtClean="0"/>
-              <a:t>- Processo Evolutivo</a:t>
+              <a:t>- </a:t>
+            </a:r>
+            <a:r>
+              <a:rPr lang="pt-BR" dirty="0" smtClean="0"/>
+              <a:t>Modelar e implementar um sistema de compra (possivelmente online) de passagens a</a:t>
+            </a:r>
+            <a:r>
+              <a:rPr lang="pt-BR" dirty="0" smtClean="0"/>
+              <a:t>éreas de uma empresa fictícia.</a:t>
             </a:r>
             <a:endParaRPr lang="pt-BR" dirty="0" smtClean="0"/>
           </a:p>
           <a:p>
             <a:endParaRPr lang="pt-BR" dirty="0" smtClean="0"/>
-          </a:p>
-          <a:p>
-            <a:r>
-              <a:rPr lang="pt-BR" dirty="0" smtClean="0"/>
-              <a:t>- Ferramentas </a:t>
-            </a:r>
-            <a:r>
-              <a:rPr lang="pt-BR" dirty="0" smtClean="0"/>
-              <a:t>utilizadas,</a:t>
-            </a:r>
           </a:p>
           <a:p>
             <a:pPr marL="285750" indent="-285750">
@@ -6548,72 +6850,82 @@
               <a:buChar char="-"/>
             </a:pPr>
             <a:r>
-              <a:rPr lang="pt-BR" dirty="0" err="1" smtClean="0"/>
-              <a:t>Github</a:t>
-            </a:r>
-            <a:r>
-              <a:rPr lang="pt-BR" dirty="0"/>
-              <a:t> </a:t>
-            </a:r>
-            <a:r>
               <a:rPr lang="pt-BR" dirty="0" smtClean="0"/>
-              <a:t> (Repositório remoto).</a:t>
+              <a:t>Requisitos (para o cliente):</a:t>
             </a:r>
             <a:endParaRPr lang="pt-BR" dirty="0" smtClean="0"/>
           </a:p>
           <a:p>
-            <a:pPr marL="285750" indent="-285750">
+            <a:pPr marL="742950" lvl="1" indent="-285750">
               <a:buFontTx/>
               <a:buChar char="-"/>
             </a:pPr>
             <a:r>
+              <a:rPr lang="pt-BR" dirty="0" smtClean="0"/>
+              <a:t>Permitir uma </a:t>
+            </a:r>
+            <a:r>
+              <a:rPr lang="pt-BR" dirty="0" smtClean="0"/>
+              <a:t>busca detalhada dos voos dispon</a:t>
+            </a:r>
+            <a:r>
+              <a:rPr lang="pt-BR" dirty="0" smtClean="0"/>
+              <a:t>íveis;</a:t>
+            </a:r>
+          </a:p>
+          <a:p>
+            <a:pPr marL="742950" lvl="1" indent="-285750">
+              <a:buFontTx/>
+              <a:buChar char="-"/>
+            </a:pPr>
+            <a:r>
+              <a:rPr lang="pt-BR" dirty="0" smtClean="0"/>
+              <a:t>O usuário pode escolher entre buscar somente voo de ida ou buscar o par de passagens de ida e volta;</a:t>
+            </a:r>
+          </a:p>
+          <a:p>
+            <a:pPr marL="742950" lvl="1" indent="-285750">
+              <a:buFontTx/>
+              <a:buChar char="-"/>
+            </a:pPr>
+            <a:r>
+              <a:rPr lang="pt-BR" dirty="0" smtClean="0"/>
+              <a:t>A busca é baseada nos aeroportos de origem e destino, nas datas de ida e de volta, e na quantidade de passageiros que comprarão passagens;</a:t>
+            </a:r>
+          </a:p>
+          <a:p>
+            <a:pPr marL="742950" lvl="1" indent="-285750">
+              <a:buFontTx/>
+              <a:buChar char="-"/>
+            </a:pPr>
+            <a:r>
+              <a:rPr lang="pt-BR" dirty="0" smtClean="0"/>
+              <a:t>Registrar novos clientes e permitir </a:t>
+            </a:r>
+            <a:r>
               <a:rPr lang="pt-BR" dirty="0" err="1" smtClean="0"/>
-              <a:t>Eclemma</a:t>
+              <a:t>login</a:t>
             </a:r>
             <a:r>
               <a:rPr lang="pt-BR" dirty="0" smtClean="0"/>
-              <a:t> (Cobertura da parte de testes).</a:t>
-            </a:r>
-          </a:p>
-          <a:p>
+              <a:t> de clientes cadastrados;</a:t>
+            </a:r>
+          </a:p>
+          <a:p>
+            <a:pPr marL="742950" lvl="1" indent="-285750">
+              <a:buFontTx/>
+              <a:buChar char="-"/>
+            </a:pPr>
             <a:r>
               <a:rPr lang="pt-BR" dirty="0" smtClean="0"/>
-              <a:t>- </a:t>
-            </a:r>
-            <a:r>
-              <a:rPr lang="pt-BR" dirty="0" err="1" smtClean="0"/>
-              <a:t>Astah</a:t>
-            </a:r>
-            <a:r>
-              <a:rPr lang="pt-BR" dirty="0" smtClean="0"/>
-              <a:t> </a:t>
-            </a:r>
-            <a:r>
-              <a:rPr lang="pt-BR" dirty="0" smtClean="0"/>
-              <a:t>(Ferramenta para a modelagem em UML).</a:t>
-            </a:r>
-            <a:endParaRPr lang="pt-BR" dirty="0" smtClean="0"/>
-          </a:p>
-          <a:p>
-            <a:r>
-              <a:rPr lang="pt-BR" dirty="0" smtClean="0"/>
-              <a:t>- </a:t>
-            </a:r>
-            <a:r>
-              <a:rPr lang="pt-BR" dirty="0" err="1" smtClean="0"/>
-              <a:t>WindowBuilder</a:t>
-            </a:r>
-            <a:r>
-              <a:rPr lang="pt-BR" dirty="0" smtClean="0"/>
-              <a:t> </a:t>
-            </a:r>
-            <a:r>
-              <a:rPr lang="pt-BR" dirty="0" smtClean="0"/>
-              <a:t>(Construir a interface gráfica).</a:t>
-            </a:r>
-            <a:endParaRPr lang="pt-BR" dirty="0" smtClean="0"/>
-          </a:p>
-          <a:p>
+              <a:t>Permitir a compra de passagens.</a:t>
+            </a:r>
+          </a:p>
+          <a:p>
+            <a:pPr marL="742950" lvl="1" indent="-285750">
+              <a:buFontTx/>
+              <a:buChar char="-"/>
+            </a:pPr>
             <a:endParaRPr lang="pt-BR" dirty="0"/>
           </a:p>
           <a:p>
@@ -6622,6 +6934,11 @@
         </p:txBody>
       </p:sp>
     </p:spTree>
+    <p:extLst>
+      <p:ext uri="{BB962C8B-B14F-4D97-AF65-F5344CB8AC3E}">
+        <p14:creationId xmlns:p14="http://schemas.microsoft.com/office/powerpoint/2010/main" val="3768572476"/>
+      </p:ext>
+    </p:extLst>
   </p:cSld>
   <p:clrMapOvr>
     <a:masterClrMapping/>
@@ -6658,8 +6975,8 @@
         </p:nvSpPr>
         <p:spPr>
           <a:xfrm>
-            <a:off x="323528" y="260648"/>
-            <a:ext cx="7772400" cy="1470025"/>
+            <a:off x="395536" y="332656"/>
+            <a:ext cx="7772400" cy="1800200"/>
           </a:xfrm>
         </p:spPr>
         <p:txBody>
@@ -6667,1496 +6984,124 @@
           <a:lstStyle/>
           <a:p>
             <a:r>
+              <a:rPr lang="pt-BR" sz="6000" dirty="0" smtClean="0"/>
+              <a:t>Introdu</a:t>
+            </a:r>
+            <a:r>
+              <a:rPr lang="pt-BR" sz="6000" dirty="0" smtClean="0"/>
+              <a:t>ção e Motivação</a:t>
+            </a:r>
+            <a:endParaRPr lang="pt-BR" sz="6000" dirty="0"/>
+          </a:p>
+        </p:txBody>
+      </p:sp>
+      <p:sp>
+        <p:nvSpPr>
+          <p:cNvPr id="8" name="CaixaDeTexto 7"/>
+          <p:cNvSpPr txBox="1"/>
+          <p:nvPr/>
+        </p:nvSpPr>
+        <p:spPr>
+          <a:xfrm>
+            <a:off x="395536" y="2348880"/>
+            <a:ext cx="7488832" cy="2308324"/>
+          </a:xfrm>
+          <a:prstGeom prst="rect">
+            <a:avLst/>
+          </a:prstGeom>
+          <a:noFill/>
+        </p:spPr>
+        <p:txBody>
+          <a:bodyPr wrap="square" rtlCol="0">
+            <a:spAutoFit/>
+          </a:bodyPr>
+          <a:lstStyle/>
+          <a:p>
+            <a:pPr marL="285750" indent="-285750">
+              <a:buFontTx/>
+              <a:buChar char="-"/>
+            </a:pPr>
+            <a:r>
               <a:rPr lang="pt-BR" dirty="0" smtClean="0"/>
-              <a:t>Cronograma</a:t>
-            </a:r>
+              <a:t>Requisitos (para os funcion</a:t>
+            </a:r>
+            <a:r>
+              <a:rPr lang="pt-BR" dirty="0" smtClean="0"/>
+              <a:t>ários da empresa</a:t>
+            </a:r>
+            <a:r>
+              <a:rPr lang="pt-BR" dirty="0" smtClean="0"/>
+              <a:t>):</a:t>
+            </a:r>
+            <a:endParaRPr lang="pt-BR" dirty="0" smtClean="0"/>
+          </a:p>
+          <a:p>
+            <a:pPr marL="742950" lvl="1" indent="-285750">
+              <a:buFontTx/>
+              <a:buChar char="-"/>
+            </a:pPr>
+            <a:r>
+              <a:rPr lang="pt-BR" dirty="0" smtClean="0"/>
+              <a:t>Atendente: permitir </a:t>
+            </a:r>
+            <a:r>
+              <a:rPr lang="pt-BR" dirty="0" smtClean="0"/>
+              <a:t>a</a:t>
+            </a:r>
+            <a:r>
+              <a:rPr lang="pt-BR" dirty="0" smtClean="0"/>
+              <a:t>ções como realizar check-in, despachar bagagens, etc.</a:t>
+            </a:r>
+          </a:p>
+          <a:p>
+            <a:pPr marL="742950" lvl="1" indent="-285750">
+              <a:buFontTx/>
+              <a:buChar char="-"/>
+            </a:pPr>
+            <a:r>
+              <a:rPr lang="pt-BR" dirty="0" smtClean="0"/>
+              <a:t>Operador: permitir cadastrar voos no banco de dados;</a:t>
+            </a:r>
+          </a:p>
+          <a:p>
+            <a:pPr marL="742950" lvl="1" indent="-285750">
+              <a:buFontTx/>
+              <a:buChar char="-"/>
+            </a:pPr>
+            <a:r>
+              <a:rPr lang="pt-BR" dirty="0" smtClean="0"/>
+              <a:t>Administrador: permitir remover voos que foram cadastrados, remover passageiros, etc.</a:t>
+            </a:r>
+          </a:p>
+          <a:p>
+            <a:pPr marL="742950" lvl="1" indent="-285750">
+              <a:buFontTx/>
+              <a:buChar char="-"/>
+            </a:pPr>
             <a:endParaRPr lang="pt-BR" dirty="0"/>
           </a:p>
-        </p:txBody>
-      </p:sp>
-      <p:graphicFrame>
-        <p:nvGraphicFramePr>
-          <p:cNvPr id="5" name="Tabela 4"/>
-          <p:cNvGraphicFramePr>
-            <a:graphicFrameLocks noGrp="1"/>
-          </p:cNvGraphicFramePr>
-          <p:nvPr>
-            <p:extLst>
-              <p:ext uri="{D42A27DB-BD31-4B8C-83A1-F6EECF244321}">
-                <p14:modId xmlns:p14="http://schemas.microsoft.com/office/powerpoint/2010/main" val="4238015677"/>
-              </p:ext>
-            </p:extLst>
-          </p:nvPr>
-        </p:nvGraphicFramePr>
-        <p:xfrm>
-          <a:off x="1475656" y="2924944"/>
-          <a:ext cx="2808312" cy="2880321"/>
-        </p:xfrm>
-        <a:graphic>
-          <a:graphicData uri="http://schemas.openxmlformats.org/drawingml/2006/table">
-            <a:tbl>
-              <a:tblPr/>
-              <a:tblGrid>
-                <a:gridCol w="1363457"/>
-                <a:gridCol w="1444855"/>
-              </a:tblGrid>
-              <a:tr h="320036">
-                <a:tc>
-                  <a:txBody>
-                    <a:bodyPr/>
-                    <a:lstStyle/>
-                    <a:p>
-                      <a:pPr algn="l" fontAlgn="b"/>
-                      <a:r>
-                        <a:rPr lang="pt-BR" sz="1400" b="0" i="0" u="none" strike="noStrike" dirty="0">
-                          <a:solidFill>
-                            <a:schemeClr val="tx1"/>
-                          </a:solidFill>
-                          <a:latin typeface="Calibri"/>
-                        </a:rPr>
-                        <a:t>Dia</a:t>
-                      </a:r>
-                    </a:p>
-                  </a:txBody>
-                  <a:tcPr marL="9525" marR="9525" marT="9525" marB="0" anchor="b">
-                    <a:lnL w="12700" cap="flat" cmpd="sng" algn="ctr">
-                      <a:solidFill>
-                        <a:schemeClr val="tx1"/>
-                      </a:solidFill>
-                      <a:prstDash val="solid"/>
-                      <a:round/>
-                      <a:headEnd type="none" w="med" len="med"/>
-                      <a:tailEnd type="none" w="med" len="med"/>
-                    </a:lnL>
-                    <a:lnR w="12700" cap="flat" cmpd="sng" algn="ctr">
-                      <a:solidFill>
-                        <a:schemeClr val="tx1"/>
-                      </a:solidFill>
-                      <a:prstDash val="solid"/>
-                      <a:round/>
-                      <a:headEnd type="none" w="med" len="med"/>
-                      <a:tailEnd type="none" w="med" len="med"/>
-                    </a:lnR>
-                    <a:lnT w="12700" cap="flat" cmpd="sng" algn="ctr">
-                      <a:solidFill>
-                        <a:schemeClr val="tx1"/>
-                      </a:solidFill>
-                      <a:prstDash val="solid"/>
-                      <a:round/>
-                      <a:headEnd type="none" w="med" len="med"/>
-                      <a:tailEnd type="none" w="med" len="med"/>
-                    </a:lnT>
-                    <a:lnB w="12700" cap="flat" cmpd="sng" algn="ctr">
-                      <a:solidFill>
-                        <a:schemeClr val="tx1"/>
-                      </a:solidFill>
-                      <a:prstDash val="solid"/>
-                      <a:round/>
-                      <a:headEnd type="none" w="med" len="med"/>
-                      <a:tailEnd type="none" w="med" len="med"/>
-                    </a:lnB>
-                  </a:tcPr>
-                </a:tc>
-                <a:tc>
-                  <a:txBody>
-                    <a:bodyPr/>
-                    <a:lstStyle/>
-                    <a:p>
-                      <a:pPr algn="l" fontAlgn="b"/>
-                      <a:r>
-                        <a:rPr lang="pt-BR" sz="1400" b="0" i="0" u="none" strike="noStrike" dirty="0">
-                          <a:solidFill>
-                            <a:schemeClr val="tx1"/>
-                          </a:solidFill>
-                          <a:latin typeface="Calibri"/>
-                        </a:rPr>
-                        <a:t>Atividades</a:t>
-                      </a:r>
-                    </a:p>
-                  </a:txBody>
-                  <a:tcPr marL="9525" marR="9525" marT="9525" marB="0" anchor="b">
-                    <a:lnL w="12700" cap="flat" cmpd="sng" algn="ctr">
-                      <a:solidFill>
-                        <a:schemeClr val="tx1"/>
-                      </a:solidFill>
-                      <a:prstDash val="solid"/>
-                      <a:round/>
-                      <a:headEnd type="none" w="med" len="med"/>
-                      <a:tailEnd type="none" w="med" len="med"/>
-                    </a:lnL>
-                    <a:lnR w="12700" cap="flat" cmpd="sng" algn="ctr">
-                      <a:solidFill>
-                        <a:schemeClr val="tx1"/>
-                      </a:solidFill>
-                      <a:prstDash val="solid"/>
-                      <a:round/>
-                      <a:headEnd type="none" w="med" len="med"/>
-                      <a:tailEnd type="none" w="med" len="med"/>
-                    </a:lnR>
-                    <a:lnT w="12700" cap="flat" cmpd="sng" algn="ctr">
-                      <a:solidFill>
-                        <a:schemeClr val="tx1"/>
-                      </a:solidFill>
-                      <a:prstDash val="solid"/>
-                      <a:round/>
-                      <a:headEnd type="none" w="med" len="med"/>
-                      <a:tailEnd type="none" w="med" len="med"/>
-                    </a:lnT>
-                    <a:lnB w="12700" cap="flat" cmpd="sng" algn="ctr">
-                      <a:solidFill>
-                        <a:schemeClr val="tx1"/>
-                      </a:solidFill>
-                      <a:prstDash val="solid"/>
-                      <a:round/>
-                      <a:headEnd type="none" w="med" len="med"/>
-                      <a:tailEnd type="none" w="med" len="med"/>
-                    </a:lnB>
-                  </a:tcPr>
-                </a:tc>
-              </a:tr>
-              <a:tr h="1280141">
-                <a:tc>
-                  <a:txBody>
-                    <a:bodyPr/>
-                    <a:lstStyle/>
-                    <a:p>
-                      <a:pPr algn="ctr" fontAlgn="ctr"/>
-                      <a:r>
-                        <a:rPr lang="pt-BR" sz="1400" b="0" i="0" u="none" strike="noStrike" dirty="0">
-                          <a:solidFill>
-                            <a:schemeClr val="tx1"/>
-                          </a:solidFill>
-                          <a:latin typeface="Calibri"/>
-                        </a:rPr>
-                        <a:t>09/set</a:t>
-                      </a:r>
-                    </a:p>
-                  </a:txBody>
-                  <a:tcPr marL="9525" marR="9525" marT="9525" marB="0" anchor="ctr">
-                    <a:lnL w="12700" cap="flat" cmpd="sng" algn="ctr">
-                      <a:solidFill>
-                        <a:schemeClr val="tx1"/>
-                      </a:solidFill>
-                      <a:prstDash val="solid"/>
-                      <a:round/>
-                      <a:headEnd type="none" w="med" len="med"/>
-                      <a:tailEnd type="none" w="med" len="med"/>
-                    </a:lnL>
-                    <a:lnR w="12700" cap="flat" cmpd="sng" algn="ctr">
-                      <a:solidFill>
-                        <a:schemeClr val="tx1"/>
-                      </a:solidFill>
-                      <a:prstDash val="solid"/>
-                      <a:round/>
-                      <a:headEnd type="none" w="med" len="med"/>
-                      <a:tailEnd type="none" w="med" len="med"/>
-                    </a:lnR>
-                    <a:lnT w="12700" cap="flat" cmpd="sng" algn="ctr">
-                      <a:solidFill>
-                        <a:schemeClr val="tx1"/>
-                      </a:solidFill>
-                      <a:prstDash val="solid"/>
-                      <a:round/>
-                      <a:headEnd type="none" w="med" len="med"/>
-                      <a:tailEnd type="none" w="med" len="med"/>
-                    </a:lnT>
-                    <a:lnB w="12700" cap="flat" cmpd="sng" algn="ctr">
-                      <a:solidFill>
-                        <a:schemeClr val="tx1"/>
-                      </a:solidFill>
-                      <a:prstDash val="solid"/>
-                      <a:round/>
-                      <a:headEnd type="none" w="med" len="med"/>
-                      <a:tailEnd type="none" w="med" len="med"/>
-                    </a:lnB>
-                  </a:tcPr>
-                </a:tc>
-                <a:tc>
-                  <a:txBody>
-                    <a:bodyPr/>
-                    <a:lstStyle/>
-                    <a:p>
-                      <a:pPr algn="l" fontAlgn="b"/>
-                      <a:r>
-                        <a:rPr lang="pt-BR" sz="1400" b="0" i="0" u="none" strike="noStrike" dirty="0">
-                          <a:solidFill>
-                            <a:schemeClr val="tx1"/>
-                          </a:solidFill>
-                          <a:latin typeface="Calibri"/>
-                        </a:rPr>
-                        <a:t>criação do repositório </a:t>
-                      </a:r>
-                      <a:r>
-                        <a:rPr lang="pt-BR" sz="1400" b="0" i="0" u="none" strike="noStrike" dirty="0" err="1" smtClean="0">
-                          <a:solidFill>
-                            <a:schemeClr val="tx1"/>
-                          </a:solidFill>
-                          <a:latin typeface="Calibri"/>
-                        </a:rPr>
-                        <a:t>Git</a:t>
-                      </a:r>
-                      <a:endParaRPr lang="pt-BR" sz="1400" b="0" i="0" u="none" strike="noStrike" dirty="0">
-                        <a:solidFill>
-                          <a:schemeClr val="tx1"/>
-                        </a:solidFill>
-                        <a:latin typeface="Calibri"/>
-                      </a:endParaRPr>
-                    </a:p>
-                  </a:txBody>
-                  <a:tcPr marL="9525" marR="9525" marT="9525" marB="0" anchor="b">
-                    <a:lnL w="12700" cap="flat" cmpd="sng" algn="ctr">
-                      <a:solidFill>
-                        <a:schemeClr val="tx1"/>
-                      </a:solidFill>
-                      <a:prstDash val="solid"/>
-                      <a:round/>
-                      <a:headEnd type="none" w="med" len="med"/>
-                      <a:tailEnd type="none" w="med" len="med"/>
-                    </a:lnL>
-                    <a:lnR w="12700" cap="flat" cmpd="sng" algn="ctr">
-                      <a:solidFill>
-                        <a:schemeClr val="tx1"/>
-                      </a:solidFill>
-                      <a:prstDash val="solid"/>
-                      <a:round/>
-                      <a:headEnd type="none" w="med" len="med"/>
-                      <a:tailEnd type="none" w="med" len="med"/>
-                    </a:lnR>
-                    <a:lnT w="12700" cap="flat" cmpd="sng" algn="ctr">
-                      <a:solidFill>
-                        <a:schemeClr val="tx1"/>
-                      </a:solidFill>
-                      <a:prstDash val="solid"/>
-                      <a:round/>
-                      <a:headEnd type="none" w="med" len="med"/>
-                      <a:tailEnd type="none" w="med" len="med"/>
-                    </a:lnT>
-                    <a:lnB w="12700" cap="flat" cmpd="sng" algn="ctr">
-                      <a:solidFill>
-                        <a:schemeClr val="tx1"/>
-                      </a:solidFill>
-                      <a:prstDash val="solid"/>
-                      <a:round/>
-                      <a:headEnd type="none" w="med" len="med"/>
-                      <a:tailEnd type="none" w="med" len="med"/>
-                    </a:lnB>
-                  </a:tcPr>
-                </a:tc>
-              </a:tr>
-              <a:tr h="320036">
-                <a:tc>
-                  <a:txBody>
-                    <a:bodyPr/>
-                    <a:lstStyle/>
-                    <a:p>
-                      <a:pPr algn="ctr" fontAlgn="ctr"/>
-                      <a:r>
-                        <a:rPr lang="pt-BR" sz="1400" b="0" i="0" u="none" strike="noStrike" dirty="0">
-                          <a:solidFill>
-                            <a:schemeClr val="tx1"/>
-                          </a:solidFill>
-                          <a:latin typeface="Calibri"/>
-                        </a:rPr>
-                        <a:t>12/set</a:t>
-                      </a:r>
-                    </a:p>
-                  </a:txBody>
-                  <a:tcPr marL="9525" marR="9525" marT="9525" marB="0" anchor="ctr">
-                    <a:lnL w="12700" cap="flat" cmpd="sng" algn="ctr">
-                      <a:solidFill>
-                        <a:schemeClr val="tx1"/>
-                      </a:solidFill>
-                      <a:prstDash val="solid"/>
-                      <a:round/>
-                      <a:headEnd type="none" w="med" len="med"/>
-                      <a:tailEnd type="none" w="med" len="med"/>
-                    </a:lnL>
-                    <a:lnR w="12700" cap="flat" cmpd="sng" algn="ctr">
-                      <a:solidFill>
-                        <a:schemeClr val="tx1"/>
-                      </a:solidFill>
-                      <a:prstDash val="solid"/>
-                      <a:round/>
-                      <a:headEnd type="none" w="med" len="med"/>
-                      <a:tailEnd type="none" w="med" len="med"/>
-                    </a:lnR>
-                    <a:lnT w="12700" cap="flat" cmpd="sng" algn="ctr">
-                      <a:solidFill>
-                        <a:schemeClr val="tx1"/>
-                      </a:solidFill>
-                      <a:prstDash val="solid"/>
-                      <a:round/>
-                      <a:headEnd type="none" w="med" len="med"/>
-                      <a:tailEnd type="none" w="med" len="med"/>
-                    </a:lnT>
-                    <a:lnB w="12700" cap="flat" cmpd="sng" algn="ctr">
-                      <a:solidFill>
-                        <a:schemeClr val="tx1"/>
-                      </a:solidFill>
-                      <a:prstDash val="solid"/>
-                      <a:round/>
-                      <a:headEnd type="none" w="med" len="med"/>
-                      <a:tailEnd type="none" w="med" len="med"/>
-                    </a:lnB>
-                    <a:lnTlToBr w="12700" cmpd="sng">
-                      <a:noFill/>
-                      <a:prstDash val="solid"/>
-                    </a:lnTlToBr>
-                    <a:lnBlToTr w="12700" cmpd="sng">
-                      <a:noFill/>
-                      <a:prstDash val="solid"/>
-                    </a:lnBlToTr>
-                  </a:tcPr>
-                </a:tc>
-                <a:tc>
-                  <a:txBody>
-                    <a:bodyPr/>
-                    <a:lstStyle/>
-                    <a:p>
-                      <a:pPr algn="l" fontAlgn="b"/>
-                      <a:r>
-                        <a:rPr lang="pt-BR" sz="1400" b="0" i="0" u="none" strike="noStrike" dirty="0">
-                          <a:solidFill>
-                            <a:schemeClr val="tx1"/>
-                          </a:solidFill>
-                          <a:latin typeface="Calibri"/>
-                        </a:rPr>
-                        <a:t>1º relatório</a:t>
-                      </a:r>
-                    </a:p>
-                  </a:txBody>
-                  <a:tcPr marL="9525" marR="9525" marT="9525" marB="0" anchor="b">
-                    <a:lnL w="12700" cap="flat" cmpd="sng" algn="ctr">
-                      <a:solidFill>
-                        <a:schemeClr val="tx1"/>
-                      </a:solidFill>
-                      <a:prstDash val="solid"/>
-                      <a:round/>
-                      <a:headEnd type="none" w="med" len="med"/>
-                      <a:tailEnd type="none" w="med" len="med"/>
-                    </a:lnL>
-                    <a:lnR w="12700" cap="flat" cmpd="sng" algn="ctr">
-                      <a:solidFill>
-                        <a:schemeClr val="tx1"/>
-                      </a:solidFill>
-                      <a:prstDash val="solid"/>
-                      <a:round/>
-                      <a:headEnd type="none" w="med" len="med"/>
-                      <a:tailEnd type="none" w="med" len="med"/>
-                    </a:lnR>
-                    <a:lnT w="12700" cap="flat" cmpd="sng" algn="ctr">
-                      <a:solidFill>
-                        <a:schemeClr val="tx1"/>
-                      </a:solidFill>
-                      <a:prstDash val="solid"/>
-                      <a:round/>
-                      <a:headEnd type="none" w="med" len="med"/>
-                      <a:tailEnd type="none" w="med" len="med"/>
-                    </a:lnT>
-                    <a:lnB w="12700" cap="flat" cmpd="sng" algn="ctr">
-                      <a:solidFill>
-                        <a:schemeClr val="tx1"/>
-                      </a:solidFill>
-                      <a:prstDash val="solid"/>
-                      <a:round/>
-                      <a:headEnd type="none" w="med" len="med"/>
-                      <a:tailEnd type="none" w="med" len="med"/>
-                    </a:lnB>
-                  </a:tcPr>
-                </a:tc>
-              </a:tr>
-              <a:tr h="320036">
-                <a:tc>
-                  <a:txBody>
-                    <a:bodyPr/>
-                    <a:lstStyle/>
-                    <a:p>
-                      <a:pPr algn="ctr" fontAlgn="ctr"/>
-                      <a:r>
-                        <a:rPr lang="pt-BR" sz="1400" b="0" i="0" u="none" strike="noStrike" dirty="0">
-                          <a:solidFill>
-                            <a:schemeClr val="tx1"/>
-                          </a:solidFill>
-                          <a:latin typeface="Calibri"/>
-                        </a:rPr>
-                        <a:t>18/set</a:t>
-                      </a:r>
-                    </a:p>
-                  </a:txBody>
-                  <a:tcPr marL="9525" marR="9525" marT="9525" marB="0" anchor="ctr">
-                    <a:lnL w="12700" cap="flat" cmpd="sng" algn="ctr">
-                      <a:solidFill>
-                        <a:schemeClr val="tx1"/>
-                      </a:solidFill>
-                      <a:prstDash val="solid"/>
-                      <a:round/>
-                      <a:headEnd type="none" w="med" len="med"/>
-                      <a:tailEnd type="none" w="med" len="med"/>
-                    </a:lnL>
-                    <a:lnR w="12700" cap="flat" cmpd="sng" algn="ctr">
-                      <a:solidFill>
-                        <a:schemeClr val="tx1"/>
-                      </a:solidFill>
-                      <a:prstDash val="solid"/>
-                      <a:round/>
-                      <a:headEnd type="none" w="med" len="med"/>
-                      <a:tailEnd type="none" w="med" len="med"/>
-                    </a:lnR>
-                    <a:lnT w="12700" cap="flat" cmpd="sng" algn="ctr">
-                      <a:solidFill>
-                        <a:schemeClr val="tx1"/>
-                      </a:solidFill>
-                      <a:prstDash val="solid"/>
-                      <a:round/>
-                      <a:headEnd type="none" w="med" len="med"/>
-                      <a:tailEnd type="none" w="med" len="med"/>
-                    </a:lnT>
-                    <a:lnB w="12700" cap="flat" cmpd="sng" algn="ctr">
-                      <a:solidFill>
-                        <a:schemeClr val="tx1"/>
-                      </a:solidFill>
-                      <a:prstDash val="solid"/>
-                      <a:round/>
-                      <a:headEnd type="none" w="med" len="med"/>
-                      <a:tailEnd type="none" w="med" len="med"/>
-                    </a:lnB>
-                  </a:tcPr>
-                </a:tc>
-                <a:tc>
-                  <a:txBody>
-                    <a:bodyPr/>
-                    <a:lstStyle/>
-                    <a:p>
-                      <a:pPr algn="l" fontAlgn="b"/>
-                      <a:r>
-                        <a:rPr lang="pt-BR" sz="1400" b="0" i="0" u="none" strike="noStrike" dirty="0">
-                          <a:solidFill>
-                            <a:schemeClr val="tx1"/>
-                          </a:solidFill>
-                          <a:latin typeface="Calibri"/>
-                        </a:rPr>
-                        <a:t>2º relatório</a:t>
-                      </a:r>
-                    </a:p>
-                  </a:txBody>
-                  <a:tcPr marL="9525" marR="9525" marT="9525" marB="0" anchor="b">
-                    <a:lnL w="12700" cap="flat" cmpd="sng" algn="ctr">
-                      <a:solidFill>
-                        <a:schemeClr val="tx1"/>
-                      </a:solidFill>
-                      <a:prstDash val="solid"/>
-                      <a:round/>
-                      <a:headEnd type="none" w="med" len="med"/>
-                      <a:tailEnd type="none" w="med" len="med"/>
-                    </a:lnL>
-                    <a:lnR w="12700" cap="flat" cmpd="sng" algn="ctr">
-                      <a:solidFill>
-                        <a:schemeClr val="tx1"/>
-                      </a:solidFill>
-                      <a:prstDash val="solid"/>
-                      <a:round/>
-                      <a:headEnd type="none" w="med" len="med"/>
-                      <a:tailEnd type="none" w="med" len="med"/>
-                    </a:lnR>
-                    <a:lnT w="12700" cap="flat" cmpd="sng" algn="ctr">
-                      <a:solidFill>
-                        <a:schemeClr val="tx1"/>
-                      </a:solidFill>
-                      <a:prstDash val="solid"/>
-                      <a:round/>
-                      <a:headEnd type="none" w="med" len="med"/>
-                      <a:tailEnd type="none" w="med" len="med"/>
-                    </a:lnT>
-                    <a:lnB w="12700" cap="flat" cmpd="sng" algn="ctr">
-                      <a:solidFill>
-                        <a:schemeClr val="tx1"/>
-                      </a:solidFill>
-                      <a:prstDash val="solid"/>
-                      <a:round/>
-                      <a:headEnd type="none" w="med" len="med"/>
-                      <a:tailEnd type="none" w="med" len="med"/>
-                    </a:lnB>
-                  </a:tcPr>
-                </a:tc>
-              </a:tr>
-              <a:tr h="320036">
-                <a:tc>
-                  <a:txBody>
-                    <a:bodyPr/>
-                    <a:lstStyle/>
-                    <a:p>
-                      <a:pPr algn="ctr" fontAlgn="ctr"/>
-                      <a:r>
-                        <a:rPr lang="pt-BR" sz="1400" b="0" i="0" u="none" strike="noStrike">
-                          <a:solidFill>
-                            <a:schemeClr val="tx1"/>
-                          </a:solidFill>
-                          <a:latin typeface="Calibri"/>
-                        </a:rPr>
-                        <a:t>29/set</a:t>
-                      </a:r>
-                    </a:p>
-                  </a:txBody>
-                  <a:tcPr marL="9525" marR="9525" marT="9525" marB="0" anchor="ctr">
-                    <a:lnL w="12700" cap="flat" cmpd="sng" algn="ctr">
-                      <a:solidFill>
-                        <a:schemeClr val="tx1"/>
-                      </a:solidFill>
-                      <a:prstDash val="solid"/>
-                      <a:round/>
-                      <a:headEnd type="none" w="med" len="med"/>
-                      <a:tailEnd type="none" w="med" len="med"/>
-                    </a:lnL>
-                    <a:lnR w="12700" cap="flat" cmpd="sng" algn="ctr">
-                      <a:solidFill>
-                        <a:schemeClr val="tx1"/>
-                      </a:solidFill>
-                      <a:prstDash val="solid"/>
-                      <a:round/>
-                      <a:headEnd type="none" w="med" len="med"/>
-                      <a:tailEnd type="none" w="med" len="med"/>
-                    </a:lnR>
-                    <a:lnT w="12700" cap="flat" cmpd="sng" algn="ctr">
-                      <a:solidFill>
-                        <a:schemeClr val="tx1"/>
-                      </a:solidFill>
-                      <a:prstDash val="solid"/>
-                      <a:round/>
-                      <a:headEnd type="none" w="med" len="med"/>
-                      <a:tailEnd type="none" w="med" len="med"/>
-                    </a:lnT>
-                    <a:lnB w="12700" cap="flat" cmpd="sng" algn="ctr">
-                      <a:solidFill>
-                        <a:schemeClr val="tx1"/>
-                      </a:solidFill>
-                      <a:prstDash val="solid"/>
-                      <a:round/>
-                      <a:headEnd type="none" w="med" len="med"/>
-                      <a:tailEnd type="none" w="med" len="med"/>
-                    </a:lnB>
-                  </a:tcPr>
-                </a:tc>
-                <a:tc>
-                  <a:txBody>
-                    <a:bodyPr/>
-                    <a:lstStyle/>
-                    <a:p>
-                      <a:pPr algn="l" fontAlgn="b"/>
-                      <a:r>
-                        <a:rPr lang="pt-BR" sz="1400" b="0" i="0" u="none" strike="noStrike" dirty="0">
-                          <a:solidFill>
-                            <a:schemeClr val="tx1"/>
-                          </a:solidFill>
-                          <a:latin typeface="Calibri"/>
-                        </a:rPr>
-                        <a:t>3º relatório</a:t>
-                      </a:r>
-                    </a:p>
-                  </a:txBody>
-                  <a:tcPr marL="9525" marR="9525" marT="9525" marB="0" anchor="b">
-                    <a:lnL w="12700" cap="flat" cmpd="sng" algn="ctr">
-                      <a:solidFill>
-                        <a:schemeClr val="tx1"/>
-                      </a:solidFill>
-                      <a:prstDash val="solid"/>
-                      <a:round/>
-                      <a:headEnd type="none" w="med" len="med"/>
-                      <a:tailEnd type="none" w="med" len="med"/>
-                    </a:lnL>
-                    <a:lnR w="12700" cap="flat" cmpd="sng" algn="ctr">
-                      <a:solidFill>
-                        <a:schemeClr val="tx1"/>
-                      </a:solidFill>
-                      <a:prstDash val="solid"/>
-                      <a:round/>
-                      <a:headEnd type="none" w="med" len="med"/>
-                      <a:tailEnd type="none" w="med" len="med"/>
-                    </a:lnR>
-                    <a:lnT w="12700" cap="flat" cmpd="sng" algn="ctr">
-                      <a:solidFill>
-                        <a:schemeClr val="tx1"/>
-                      </a:solidFill>
-                      <a:prstDash val="solid"/>
-                      <a:round/>
-                      <a:headEnd type="none" w="med" len="med"/>
-                      <a:tailEnd type="none" w="med" len="med"/>
-                    </a:lnT>
-                    <a:lnB w="12700" cap="flat" cmpd="sng" algn="ctr">
-                      <a:solidFill>
-                        <a:schemeClr val="tx1"/>
-                      </a:solidFill>
-                      <a:prstDash val="solid"/>
-                      <a:round/>
-                      <a:headEnd type="none" w="med" len="med"/>
-                      <a:tailEnd type="none" w="med" len="med"/>
-                    </a:lnB>
-                  </a:tcPr>
-                </a:tc>
-              </a:tr>
-              <a:tr h="320036">
-                <a:tc>
-                  <a:txBody>
-                    <a:bodyPr/>
-                    <a:lstStyle/>
-                    <a:p>
-                      <a:pPr algn="ctr" fontAlgn="ctr"/>
-                      <a:r>
-                        <a:rPr lang="pt-BR" sz="1400" b="0" i="0" u="none" strike="noStrike">
-                          <a:solidFill>
-                            <a:schemeClr val="tx1"/>
-                          </a:solidFill>
-                          <a:latin typeface="Calibri"/>
-                        </a:rPr>
-                        <a:t>07/out</a:t>
-                      </a:r>
-                    </a:p>
-                  </a:txBody>
-                  <a:tcPr marL="9525" marR="9525" marT="9525" marB="0" anchor="ctr">
-                    <a:lnL w="12700" cap="flat" cmpd="sng" algn="ctr">
-                      <a:solidFill>
-                        <a:schemeClr val="tx1"/>
-                      </a:solidFill>
-                      <a:prstDash val="solid"/>
-                      <a:round/>
-                      <a:headEnd type="none" w="med" len="med"/>
-                      <a:tailEnd type="none" w="med" len="med"/>
-                    </a:lnL>
-                    <a:lnR w="12700" cap="flat" cmpd="sng" algn="ctr">
-                      <a:solidFill>
-                        <a:schemeClr val="tx1"/>
-                      </a:solidFill>
-                      <a:prstDash val="solid"/>
-                      <a:round/>
-                      <a:headEnd type="none" w="med" len="med"/>
-                      <a:tailEnd type="none" w="med" len="med"/>
-                    </a:lnR>
-                    <a:lnT w="12700" cap="flat" cmpd="sng" algn="ctr">
-                      <a:solidFill>
-                        <a:schemeClr val="tx1"/>
-                      </a:solidFill>
-                      <a:prstDash val="solid"/>
-                      <a:round/>
-                      <a:headEnd type="none" w="med" len="med"/>
-                      <a:tailEnd type="none" w="med" len="med"/>
-                    </a:lnT>
-                    <a:lnB w="12700" cap="flat" cmpd="sng" algn="ctr">
-                      <a:solidFill>
-                        <a:schemeClr val="tx1"/>
-                      </a:solidFill>
-                      <a:prstDash val="solid"/>
-                      <a:round/>
-                      <a:headEnd type="none" w="med" len="med"/>
-                      <a:tailEnd type="none" w="med" len="med"/>
-                    </a:lnB>
-                  </a:tcPr>
-                </a:tc>
-                <a:tc>
-                  <a:txBody>
-                    <a:bodyPr/>
-                    <a:lstStyle/>
-                    <a:p>
-                      <a:pPr algn="l" fontAlgn="b"/>
-                      <a:r>
-                        <a:rPr lang="pt-BR" sz="1400" b="0" i="0" u="none" strike="noStrike" dirty="0">
-                          <a:solidFill>
-                            <a:schemeClr val="tx1"/>
-                          </a:solidFill>
-                          <a:latin typeface="Calibri"/>
-                        </a:rPr>
-                        <a:t>4º relatório</a:t>
-                      </a:r>
-                    </a:p>
-                  </a:txBody>
-                  <a:tcPr marL="9525" marR="9525" marT="9525" marB="0" anchor="b">
-                    <a:lnL w="12700" cap="flat" cmpd="sng" algn="ctr">
-                      <a:solidFill>
-                        <a:schemeClr val="tx1"/>
-                      </a:solidFill>
-                      <a:prstDash val="solid"/>
-                      <a:round/>
-                      <a:headEnd type="none" w="med" len="med"/>
-                      <a:tailEnd type="none" w="med" len="med"/>
-                    </a:lnL>
-                    <a:lnR w="12700" cap="flat" cmpd="sng" algn="ctr">
-                      <a:solidFill>
-                        <a:schemeClr val="tx1"/>
-                      </a:solidFill>
-                      <a:prstDash val="solid"/>
-                      <a:round/>
-                      <a:headEnd type="none" w="med" len="med"/>
-                      <a:tailEnd type="none" w="med" len="med"/>
-                    </a:lnR>
-                    <a:lnT w="12700" cap="flat" cmpd="sng" algn="ctr">
-                      <a:solidFill>
-                        <a:schemeClr val="tx1"/>
-                      </a:solidFill>
-                      <a:prstDash val="solid"/>
-                      <a:round/>
-                      <a:headEnd type="none" w="med" len="med"/>
-                      <a:tailEnd type="none" w="med" len="med"/>
-                    </a:lnT>
-                    <a:lnB w="12700" cap="flat" cmpd="sng" algn="ctr">
-                      <a:solidFill>
-                        <a:schemeClr val="tx1"/>
-                      </a:solidFill>
-                      <a:prstDash val="solid"/>
-                      <a:round/>
-                      <a:headEnd type="none" w="med" len="med"/>
-                      <a:tailEnd type="none" w="med" len="med"/>
-                    </a:lnB>
-                  </a:tcPr>
-                </a:tc>
-              </a:tr>
-            </a:tbl>
-          </a:graphicData>
-        </a:graphic>
-      </p:graphicFrame>
-      <p:graphicFrame>
-        <p:nvGraphicFramePr>
-          <p:cNvPr id="6" name="Tabela 5"/>
-          <p:cNvGraphicFramePr>
-            <a:graphicFrameLocks noGrp="1"/>
-          </p:cNvGraphicFramePr>
-          <p:nvPr>
-            <p:extLst>
-              <p:ext uri="{D42A27DB-BD31-4B8C-83A1-F6EECF244321}">
-                <p14:modId xmlns:p14="http://schemas.microsoft.com/office/powerpoint/2010/main" val="3124146252"/>
-              </p:ext>
-            </p:extLst>
-          </p:nvPr>
-        </p:nvGraphicFramePr>
-        <p:xfrm>
-          <a:off x="4572000" y="2852935"/>
-          <a:ext cx="2736304" cy="2952327"/>
-        </p:xfrm>
-        <a:graphic>
-          <a:graphicData uri="http://schemas.openxmlformats.org/drawingml/2006/table">
-            <a:tbl>
-              <a:tblPr/>
-              <a:tblGrid>
-                <a:gridCol w="932120"/>
-                <a:gridCol w="1804184"/>
-              </a:tblGrid>
-              <a:tr h="328036">
-                <a:tc>
-                  <a:txBody>
-                    <a:bodyPr/>
-                    <a:lstStyle/>
-                    <a:p>
-                      <a:pPr algn="l" fontAlgn="b"/>
-                      <a:r>
-                        <a:rPr lang="pt-BR" sz="1400" b="0" i="0" u="none" strike="noStrike" dirty="0" smtClean="0">
-                          <a:solidFill>
-                            <a:schemeClr val="tx1"/>
-                          </a:solidFill>
-                          <a:latin typeface="Calibri"/>
-                        </a:rPr>
-                        <a:t>Dia </a:t>
-                      </a:r>
-                      <a:endParaRPr lang="pt-BR" sz="1400" b="0" i="0" u="none" strike="noStrike" dirty="0">
-                        <a:solidFill>
-                          <a:schemeClr val="tx1"/>
-                        </a:solidFill>
-                        <a:latin typeface="Calibri"/>
-                      </a:endParaRPr>
-                    </a:p>
-                  </a:txBody>
-                  <a:tcPr marL="9525" marR="9525" marT="9525" marB="0" anchor="b">
-                    <a:lnL w="12700" cap="flat" cmpd="sng" algn="ctr">
-                      <a:solidFill>
-                        <a:schemeClr val="tx1"/>
-                      </a:solidFill>
-                      <a:prstDash val="solid"/>
-                      <a:round/>
-                      <a:headEnd type="none" w="med" len="med"/>
-                      <a:tailEnd type="none" w="med" len="med"/>
-                    </a:lnL>
-                    <a:lnR w="12700" cap="flat" cmpd="sng" algn="ctr">
-                      <a:solidFill>
-                        <a:schemeClr val="tx1"/>
-                      </a:solidFill>
-                      <a:prstDash val="solid"/>
-                      <a:round/>
-                      <a:headEnd type="none" w="med" len="med"/>
-                      <a:tailEnd type="none" w="med" len="med"/>
-                    </a:lnR>
-                    <a:lnT w="12700" cap="flat" cmpd="sng" algn="ctr">
-                      <a:solidFill>
-                        <a:schemeClr val="tx1"/>
-                      </a:solidFill>
-                      <a:prstDash val="solid"/>
-                      <a:round/>
-                      <a:headEnd type="none" w="med" len="med"/>
-                      <a:tailEnd type="none" w="med" len="med"/>
-                    </a:lnT>
-                    <a:lnB w="12700" cap="flat" cmpd="sng" algn="ctr">
-                      <a:solidFill>
-                        <a:schemeClr val="tx1"/>
-                      </a:solidFill>
-                      <a:prstDash val="solid"/>
-                      <a:round/>
-                      <a:headEnd type="none" w="med" len="med"/>
-                      <a:tailEnd type="none" w="med" len="med"/>
-                    </a:lnB>
-                  </a:tcPr>
-                </a:tc>
-                <a:tc>
-                  <a:txBody>
-                    <a:bodyPr/>
-                    <a:lstStyle/>
-                    <a:p>
-                      <a:pPr algn="l" fontAlgn="b"/>
-                      <a:r>
-                        <a:rPr lang="pt-BR" sz="1400" b="0" i="0" u="none" strike="noStrike">
-                          <a:solidFill>
-                            <a:schemeClr val="tx1"/>
-                          </a:solidFill>
-                          <a:latin typeface="Calibri"/>
-                        </a:rPr>
-                        <a:t>Atividades</a:t>
-                      </a:r>
-                    </a:p>
-                  </a:txBody>
-                  <a:tcPr marL="9525" marR="9525" marT="9525" marB="0" anchor="b">
-                    <a:lnL w="12700" cap="flat" cmpd="sng" algn="ctr">
-                      <a:solidFill>
-                        <a:schemeClr val="tx1"/>
-                      </a:solidFill>
-                      <a:prstDash val="solid"/>
-                      <a:round/>
-                      <a:headEnd type="none" w="med" len="med"/>
-                      <a:tailEnd type="none" w="med" len="med"/>
-                    </a:lnL>
-                    <a:lnR w="12700" cap="flat" cmpd="sng" algn="ctr">
-                      <a:solidFill>
-                        <a:schemeClr val="tx1"/>
-                      </a:solidFill>
-                      <a:prstDash val="solid"/>
-                      <a:round/>
-                      <a:headEnd type="none" w="med" len="med"/>
-                      <a:tailEnd type="none" w="med" len="med"/>
-                    </a:lnR>
-                    <a:lnT w="12700" cap="flat" cmpd="sng" algn="ctr">
-                      <a:solidFill>
-                        <a:schemeClr val="tx1"/>
-                      </a:solidFill>
-                      <a:prstDash val="solid"/>
-                      <a:round/>
-                      <a:headEnd type="none" w="med" len="med"/>
-                      <a:tailEnd type="none" w="med" len="med"/>
-                    </a:lnT>
-                    <a:lnB w="12700" cap="flat" cmpd="sng" algn="ctr">
-                      <a:solidFill>
-                        <a:schemeClr val="tx1"/>
-                      </a:solidFill>
-                      <a:prstDash val="solid"/>
-                      <a:round/>
-                      <a:headEnd type="none" w="med" len="med"/>
-                      <a:tailEnd type="none" w="med" len="med"/>
-                    </a:lnB>
-                  </a:tcPr>
-                </a:tc>
-              </a:tr>
-              <a:tr h="1312147">
-                <a:tc>
-                  <a:txBody>
-                    <a:bodyPr/>
-                    <a:lstStyle/>
-                    <a:p>
-                      <a:pPr algn="ctr" fontAlgn="ctr"/>
-                      <a:r>
-                        <a:rPr lang="pt-BR" sz="1400" b="0" i="0" u="none" strike="noStrike" dirty="0">
-                          <a:solidFill>
-                            <a:schemeClr val="tx1"/>
-                          </a:solidFill>
-                          <a:latin typeface="Calibri"/>
-                        </a:rPr>
-                        <a:t>14/out</a:t>
-                      </a:r>
-                    </a:p>
-                  </a:txBody>
-                  <a:tcPr marL="9525" marR="9525" marT="9525" marB="0" anchor="ctr">
-                    <a:lnL w="12700" cap="flat" cmpd="sng" algn="ctr">
-                      <a:solidFill>
-                        <a:schemeClr val="tx1"/>
-                      </a:solidFill>
-                      <a:prstDash val="solid"/>
-                      <a:round/>
-                      <a:headEnd type="none" w="med" len="med"/>
-                      <a:tailEnd type="none" w="med" len="med"/>
-                    </a:lnL>
-                    <a:lnR w="12700" cap="flat" cmpd="sng" algn="ctr">
-                      <a:solidFill>
-                        <a:schemeClr val="tx1"/>
-                      </a:solidFill>
-                      <a:prstDash val="solid"/>
-                      <a:round/>
-                      <a:headEnd type="none" w="med" len="med"/>
-                      <a:tailEnd type="none" w="med" len="med"/>
-                    </a:lnR>
-                    <a:lnT w="12700" cap="flat" cmpd="sng" algn="ctr">
-                      <a:solidFill>
-                        <a:schemeClr val="tx1"/>
-                      </a:solidFill>
-                      <a:prstDash val="solid"/>
-                      <a:round/>
-                      <a:headEnd type="none" w="med" len="med"/>
-                      <a:tailEnd type="none" w="med" len="med"/>
-                    </a:lnT>
-                    <a:lnB w="12700" cap="flat" cmpd="sng" algn="ctr">
-                      <a:solidFill>
-                        <a:schemeClr val="tx1"/>
-                      </a:solidFill>
-                      <a:prstDash val="solid"/>
-                      <a:round/>
-                      <a:headEnd type="none" w="med" len="med"/>
-                      <a:tailEnd type="none" w="med" len="med"/>
-                    </a:lnB>
-                  </a:tcPr>
-                </a:tc>
-                <a:tc>
-                  <a:txBody>
-                    <a:bodyPr/>
-                    <a:lstStyle/>
-                    <a:p>
-                      <a:pPr algn="l" fontAlgn="b"/>
-                      <a:r>
-                        <a:rPr lang="pt-BR" sz="1400" b="0" i="0" u="none" strike="noStrike" dirty="0" smtClean="0">
-                          <a:solidFill>
-                            <a:schemeClr val="tx1"/>
-                          </a:solidFill>
-                          <a:latin typeface="Calibri"/>
-                        </a:rPr>
-                        <a:t>Mudança </a:t>
-                      </a:r>
-                      <a:r>
-                        <a:rPr lang="pt-BR" sz="1400" b="0" i="0" u="none" strike="noStrike" dirty="0">
-                          <a:solidFill>
-                            <a:schemeClr val="tx1"/>
-                          </a:solidFill>
-                          <a:latin typeface="Calibri"/>
-                        </a:rPr>
-                        <a:t>de repositório</a:t>
-                      </a:r>
-                    </a:p>
-                  </a:txBody>
-                  <a:tcPr marL="9525" marR="9525" marT="9525" marB="0" anchor="b">
-                    <a:lnL w="12700" cap="flat" cmpd="sng" algn="ctr">
-                      <a:solidFill>
-                        <a:schemeClr val="tx1"/>
-                      </a:solidFill>
-                      <a:prstDash val="solid"/>
-                      <a:round/>
-                      <a:headEnd type="none" w="med" len="med"/>
-                      <a:tailEnd type="none" w="med" len="med"/>
-                    </a:lnL>
-                    <a:lnR w="12700" cap="flat" cmpd="sng" algn="ctr">
-                      <a:solidFill>
-                        <a:schemeClr val="tx1"/>
-                      </a:solidFill>
-                      <a:prstDash val="solid"/>
-                      <a:round/>
-                      <a:headEnd type="none" w="med" len="med"/>
-                      <a:tailEnd type="none" w="med" len="med"/>
-                    </a:lnR>
-                    <a:lnT w="12700" cap="flat" cmpd="sng" algn="ctr">
-                      <a:solidFill>
-                        <a:schemeClr val="tx1"/>
-                      </a:solidFill>
-                      <a:prstDash val="solid"/>
-                      <a:round/>
-                      <a:headEnd type="none" w="med" len="med"/>
-                      <a:tailEnd type="none" w="med" len="med"/>
-                    </a:lnT>
-                    <a:lnB w="12700" cap="flat" cmpd="sng" algn="ctr">
-                      <a:solidFill>
-                        <a:schemeClr val="tx1"/>
-                      </a:solidFill>
-                      <a:prstDash val="solid"/>
-                      <a:round/>
-                      <a:headEnd type="none" w="med" len="med"/>
-                      <a:tailEnd type="none" w="med" len="med"/>
-                    </a:lnB>
-                  </a:tcPr>
-                </a:tc>
-              </a:tr>
-              <a:tr h="328036">
-                <a:tc>
-                  <a:txBody>
-                    <a:bodyPr/>
-                    <a:lstStyle/>
-                    <a:p>
-                      <a:pPr algn="ctr" fontAlgn="ctr"/>
-                      <a:r>
-                        <a:rPr lang="pt-BR" sz="1400" b="0" i="0" u="none" strike="noStrike">
-                          <a:solidFill>
-                            <a:schemeClr val="tx1"/>
-                          </a:solidFill>
-                          <a:latin typeface="Calibri"/>
-                        </a:rPr>
-                        <a:t>14/out</a:t>
-                      </a:r>
-                    </a:p>
-                  </a:txBody>
-                  <a:tcPr marL="9525" marR="9525" marT="9525" marB="0" anchor="ctr">
-                    <a:lnL w="12700" cap="flat" cmpd="sng" algn="ctr">
-                      <a:solidFill>
-                        <a:schemeClr val="tx1"/>
-                      </a:solidFill>
-                      <a:prstDash val="solid"/>
-                      <a:round/>
-                      <a:headEnd type="none" w="med" len="med"/>
-                      <a:tailEnd type="none" w="med" len="med"/>
-                    </a:lnL>
-                    <a:lnR w="12700" cap="flat" cmpd="sng" algn="ctr">
-                      <a:solidFill>
-                        <a:schemeClr val="tx1"/>
-                      </a:solidFill>
-                      <a:prstDash val="solid"/>
-                      <a:round/>
-                      <a:headEnd type="none" w="med" len="med"/>
-                      <a:tailEnd type="none" w="med" len="med"/>
-                    </a:lnR>
-                    <a:lnT w="12700" cap="flat" cmpd="sng" algn="ctr">
-                      <a:solidFill>
-                        <a:schemeClr val="tx1"/>
-                      </a:solidFill>
-                      <a:prstDash val="solid"/>
-                      <a:round/>
-                      <a:headEnd type="none" w="med" len="med"/>
-                      <a:tailEnd type="none" w="med" len="med"/>
-                    </a:lnT>
-                    <a:lnB w="12700" cap="flat" cmpd="sng" algn="ctr">
-                      <a:solidFill>
-                        <a:schemeClr val="tx1"/>
-                      </a:solidFill>
-                      <a:prstDash val="solid"/>
-                      <a:round/>
-                      <a:headEnd type="none" w="med" len="med"/>
-                      <a:tailEnd type="none" w="med" len="med"/>
-                    </a:lnB>
-                  </a:tcPr>
-                </a:tc>
-                <a:tc>
-                  <a:txBody>
-                    <a:bodyPr/>
-                    <a:lstStyle/>
-                    <a:p>
-                      <a:pPr algn="l" fontAlgn="b"/>
-                      <a:r>
-                        <a:rPr lang="pt-BR" sz="1400" b="0" i="0" u="none" strike="noStrike" dirty="0" smtClean="0">
-                          <a:solidFill>
-                            <a:schemeClr val="tx1"/>
-                          </a:solidFill>
-                          <a:latin typeface="Calibri"/>
-                        </a:rPr>
-                        <a:t>5º relatório</a:t>
-                      </a:r>
-                      <a:endParaRPr lang="pt-BR" sz="1400" b="0" i="0" u="none" strike="noStrike" dirty="0">
-                        <a:solidFill>
-                          <a:schemeClr val="tx1"/>
-                        </a:solidFill>
-                        <a:latin typeface="Calibri"/>
-                      </a:endParaRPr>
-                    </a:p>
-                  </a:txBody>
-                  <a:tcPr marL="9525" marR="9525" marT="9525" marB="0" anchor="b">
-                    <a:lnL w="12700" cap="flat" cmpd="sng" algn="ctr">
-                      <a:solidFill>
-                        <a:schemeClr val="tx1"/>
-                      </a:solidFill>
-                      <a:prstDash val="solid"/>
-                      <a:round/>
-                      <a:headEnd type="none" w="med" len="med"/>
-                      <a:tailEnd type="none" w="med" len="med"/>
-                    </a:lnL>
-                    <a:lnR w="12700" cap="flat" cmpd="sng" algn="ctr">
-                      <a:solidFill>
-                        <a:schemeClr val="tx1"/>
-                      </a:solidFill>
-                      <a:prstDash val="solid"/>
-                      <a:round/>
-                      <a:headEnd type="none" w="med" len="med"/>
-                      <a:tailEnd type="none" w="med" len="med"/>
-                    </a:lnR>
-                    <a:lnT w="12700" cap="flat" cmpd="sng" algn="ctr">
-                      <a:solidFill>
-                        <a:schemeClr val="tx1"/>
-                      </a:solidFill>
-                      <a:prstDash val="solid"/>
-                      <a:round/>
-                      <a:headEnd type="none" w="med" len="med"/>
-                      <a:tailEnd type="none" w="med" len="med"/>
-                    </a:lnT>
-                    <a:lnB w="12700" cap="flat" cmpd="sng" algn="ctr">
-                      <a:solidFill>
-                        <a:schemeClr val="tx1"/>
-                      </a:solidFill>
-                      <a:prstDash val="solid"/>
-                      <a:round/>
-                      <a:headEnd type="none" w="med" len="med"/>
-                      <a:tailEnd type="none" w="med" len="med"/>
-                    </a:lnB>
-                  </a:tcPr>
-                </a:tc>
-              </a:tr>
-              <a:tr h="328036">
-                <a:tc>
-                  <a:txBody>
-                    <a:bodyPr/>
-                    <a:lstStyle/>
-                    <a:p>
-                      <a:pPr algn="ctr" fontAlgn="ctr"/>
-                      <a:r>
-                        <a:rPr lang="pt-BR" sz="1400" b="0" i="0" u="none" strike="noStrike">
-                          <a:solidFill>
-                            <a:schemeClr val="tx1"/>
-                          </a:solidFill>
-                          <a:latin typeface="Calibri"/>
-                        </a:rPr>
-                        <a:t>21/out</a:t>
-                      </a:r>
-                    </a:p>
-                  </a:txBody>
-                  <a:tcPr marL="9525" marR="9525" marT="9525" marB="0" anchor="ctr">
-                    <a:lnL w="12700" cap="flat" cmpd="sng" algn="ctr">
-                      <a:solidFill>
-                        <a:schemeClr val="tx1"/>
-                      </a:solidFill>
-                      <a:prstDash val="solid"/>
-                      <a:round/>
-                      <a:headEnd type="none" w="med" len="med"/>
-                      <a:tailEnd type="none" w="med" len="med"/>
-                    </a:lnL>
-                    <a:lnR w="12700" cap="flat" cmpd="sng" algn="ctr">
-                      <a:solidFill>
-                        <a:schemeClr val="tx1"/>
-                      </a:solidFill>
-                      <a:prstDash val="solid"/>
-                      <a:round/>
-                      <a:headEnd type="none" w="med" len="med"/>
-                      <a:tailEnd type="none" w="med" len="med"/>
-                    </a:lnR>
-                    <a:lnT w="12700" cap="flat" cmpd="sng" algn="ctr">
-                      <a:solidFill>
-                        <a:schemeClr val="tx1"/>
-                      </a:solidFill>
-                      <a:prstDash val="solid"/>
-                      <a:round/>
-                      <a:headEnd type="none" w="med" len="med"/>
-                      <a:tailEnd type="none" w="med" len="med"/>
-                    </a:lnT>
-                    <a:lnB w="12700" cap="flat" cmpd="sng" algn="ctr">
-                      <a:solidFill>
-                        <a:schemeClr val="tx1"/>
-                      </a:solidFill>
-                      <a:prstDash val="solid"/>
-                      <a:round/>
-                      <a:headEnd type="none" w="med" len="med"/>
-                      <a:tailEnd type="none" w="med" len="med"/>
-                    </a:lnB>
-                  </a:tcPr>
-                </a:tc>
-                <a:tc>
-                  <a:txBody>
-                    <a:bodyPr/>
-                    <a:lstStyle/>
-                    <a:p>
-                      <a:pPr algn="l" fontAlgn="b"/>
-                      <a:r>
-                        <a:rPr lang="pt-BR" sz="1400" b="0" i="0" u="none" strike="noStrike" dirty="0">
-                          <a:solidFill>
-                            <a:schemeClr val="tx1"/>
-                          </a:solidFill>
-                          <a:latin typeface="Calibri"/>
-                        </a:rPr>
-                        <a:t>6º relatório</a:t>
-                      </a:r>
-                    </a:p>
-                  </a:txBody>
-                  <a:tcPr marL="9525" marR="9525" marT="9525" marB="0" anchor="b">
-                    <a:lnL w="12700" cap="flat" cmpd="sng" algn="ctr">
-                      <a:solidFill>
-                        <a:schemeClr val="tx1"/>
-                      </a:solidFill>
-                      <a:prstDash val="solid"/>
-                      <a:round/>
-                      <a:headEnd type="none" w="med" len="med"/>
-                      <a:tailEnd type="none" w="med" len="med"/>
-                    </a:lnL>
-                    <a:lnR w="12700" cap="flat" cmpd="sng" algn="ctr">
-                      <a:solidFill>
-                        <a:schemeClr val="tx1"/>
-                      </a:solidFill>
-                      <a:prstDash val="solid"/>
-                      <a:round/>
-                      <a:headEnd type="none" w="med" len="med"/>
-                      <a:tailEnd type="none" w="med" len="med"/>
-                    </a:lnR>
-                    <a:lnT w="12700" cap="flat" cmpd="sng" algn="ctr">
-                      <a:solidFill>
-                        <a:schemeClr val="tx1"/>
-                      </a:solidFill>
-                      <a:prstDash val="solid"/>
-                      <a:round/>
-                      <a:headEnd type="none" w="med" len="med"/>
-                      <a:tailEnd type="none" w="med" len="med"/>
-                    </a:lnT>
-                    <a:lnB w="12700" cap="flat" cmpd="sng" algn="ctr">
-                      <a:solidFill>
-                        <a:schemeClr val="tx1"/>
-                      </a:solidFill>
-                      <a:prstDash val="solid"/>
-                      <a:round/>
-                      <a:headEnd type="none" w="med" len="med"/>
-                      <a:tailEnd type="none" w="med" len="med"/>
-                    </a:lnB>
-                  </a:tcPr>
-                </a:tc>
-              </a:tr>
-              <a:tr h="328036">
-                <a:tc>
-                  <a:txBody>
-                    <a:bodyPr/>
-                    <a:lstStyle/>
-                    <a:p>
-                      <a:pPr algn="ctr" fontAlgn="ctr"/>
-                      <a:r>
-                        <a:rPr lang="pt-BR" sz="1400" b="0" i="0" u="none" strike="noStrike">
-                          <a:solidFill>
-                            <a:schemeClr val="tx1"/>
-                          </a:solidFill>
-                          <a:latin typeface="Calibri"/>
-                        </a:rPr>
-                        <a:t>26/out</a:t>
-                      </a:r>
-                    </a:p>
-                  </a:txBody>
-                  <a:tcPr marL="9525" marR="9525" marT="9525" marB="0" anchor="ctr">
-                    <a:lnL w="12700" cap="flat" cmpd="sng" algn="ctr">
-                      <a:solidFill>
-                        <a:schemeClr val="tx1"/>
-                      </a:solidFill>
-                      <a:prstDash val="solid"/>
-                      <a:round/>
-                      <a:headEnd type="none" w="med" len="med"/>
-                      <a:tailEnd type="none" w="med" len="med"/>
-                    </a:lnL>
-                    <a:lnR w="12700" cap="flat" cmpd="sng" algn="ctr">
-                      <a:solidFill>
-                        <a:schemeClr val="tx1"/>
-                      </a:solidFill>
-                      <a:prstDash val="solid"/>
-                      <a:round/>
-                      <a:headEnd type="none" w="med" len="med"/>
-                      <a:tailEnd type="none" w="med" len="med"/>
-                    </a:lnR>
-                    <a:lnT w="12700" cap="flat" cmpd="sng" algn="ctr">
-                      <a:solidFill>
-                        <a:schemeClr val="tx1"/>
-                      </a:solidFill>
-                      <a:prstDash val="solid"/>
-                      <a:round/>
-                      <a:headEnd type="none" w="med" len="med"/>
-                      <a:tailEnd type="none" w="med" len="med"/>
-                    </a:lnT>
-                    <a:lnB w="12700" cap="flat" cmpd="sng" algn="ctr">
-                      <a:solidFill>
-                        <a:schemeClr val="tx1"/>
-                      </a:solidFill>
-                      <a:prstDash val="solid"/>
-                      <a:round/>
-                      <a:headEnd type="none" w="med" len="med"/>
-                      <a:tailEnd type="none" w="med" len="med"/>
-                    </a:lnB>
-                  </a:tcPr>
-                </a:tc>
-                <a:tc>
-                  <a:txBody>
-                    <a:bodyPr/>
-                    <a:lstStyle/>
-                    <a:p>
-                      <a:pPr algn="l" fontAlgn="b"/>
-                      <a:r>
-                        <a:rPr lang="pt-BR" sz="1400" b="0" i="0" u="none" strike="noStrike" dirty="0" smtClean="0">
-                          <a:solidFill>
-                            <a:schemeClr val="tx1"/>
-                          </a:solidFill>
-                          <a:latin typeface="Calibri"/>
-                        </a:rPr>
-                        <a:t>7º relatório</a:t>
-                      </a:r>
-                      <a:endParaRPr lang="pt-BR" sz="1400" b="0" i="0" u="none" strike="noStrike" dirty="0">
-                        <a:solidFill>
-                          <a:schemeClr val="tx1"/>
-                        </a:solidFill>
-                        <a:latin typeface="Calibri"/>
-                      </a:endParaRPr>
-                    </a:p>
-                  </a:txBody>
-                  <a:tcPr marL="9525" marR="9525" marT="9525" marB="0" anchor="b">
-                    <a:lnL w="12700" cap="flat" cmpd="sng" algn="ctr">
-                      <a:solidFill>
-                        <a:schemeClr val="tx1"/>
-                      </a:solidFill>
-                      <a:prstDash val="solid"/>
-                      <a:round/>
-                      <a:headEnd type="none" w="med" len="med"/>
-                      <a:tailEnd type="none" w="med" len="med"/>
-                    </a:lnL>
-                    <a:lnR w="12700" cap="flat" cmpd="sng" algn="ctr">
-                      <a:solidFill>
-                        <a:schemeClr val="tx1"/>
-                      </a:solidFill>
-                      <a:prstDash val="solid"/>
-                      <a:round/>
-                      <a:headEnd type="none" w="med" len="med"/>
-                      <a:tailEnd type="none" w="med" len="med"/>
-                    </a:lnR>
-                    <a:lnT w="12700" cap="flat" cmpd="sng" algn="ctr">
-                      <a:solidFill>
-                        <a:schemeClr val="tx1"/>
-                      </a:solidFill>
-                      <a:prstDash val="solid"/>
-                      <a:round/>
-                      <a:headEnd type="none" w="med" len="med"/>
-                      <a:tailEnd type="none" w="med" len="med"/>
-                    </a:lnT>
-                    <a:lnB w="12700" cap="flat" cmpd="sng" algn="ctr">
-                      <a:solidFill>
-                        <a:schemeClr val="tx1"/>
-                      </a:solidFill>
-                      <a:prstDash val="solid"/>
-                      <a:round/>
-                      <a:headEnd type="none" w="med" len="med"/>
-                      <a:tailEnd type="none" w="med" len="med"/>
-                    </a:lnB>
-                  </a:tcPr>
-                </a:tc>
-              </a:tr>
-              <a:tr h="328036">
-                <a:tc>
-                  <a:txBody>
-                    <a:bodyPr/>
-                    <a:lstStyle/>
-                    <a:p>
-                      <a:pPr algn="ctr" fontAlgn="ctr"/>
-                      <a:r>
-                        <a:rPr lang="pt-BR" sz="1400" b="0" i="0" u="none" strike="noStrike" dirty="0">
-                          <a:solidFill>
-                            <a:schemeClr val="tx1"/>
-                          </a:solidFill>
-                          <a:latin typeface="Calibri"/>
-                        </a:rPr>
-                        <a:t>03/dez</a:t>
-                      </a:r>
-                    </a:p>
-                  </a:txBody>
-                  <a:tcPr marL="9525" marR="9525" marT="9525" marB="0" anchor="ctr">
-                    <a:lnL w="12700" cap="flat" cmpd="sng" algn="ctr">
-                      <a:solidFill>
-                        <a:schemeClr val="tx1"/>
-                      </a:solidFill>
-                      <a:prstDash val="solid"/>
-                      <a:round/>
-                      <a:headEnd type="none" w="med" len="med"/>
-                      <a:tailEnd type="none" w="med" len="med"/>
-                    </a:lnL>
-                    <a:lnR w="12700" cap="flat" cmpd="sng" algn="ctr">
-                      <a:solidFill>
-                        <a:schemeClr val="tx1"/>
-                      </a:solidFill>
-                      <a:prstDash val="solid"/>
-                      <a:round/>
-                      <a:headEnd type="none" w="med" len="med"/>
-                      <a:tailEnd type="none" w="med" len="med"/>
-                    </a:lnR>
-                    <a:lnT w="12700" cap="flat" cmpd="sng" algn="ctr">
-                      <a:solidFill>
-                        <a:schemeClr val="tx1"/>
-                      </a:solidFill>
-                      <a:prstDash val="solid"/>
-                      <a:round/>
-                      <a:headEnd type="none" w="med" len="med"/>
-                      <a:tailEnd type="none" w="med" len="med"/>
-                    </a:lnT>
-                    <a:lnB w="12700" cap="flat" cmpd="sng" algn="ctr">
-                      <a:solidFill>
-                        <a:schemeClr val="tx1"/>
-                      </a:solidFill>
-                      <a:prstDash val="solid"/>
-                      <a:round/>
-                      <a:headEnd type="none" w="med" len="med"/>
-                      <a:tailEnd type="none" w="med" len="med"/>
-                    </a:lnB>
-                  </a:tcPr>
-                </a:tc>
-                <a:tc>
-                  <a:txBody>
-                    <a:bodyPr/>
-                    <a:lstStyle/>
-                    <a:p>
-                      <a:pPr algn="l" fontAlgn="b"/>
-                      <a:r>
-                        <a:rPr lang="pt-BR" sz="1400" b="0" i="0" u="none" strike="noStrike" dirty="0">
-                          <a:solidFill>
-                            <a:schemeClr val="tx1"/>
-                          </a:solidFill>
-                          <a:latin typeface="Calibri"/>
-                        </a:rPr>
-                        <a:t>Apresentação</a:t>
-                      </a:r>
-                    </a:p>
-                  </a:txBody>
-                  <a:tcPr marL="9525" marR="9525" marT="9525" marB="0" anchor="b">
-                    <a:lnL w="12700" cap="flat" cmpd="sng" algn="ctr">
-                      <a:solidFill>
-                        <a:schemeClr val="tx1"/>
-                      </a:solidFill>
-                      <a:prstDash val="solid"/>
-                      <a:round/>
-                      <a:headEnd type="none" w="med" len="med"/>
-                      <a:tailEnd type="none" w="med" len="med"/>
-                    </a:lnL>
-                    <a:lnR w="12700" cap="flat" cmpd="sng" algn="ctr">
-                      <a:solidFill>
-                        <a:schemeClr val="tx1"/>
-                      </a:solidFill>
-                      <a:prstDash val="solid"/>
-                      <a:round/>
-                      <a:headEnd type="none" w="med" len="med"/>
-                      <a:tailEnd type="none" w="med" len="med"/>
-                    </a:lnR>
-                    <a:lnT w="12700" cap="flat" cmpd="sng" algn="ctr">
-                      <a:solidFill>
-                        <a:schemeClr val="tx1"/>
-                      </a:solidFill>
-                      <a:prstDash val="solid"/>
-                      <a:round/>
-                      <a:headEnd type="none" w="med" len="med"/>
-                      <a:tailEnd type="none" w="med" len="med"/>
-                    </a:lnT>
-                    <a:lnB w="12700" cap="flat" cmpd="sng" algn="ctr">
-                      <a:solidFill>
-                        <a:schemeClr val="tx1"/>
-                      </a:solidFill>
-                      <a:prstDash val="solid"/>
-                      <a:round/>
-                      <a:headEnd type="none" w="med" len="med"/>
-                      <a:tailEnd type="none" w="med" len="med"/>
-                    </a:lnB>
-                  </a:tcPr>
-                </a:tc>
-              </a:tr>
-            </a:tbl>
-          </a:graphicData>
-        </a:graphic>
-      </p:graphicFrame>
+          <a:p>
+            <a:endParaRPr lang="pt-BR" dirty="0"/>
+          </a:p>
+        </p:txBody>
+      </p:sp>
     </p:spTree>
+    <p:extLst>
+      <p:ext uri="{BB962C8B-B14F-4D97-AF65-F5344CB8AC3E}">
+        <p14:creationId xmlns:p14="http://schemas.microsoft.com/office/powerpoint/2010/main" val="3869426843"/>
+      </p:ext>
+    </p:extLst>
   </p:cSld>
   <p:clrMapOvr>
     <a:masterClrMapping/>
   </p:clrMapOvr>
+  <p:timing>
+    <p:tnLst>
+      <p:par>
+        <p:cTn xmlns:p14="http://schemas.microsoft.com/office/powerpoint/2010/main" id="1" dur="indefinite" restart="never" nodeType="tmRoot"/>
+      </p:par>
+    </p:tnLst>
+  </p:timing>
 </p:sld>
 </file>
 
@@ -8189,8 +7134,8 @@
         </p:nvSpPr>
         <p:spPr>
           <a:xfrm>
-            <a:off x="539552" y="692696"/>
-            <a:ext cx="7772400" cy="1470025"/>
+            <a:off x="395536" y="332656"/>
+            <a:ext cx="7772400" cy="1440160"/>
           </a:xfrm>
         </p:spPr>
         <p:txBody>
@@ -8199,85 +7144,170 @@
           <a:p>
             <a:r>
               <a:rPr lang="pt-BR" sz="6000" dirty="0" smtClean="0"/>
-              <a:t>Dificuldades enfrentadas</a:t>
+              <a:t>Alguns exemplos</a:t>
             </a:r>
             <a:endParaRPr lang="pt-BR" sz="6000" dirty="0"/>
           </a:p>
         </p:txBody>
       </p:sp>
-      <p:sp>
-        <p:nvSpPr>
-          <p:cNvPr id="4" name="CaixaDeTexto 3"/>
-          <p:cNvSpPr txBox="1"/>
+      <p:pic>
+        <p:nvPicPr>
+          <p:cNvPr id="3" name="Picture 2" descr="Captura de Tela 2013-12-03 às 00.11.31.png"/>
+          <p:cNvPicPr>
+            <a:picLocks noChangeAspect="1"/>
+          </p:cNvPicPr>
           <p:nvPr/>
-        </p:nvSpPr>
+        </p:nvPicPr>
+        <p:blipFill>
+          <a:blip r:embed="rId2">
+            <a:extLst>
+              <a:ext uri="{28A0092B-C50C-407E-A947-70E740481C1C}">
+                <a14:useLocalDpi xmlns:a14="http://schemas.microsoft.com/office/drawing/2010/main" val="0"/>
+              </a:ext>
+            </a:extLst>
+          </a:blip>
+          <a:stretch>
+            <a:fillRect/>
+          </a:stretch>
+        </p:blipFill>
         <p:spPr>
           <a:xfrm>
-            <a:off x="827584" y="3140968"/>
-            <a:ext cx="7632848" cy="2677656"/>
+            <a:off x="0" y="3356992"/>
+            <a:ext cx="3797300" cy="3136900"/>
           </a:xfrm>
           <a:prstGeom prst="rect">
             <a:avLst/>
           </a:prstGeom>
-          <a:noFill/>
+          <a:ln>
+            <a:noFill/>
+          </a:ln>
+          <a:effectLst>
+            <a:reflection blurRad="12700" stA="30000" endPos="30000" dist="5000" dir="5400000" sy="-100000" algn="bl" rotWithShape="0"/>
+          </a:effectLst>
+          <a:scene3d>
+            <a:camera prst="perspectiveContrastingLeftFacing">
+              <a:rot lat="300000" lon="19800000" rev="0"/>
+            </a:camera>
+            <a:lightRig rig="threePt" dir="t">
+              <a:rot lat="0" lon="0" rev="2700000"/>
+            </a:lightRig>
+          </a:scene3d>
+          <a:sp3d>
+            <a:bevelT w="63500" h="50800"/>
+          </a:sp3d>
         </p:spPr>
-        <p:txBody>
-          <a:bodyPr wrap="square" rtlCol="0">
-            <a:spAutoFit/>
-          </a:bodyPr>
-          <a:lstStyle/>
-          <a:p>
-            <a:pPr marL="285750" indent="-285750">
-              <a:buFontTx/>
-              <a:buChar char="-"/>
-            </a:pPr>
-            <a:r>
-              <a:rPr lang="pt-BR" sz="2400" dirty="0" smtClean="0"/>
-              <a:t>Aplicação dos conceitos aprendidos na disciplina para o contexto do trabalho.</a:t>
-            </a:r>
-          </a:p>
-          <a:p>
-            <a:endParaRPr lang="pt-BR" sz="2400" dirty="0" smtClean="0"/>
-          </a:p>
-          <a:p>
-            <a:pPr marL="285750" indent="-285750">
-              <a:buFontTx/>
-              <a:buChar char="-"/>
-            </a:pPr>
-            <a:r>
-              <a:rPr lang="pt-BR" sz="2400" dirty="0" smtClean="0"/>
-              <a:t>Entendimento de como funciona um sistema para controle </a:t>
-            </a:r>
-            <a:r>
-              <a:rPr lang="pt-BR" sz="2400" smtClean="0"/>
-              <a:t>de voo e </a:t>
-            </a:r>
-            <a:r>
-              <a:rPr lang="pt-BR" sz="2400" dirty="0" smtClean="0"/>
-              <a:t>as nomenclaturas.</a:t>
-            </a:r>
-          </a:p>
-          <a:p>
-            <a:endParaRPr lang="pt-BR" sz="2400" dirty="0" smtClean="0"/>
-          </a:p>
-          <a:p>
-            <a:pPr marL="285750" indent="-285750">
-              <a:buFontTx/>
-              <a:buChar char="-"/>
-            </a:pPr>
-            <a:r>
-              <a:rPr lang="pt-BR" sz="2400" dirty="0" smtClean="0"/>
-              <a:t>Outras...</a:t>
-            </a:r>
-            <a:endParaRPr lang="pt-BR" sz="2400" dirty="0"/>
-          </a:p>
-        </p:txBody>
-      </p:sp>
+      </p:pic>
+      <p:pic>
+        <p:nvPicPr>
+          <p:cNvPr id="4" name="Picture 3" descr="Captura de Tela 2013-12-03 às 00.11.52.png"/>
+          <p:cNvPicPr>
+            <a:picLocks noChangeAspect="1"/>
+          </p:cNvPicPr>
+          <p:nvPr/>
+        </p:nvPicPr>
+        <p:blipFill>
+          <a:blip r:embed="rId3">
+            <a:extLst>
+              <a:ext uri="{28A0092B-C50C-407E-A947-70E740481C1C}">
+                <a14:useLocalDpi xmlns:a14="http://schemas.microsoft.com/office/drawing/2010/main" val="0"/>
+              </a:ext>
+            </a:extLst>
+          </a:blip>
+          <a:stretch>
+            <a:fillRect/>
+          </a:stretch>
+        </p:blipFill>
+        <p:spPr>
+          <a:xfrm>
+            <a:off x="3419872" y="2060848"/>
+            <a:ext cx="2832472" cy="4456631"/>
+          </a:xfrm>
+          <a:prstGeom prst="rect">
+            <a:avLst/>
+          </a:prstGeom>
+          <a:ln>
+            <a:noFill/>
+          </a:ln>
+          <a:effectLst>
+            <a:reflection blurRad="12700" stA="30000" endPos="30000" dist="5000" dir="5400000" sy="-100000" algn="bl" rotWithShape="0"/>
+          </a:effectLst>
+          <a:scene3d>
+            <a:camera prst="perspectiveContrastingLeftFacing">
+              <a:rot lat="300000" lon="19800000" rev="0"/>
+            </a:camera>
+            <a:lightRig rig="threePt" dir="t">
+              <a:rot lat="0" lon="0" rev="2700000"/>
+            </a:lightRig>
+          </a:scene3d>
+          <a:sp3d>
+            <a:bevelT w="63500" h="50800"/>
+          </a:sp3d>
+        </p:spPr>
+      </p:pic>
+      <p:pic>
+        <p:nvPicPr>
+          <p:cNvPr id="5" name="Picture 4" descr="Captura de Tela 2013-12-03 às 00.12.19.png"/>
+          <p:cNvPicPr>
+            <a:picLocks noChangeAspect="1"/>
+          </p:cNvPicPr>
+          <p:nvPr/>
+        </p:nvPicPr>
+        <p:blipFill>
+          <a:blip r:embed="rId4">
+            <a:extLst>
+              <a:ext uri="{28A0092B-C50C-407E-A947-70E740481C1C}">
+                <a14:useLocalDpi xmlns:a14="http://schemas.microsoft.com/office/drawing/2010/main" val="0"/>
+              </a:ext>
+            </a:extLst>
+          </a:blip>
+          <a:stretch>
+            <a:fillRect/>
+          </a:stretch>
+        </p:blipFill>
+        <p:spPr>
+          <a:xfrm>
+            <a:off x="6253352" y="1988840"/>
+            <a:ext cx="2890648" cy="4581128"/>
+          </a:xfrm>
+          <a:prstGeom prst="rect">
+            <a:avLst/>
+          </a:prstGeom>
+          <a:ln>
+            <a:noFill/>
+          </a:ln>
+          <a:effectLst>
+            <a:reflection blurRad="12700" stA="30000" endPos="30000" dist="5000" dir="5400000" sy="-100000" algn="bl" rotWithShape="0"/>
+          </a:effectLst>
+          <a:scene3d>
+            <a:camera prst="perspectiveContrastingLeftFacing">
+              <a:rot lat="300000" lon="19800000" rev="0"/>
+            </a:camera>
+            <a:lightRig rig="threePt" dir="t">
+              <a:rot lat="0" lon="0" rev="2700000"/>
+            </a:lightRig>
+          </a:scene3d>
+          <a:sp3d>
+            <a:bevelT w="63500" h="50800"/>
+          </a:sp3d>
+        </p:spPr>
+      </p:pic>
     </p:spTree>
+    <p:extLst>
+      <p:ext uri="{BB962C8B-B14F-4D97-AF65-F5344CB8AC3E}">
+        <p14:creationId xmlns:p14="http://schemas.microsoft.com/office/powerpoint/2010/main" val="971431686"/>
+      </p:ext>
+    </p:extLst>
   </p:cSld>
   <p:clrMapOvr>
     <a:masterClrMapping/>
   </p:clrMapOvr>
+  <p:timing>
+    <p:tnLst>
+      <p:par>
+        <p:cTn xmlns:p14="http://schemas.microsoft.com/office/powerpoint/2010/main" id="1" dur="indefinite" restart="never" nodeType="tmRoot"/>
+      </p:par>
+    </p:tnLst>
+  </p:timing>
 </p:sld>
 </file>
 
@@ -8310,8 +7340,8 @@
         </p:nvSpPr>
         <p:spPr>
           <a:xfrm>
-            <a:off x="253752" y="44624"/>
-            <a:ext cx="7772400" cy="1470025"/>
+            <a:off x="395536" y="332656"/>
+            <a:ext cx="7772400" cy="1800200"/>
           </a:xfrm>
         </p:spPr>
         <p:txBody>
@@ -8320,55 +7350,26 @@
           <a:p>
             <a:r>
               <a:rPr lang="pt-BR" sz="6000" dirty="0" smtClean="0"/>
-              <a:t>Resultados obtidos</a:t>
+              <a:t>Introdu</a:t>
+            </a:r>
+            <a:r>
+              <a:rPr lang="pt-BR" sz="6000" dirty="0" smtClean="0"/>
+              <a:t>ção e Motivação</a:t>
             </a:r>
             <a:endParaRPr lang="pt-BR" sz="6000" dirty="0"/>
           </a:p>
         </p:txBody>
       </p:sp>
-      <p:pic>
-        <p:nvPicPr>
-          <p:cNvPr id="16385" name="Picture 1"/>
-          <p:cNvPicPr>
-            <a:picLocks noChangeAspect="1" noChangeArrowheads="1"/>
-          </p:cNvPicPr>
-          <p:nvPr/>
-        </p:nvPicPr>
-        <p:blipFill>
-          <a:blip r:embed="rId2" cstate="print"/>
-          <a:srcRect/>
-          <a:stretch>
-            <a:fillRect/>
-          </a:stretch>
-        </p:blipFill>
-        <p:spPr bwMode="auto">
-          <a:xfrm>
-            <a:off x="253752" y="1700807"/>
-            <a:ext cx="5110336" cy="4522763"/>
-          </a:xfrm>
-          <a:prstGeom prst="rect">
-            <a:avLst/>
-          </a:prstGeom>
-          <a:noFill/>
-          <a:ln w="9525">
-            <a:noFill/>
-            <a:miter lim="800000"/>
-            <a:headEnd/>
-            <a:tailEnd/>
-          </a:ln>
-          <a:effectLst/>
-        </p:spPr>
-      </p:pic>
-      <p:sp>
-        <p:nvSpPr>
-          <p:cNvPr id="6" name="CaixaDeTexto 5"/>
+      <p:sp>
+        <p:nvSpPr>
+          <p:cNvPr id="8" name="CaixaDeTexto 7"/>
           <p:cNvSpPr txBox="1"/>
           <p:nvPr/>
         </p:nvSpPr>
         <p:spPr>
           <a:xfrm>
-            <a:off x="5617857" y="5589240"/>
-            <a:ext cx="3259226" cy="369332"/>
+            <a:off x="395536" y="2348880"/>
+            <a:ext cx="3384376" cy="2031325"/>
           </a:xfrm>
           <a:prstGeom prst="rect">
             <a:avLst/>
@@ -8376,32 +7377,100 @@
           <a:noFill/>
         </p:spPr>
         <p:txBody>
-          <a:bodyPr wrap="none" rtlCol="0">
+          <a:bodyPr wrap="square" rtlCol="0">
             <a:spAutoFit/>
           </a:bodyPr>
           <a:lstStyle/>
           <a:p>
+            <a:pPr marL="285750" indent="-285750">
+              <a:buFontTx/>
+              <a:buChar char="-"/>
+            </a:pPr>
             <a:r>
               <a:rPr lang="pt-BR" dirty="0" smtClean="0"/>
-              <a:t>Fig. 01 </a:t>
+              <a:t>Motiv</a:t>
             </a:r>
             <a:r>
               <a:rPr lang="pt-BR" dirty="0" smtClean="0"/>
-              <a:t>modelagem em </a:t>
-            </a:r>
-            <a:r>
-              <a:rPr lang="pt-BR" dirty="0" err="1" smtClean="0"/>
-              <a:t>Uml</a:t>
-            </a:r>
+              <a:t>ação: limitação nos recursos oferecidos por esses serviços, principalmente nos sites das empresas brasileiras.</a:t>
+            </a:r>
+          </a:p>
+          <a:p>
+            <a:pPr marL="742950" lvl="1" indent="-285750">
+              <a:buFontTx/>
+              <a:buChar char="-"/>
+            </a:pPr>
             <a:endParaRPr lang="pt-BR" dirty="0"/>
           </a:p>
-        </p:txBody>
-      </p:sp>
+          <a:p>
+            <a:endParaRPr lang="pt-BR" dirty="0"/>
+          </a:p>
+        </p:txBody>
+      </p:sp>
+      <p:pic>
+        <p:nvPicPr>
+          <p:cNvPr id="3" name="Picture 2" descr="Captura de Tela 2013-12-03 às 00.15.55.png"/>
+          <p:cNvPicPr>
+            <a:picLocks noChangeAspect="1"/>
+          </p:cNvPicPr>
+          <p:nvPr/>
+        </p:nvPicPr>
+        <p:blipFill>
+          <a:blip r:embed="rId2">
+            <a:extLst>
+              <a:ext uri="{28A0092B-C50C-407E-A947-70E740481C1C}">
+                <a14:useLocalDpi xmlns:a14="http://schemas.microsoft.com/office/drawing/2010/main" val="0"/>
+              </a:ext>
+            </a:extLst>
+          </a:blip>
+          <a:stretch>
+            <a:fillRect/>
+          </a:stretch>
+        </p:blipFill>
+        <p:spPr>
+          <a:xfrm>
+            <a:off x="4245975" y="2348880"/>
+            <a:ext cx="3970927" cy="4320480"/>
+          </a:xfrm>
+          <a:prstGeom prst="rect">
+            <a:avLst/>
+          </a:prstGeom>
+          <a:ln>
+            <a:noFill/>
+          </a:ln>
+          <a:effectLst>
+            <a:reflection blurRad="12700" stA="30000" endPos="30000" dist="5000" dir="5400000" sy="-100000" algn="bl" rotWithShape="0"/>
+          </a:effectLst>
+          <a:scene3d>
+            <a:camera prst="perspectiveContrastingLeftFacing">
+              <a:rot lat="300000" lon="19800000" rev="0"/>
+            </a:camera>
+            <a:lightRig rig="threePt" dir="t">
+              <a:rot lat="0" lon="0" rev="2700000"/>
+            </a:lightRig>
+          </a:scene3d>
+          <a:sp3d>
+            <a:bevelT w="63500" h="50800"/>
+          </a:sp3d>
+        </p:spPr>
+      </p:pic>
     </p:spTree>
+    <p:extLst>
+      <p:ext uri="{BB962C8B-B14F-4D97-AF65-F5344CB8AC3E}">
+        <p14:creationId xmlns:p14="http://schemas.microsoft.com/office/powerpoint/2010/main" val="3958989838"/>
+      </p:ext>
+    </p:extLst>
   </p:cSld>
   <p:clrMapOvr>
     <a:masterClrMapping/>
   </p:clrMapOvr>
+  <p:timing>
+    <p:tnLst>
+      <p:par>
+        <p:cTn xmlns:p14="http://schemas.microsoft.com/office/powerpoint/2010/main" id="1" dur="indefinite" restart="never" nodeType="tmRoot"/>
+      </p:par>
+    </p:tnLst>
+  </p:timing>
 </p:sld>
 </file>
 
@@ -8434,7 +7503,7 @@
         </p:nvSpPr>
         <p:spPr>
           <a:xfrm>
-            <a:off x="467544" y="404664"/>
+            <a:off x="395536" y="332656"/>
             <a:ext cx="7772400" cy="1470025"/>
           </a:xfrm>
         </p:spPr>
@@ -8443,23 +7512,23 @@
           <a:lstStyle/>
           <a:p>
             <a:r>
-              <a:rPr lang="pt-BR" sz="6000" dirty="0" smtClean="0"/>
-              <a:t>Objetivos Futuros</a:t>
-            </a:r>
-            <a:endParaRPr lang="pt-BR" sz="6000" dirty="0"/>
-          </a:p>
-        </p:txBody>
-      </p:sp>
-      <p:sp>
-        <p:nvSpPr>
-          <p:cNvPr id="4" name="CaixaDeTexto 3"/>
+              <a:rPr lang="pt-BR" dirty="0" smtClean="0"/>
+              <a:t>Metodologia</a:t>
+            </a:r>
+            <a:endParaRPr lang="pt-BR" dirty="0"/>
+          </a:p>
+        </p:txBody>
+      </p:sp>
+      <p:sp>
+        <p:nvSpPr>
+          <p:cNvPr id="8" name="CaixaDeTexto 7"/>
           <p:cNvSpPr txBox="1"/>
           <p:nvPr/>
         </p:nvSpPr>
         <p:spPr>
           <a:xfrm>
-            <a:off x="1214414" y="3000372"/>
-            <a:ext cx="2357454" cy="2031325"/>
+            <a:off x="395536" y="2060848"/>
+            <a:ext cx="7488832" cy="3139321"/>
           </a:xfrm>
           <a:prstGeom prst="rect">
             <a:avLst/>
@@ -8472,46 +7541,957 @@
           </a:bodyPr>
           <a:lstStyle/>
           <a:p>
-            <a:pPr>
-              <a:buFont typeface="Arial" pitchFamily="34" charset="0"/>
-              <a:buChar char="•"/>
+            <a:r>
+              <a:rPr lang="pt-BR" dirty="0" smtClean="0"/>
+              <a:t>- Processo Evolutivo</a:t>
+            </a:r>
+          </a:p>
+          <a:p>
+            <a:endParaRPr lang="pt-BR" dirty="0" smtClean="0"/>
+          </a:p>
+          <a:p>
+            <a:pPr marL="285750" indent="-285750">
+              <a:buFontTx/>
+              <a:buChar char="-"/>
             </a:pPr>
             <a:r>
               <a:rPr lang="pt-BR" dirty="0" smtClean="0"/>
-              <a:t>Melhorar Teste de unidade;</a:t>
+              <a:t>Ferramentas utilizadas</a:t>
+            </a:r>
+            <a:r>
+              <a:rPr lang="pt-BR" dirty="0"/>
+              <a:t>:</a:t>
+            </a:r>
+            <a:endParaRPr lang="pt-BR" dirty="0" smtClean="0"/>
+          </a:p>
+          <a:p>
+            <a:pPr marL="742950" lvl="1" indent="-285750">
+              <a:buFontTx/>
+              <a:buChar char="-"/>
+            </a:pPr>
+            <a:r>
+              <a:rPr lang="pt-BR" dirty="0" smtClean="0"/>
+              <a:t>Eclipse (IDE).</a:t>
+            </a:r>
+            <a:endParaRPr lang="pt-BR" dirty="0" smtClean="0"/>
+          </a:p>
+          <a:p>
+            <a:pPr marL="742950" lvl="1" indent="-285750">
+              <a:buFontTx/>
+              <a:buChar char="-"/>
+            </a:pPr>
+            <a:r>
+              <a:rPr lang="pt-BR" dirty="0" err="1" smtClean="0"/>
+              <a:t>Github</a:t>
+            </a:r>
+            <a:r>
+              <a:rPr lang="pt-BR" dirty="0"/>
+              <a:t> </a:t>
+            </a:r>
+            <a:r>
+              <a:rPr lang="pt-BR" dirty="0" smtClean="0"/>
+              <a:t> (Repositório remoto)</a:t>
+            </a:r>
+            <a:r>
+              <a:rPr lang="pt-BR" dirty="0" smtClean="0"/>
+              <a:t>.</a:t>
+            </a:r>
+          </a:p>
+          <a:p>
+            <a:pPr marL="742950" lvl="1" indent="-285750">
+              <a:buFontTx/>
+              <a:buChar char="-"/>
+            </a:pPr>
+            <a:r>
+              <a:rPr lang="pt-BR" dirty="0" err="1" smtClean="0"/>
+              <a:t>JUnit</a:t>
+            </a:r>
+            <a:r>
+              <a:rPr lang="pt-BR" dirty="0"/>
+              <a:t> </a:t>
+            </a:r>
+            <a:r>
+              <a:rPr lang="pt-BR" dirty="0" smtClean="0"/>
+              <a:t>(Testes de unidade).</a:t>
+            </a:r>
+            <a:endParaRPr lang="pt-BR" dirty="0" smtClean="0"/>
+          </a:p>
+          <a:p>
+            <a:pPr marL="742950" lvl="1" indent="-285750">
+              <a:buFontTx/>
+              <a:buChar char="-"/>
+            </a:pPr>
+            <a:r>
+              <a:rPr lang="pt-BR" dirty="0" err="1" smtClean="0"/>
+              <a:t>Eclemma</a:t>
+            </a:r>
+            <a:r>
+              <a:rPr lang="pt-BR" dirty="0" smtClean="0"/>
+              <a:t> (Cobertura da parte de testes)</a:t>
+            </a:r>
+            <a:r>
+              <a:rPr lang="pt-BR" dirty="0" smtClean="0"/>
+              <a:t>.</a:t>
+            </a:r>
+          </a:p>
+          <a:p>
+            <a:pPr marL="742950" lvl="1" indent="-285750">
+              <a:buFontTx/>
+              <a:buChar char="-"/>
+            </a:pPr>
+            <a:r>
+              <a:rPr lang="pt-BR" dirty="0" err="1" smtClean="0"/>
+              <a:t>Astah</a:t>
+            </a:r>
+            <a:r>
+              <a:rPr lang="pt-BR" dirty="0" smtClean="0"/>
+              <a:t> </a:t>
+            </a:r>
+            <a:r>
+              <a:rPr lang="pt-BR" dirty="0" smtClean="0"/>
+              <a:t>(Ferramenta para a modelagem em UML)</a:t>
+            </a:r>
+            <a:r>
+              <a:rPr lang="pt-BR" dirty="0" smtClean="0"/>
+              <a:t>.</a:t>
+            </a:r>
+          </a:p>
+          <a:p>
+            <a:pPr marL="742950" lvl="1" indent="-285750">
+              <a:buFontTx/>
+              <a:buChar char="-"/>
+            </a:pPr>
+            <a:r>
+              <a:rPr lang="pt-BR" dirty="0" err="1" smtClean="0"/>
+              <a:t>WindowBuilder</a:t>
+            </a:r>
+            <a:r>
+              <a:rPr lang="pt-BR" dirty="0" smtClean="0"/>
+              <a:t> </a:t>
+            </a:r>
+            <a:r>
+              <a:rPr lang="pt-BR" dirty="0" smtClean="0"/>
+              <a:t>(Construir a interface gráfica).</a:t>
             </a:r>
           </a:p>
           <a:p>
             <a:endParaRPr lang="pt-BR" dirty="0"/>
           </a:p>
           <a:p>
-            <a:pPr>
-              <a:buFont typeface="Arial" pitchFamily="34" charset="0"/>
-              <a:buChar char="•"/>
-            </a:pPr>
+            <a:endParaRPr lang="pt-BR" dirty="0"/>
+          </a:p>
+        </p:txBody>
+      </p:sp>
+    </p:spTree>
+  </p:cSld>
+  <p:clrMapOvr>
+    <a:masterClrMapping/>
+  </p:clrMapOvr>
+  <p:timing>
+    <p:tnLst>
+      <p:par>
+        <p:cTn xmlns:p14="http://schemas.microsoft.com/office/powerpoint/2010/main" id="1" dur="indefinite" restart="never" nodeType="tmRoot"/>
+      </p:par>
+    </p:tnLst>
+  </p:timing>
+</p:sld>
+</file>
+
+<file path=ppt/slides/slide8.xml><?xml version="1.0" encoding="utf-8"?>
+<p:sld xmlns:a="http://schemas.openxmlformats.org/drawingml/2006/main" xmlns:r="http://schemas.openxmlformats.org/officeDocument/2006/relationships" xmlns:p="http://schemas.openxmlformats.org/presentationml/2006/main">
+  <p:cSld>
+    <p:spTree>
+      <p:nvGrpSpPr>
+        <p:cNvPr id="1" name=""/>
+        <p:cNvGrpSpPr/>
+        <p:nvPr/>
+      </p:nvGrpSpPr>
+      <p:grpSpPr>
+        <a:xfrm>
+          <a:off x="0" y="0"/>
+          <a:ext cx="0" cy="0"/>
+          <a:chOff x="0" y="0"/>
+          <a:chExt cx="0" cy="0"/>
+        </a:xfrm>
+      </p:grpSpPr>
+      <p:sp>
+        <p:nvSpPr>
+          <p:cNvPr id="2" name="Título 1"/>
+          <p:cNvSpPr>
+            <a:spLocks noGrp="1"/>
+          </p:cNvSpPr>
+          <p:nvPr>
+            <p:ph type="ctrTitle"/>
+          </p:nvPr>
+        </p:nvSpPr>
+        <p:spPr>
+          <a:xfrm>
+            <a:off x="323528" y="260648"/>
+            <a:ext cx="7772400" cy="1470025"/>
+          </a:xfrm>
+        </p:spPr>
+        <p:txBody>
+          <a:bodyPr/>
+          <a:lstStyle/>
+          <a:p>
             <a:r>
               <a:rPr lang="pt-BR" dirty="0" smtClean="0"/>
-              <a:t>Utilizar um banco de Dados;</a:t>
-            </a:r>
-          </a:p>
-          <a:p>
+              <a:t>Cronograma</a:t>
+            </a:r>
             <a:endParaRPr lang="pt-BR" dirty="0"/>
           </a:p>
-          <a:p>
-            <a:endParaRPr lang="pt-BR" dirty="0"/>
-          </a:p>
-        </p:txBody>
-      </p:sp>
-      <p:sp>
-        <p:nvSpPr>
-          <p:cNvPr id="6" name="CaixaDeTexto 5"/>
+        </p:txBody>
+      </p:sp>
+      <p:graphicFrame>
+        <p:nvGraphicFramePr>
+          <p:cNvPr id="5" name="Tabela 4"/>
+          <p:cNvGraphicFramePr>
+            <a:graphicFrameLocks noGrp="1"/>
+          </p:cNvGraphicFramePr>
+          <p:nvPr>
+            <p:extLst>
+              <p:ext uri="{D42A27DB-BD31-4B8C-83A1-F6EECF244321}">
+                <p14:modId xmlns:p14="http://schemas.microsoft.com/office/powerpoint/2010/main" val="1736964974"/>
+              </p:ext>
+            </p:extLst>
+          </p:nvPr>
+        </p:nvGraphicFramePr>
+        <p:xfrm>
+          <a:off x="755576" y="2924944"/>
+          <a:ext cx="3528392" cy="3240360"/>
+        </p:xfrm>
+        <a:graphic>
+          <a:graphicData uri="http://schemas.openxmlformats.org/drawingml/2006/table">
+            <a:tbl>
+              <a:tblPr>
+                <a:tableStyleId>{775DCB02-9BB8-47FD-8907-85C794F793BA}</a:tableStyleId>
+              </a:tblPr>
+              <a:tblGrid>
+                <a:gridCol w="1713061"/>
+                <a:gridCol w="1815331"/>
+              </a:tblGrid>
+              <a:tr h="483636">
+                <a:tc>
+                  <a:txBody>
+                    <a:bodyPr/>
+                    <a:lstStyle/>
+                    <a:p>
+                      <a:pPr algn="ctr" fontAlgn="b">
+                        <a:lnSpc>
+                          <a:spcPct val="100000"/>
+                        </a:lnSpc>
+                      </a:pPr>
+                      <a:r>
+                        <a:rPr lang="pt-BR" sz="1400" b="1" u="none" strike="noStrike" dirty="0"/>
+                        <a:t>Dia</a:t>
+                      </a:r>
+                      <a:endParaRPr lang="pt-BR" sz="1400" b="1" i="0" u="none" strike="noStrike" dirty="0">
+                        <a:solidFill>
+                          <a:schemeClr val="tx1"/>
+                        </a:solidFill>
+                        <a:latin typeface="Calibri"/>
+                      </a:endParaRPr>
+                    </a:p>
+                  </a:txBody>
+                  <a:tcPr marL="9525" marR="9525" marT="9525" marB="0" anchor="ctr"/>
+                </a:tc>
+                <a:tc>
+                  <a:txBody>
+                    <a:bodyPr/>
+                    <a:lstStyle/>
+                    <a:p>
+                      <a:pPr algn="ctr" fontAlgn="b">
+                        <a:lnSpc>
+                          <a:spcPct val="100000"/>
+                        </a:lnSpc>
+                      </a:pPr>
+                      <a:r>
+                        <a:rPr lang="pt-BR" sz="1400" b="1" u="none" strike="noStrike" dirty="0"/>
+                        <a:t>Atividades</a:t>
+                      </a:r>
+                      <a:endParaRPr lang="pt-BR" sz="1400" b="1" i="0" u="none" strike="noStrike" dirty="0">
+                        <a:solidFill>
+                          <a:schemeClr val="tx1"/>
+                        </a:solidFill>
+                        <a:latin typeface="Calibri"/>
+                      </a:endParaRPr>
+                    </a:p>
+                  </a:txBody>
+                  <a:tcPr marL="9525" marR="9525" marT="9525" marB="0" anchor="ctr"/>
+                </a:tc>
+              </a:tr>
+              <a:tr h="822180">
+                <a:tc>
+                  <a:txBody>
+                    <a:bodyPr/>
+                    <a:lstStyle/>
+                    <a:p>
+                      <a:pPr algn="ctr" fontAlgn="ctr">
+                        <a:lnSpc>
+                          <a:spcPct val="100000"/>
+                        </a:lnSpc>
+                      </a:pPr>
+                      <a:r>
+                        <a:rPr lang="pt-BR" sz="1400" b="1" u="none" strike="noStrike" dirty="0"/>
+                        <a:t>09/set</a:t>
+                      </a:r>
+                      <a:endParaRPr lang="pt-BR" sz="1400" b="1" i="0" u="none" strike="noStrike" dirty="0">
+                        <a:solidFill>
+                          <a:schemeClr val="tx1"/>
+                        </a:solidFill>
+                        <a:latin typeface="Calibri"/>
+                      </a:endParaRPr>
+                    </a:p>
+                  </a:txBody>
+                  <a:tcPr marL="9525" marR="9525" marT="9525" marB="0" anchor="ctr"/>
+                </a:tc>
+                <a:tc>
+                  <a:txBody>
+                    <a:bodyPr/>
+                    <a:lstStyle/>
+                    <a:p>
+                      <a:pPr algn="ctr" fontAlgn="b">
+                        <a:lnSpc>
+                          <a:spcPct val="100000"/>
+                        </a:lnSpc>
+                      </a:pPr>
+                      <a:r>
+                        <a:rPr lang="pt-BR" sz="1400" u="none" strike="noStrike" dirty="0"/>
+                        <a:t>C</a:t>
+                      </a:r>
+                      <a:r>
+                        <a:rPr lang="pt-BR" sz="1400" u="none" strike="noStrike" dirty="0" smtClean="0"/>
+                        <a:t>riação </a:t>
+                      </a:r>
+                      <a:r>
+                        <a:rPr lang="pt-BR" sz="1400" u="none" strike="noStrike" dirty="0"/>
+                        <a:t>do repositório </a:t>
+                      </a:r>
+                      <a:r>
+                        <a:rPr lang="pt-BR" sz="1400" u="none" strike="noStrike" dirty="0" err="1" smtClean="0"/>
+                        <a:t>Git</a:t>
+                      </a:r>
+                      <a:endParaRPr lang="pt-BR" sz="1400" b="0" i="0" u="none" strike="noStrike" dirty="0">
+                        <a:solidFill>
+                          <a:schemeClr val="tx1"/>
+                        </a:solidFill>
+                        <a:latin typeface="Calibri"/>
+                      </a:endParaRPr>
+                    </a:p>
+                  </a:txBody>
+                  <a:tcPr marL="9525" marR="9525" marT="9525" marB="0" anchor="ctr"/>
+                </a:tc>
+              </a:tr>
+              <a:tr h="483636">
+                <a:tc>
+                  <a:txBody>
+                    <a:bodyPr/>
+                    <a:lstStyle/>
+                    <a:p>
+                      <a:pPr algn="ctr" fontAlgn="ctr">
+                        <a:lnSpc>
+                          <a:spcPct val="100000"/>
+                        </a:lnSpc>
+                      </a:pPr>
+                      <a:r>
+                        <a:rPr lang="pt-BR" sz="1400" b="1" u="none" strike="noStrike" dirty="0"/>
+                        <a:t>12/set</a:t>
+                      </a:r>
+                      <a:endParaRPr lang="pt-BR" sz="1400" b="1" i="0" u="none" strike="noStrike" dirty="0">
+                        <a:solidFill>
+                          <a:schemeClr val="tx1"/>
+                        </a:solidFill>
+                        <a:latin typeface="Calibri"/>
+                      </a:endParaRPr>
+                    </a:p>
+                  </a:txBody>
+                  <a:tcPr marL="9525" marR="9525" marT="9525" marB="0" anchor="ctr"/>
+                </a:tc>
+                <a:tc>
+                  <a:txBody>
+                    <a:bodyPr/>
+                    <a:lstStyle/>
+                    <a:p>
+                      <a:pPr algn="ctr" fontAlgn="b">
+                        <a:lnSpc>
+                          <a:spcPct val="100000"/>
+                        </a:lnSpc>
+                      </a:pPr>
+                      <a:r>
+                        <a:rPr lang="pt-BR" sz="1400" u="none" strike="noStrike" dirty="0"/>
+                        <a:t>1º relatório</a:t>
+                      </a:r>
+                      <a:endParaRPr lang="pt-BR" sz="1400" b="0" i="0" u="none" strike="noStrike" dirty="0">
+                        <a:solidFill>
+                          <a:schemeClr val="tx1"/>
+                        </a:solidFill>
+                        <a:latin typeface="Calibri"/>
+                      </a:endParaRPr>
+                    </a:p>
+                  </a:txBody>
+                  <a:tcPr marL="9525" marR="9525" marT="9525" marB="0" anchor="ctr"/>
+                </a:tc>
+              </a:tr>
+              <a:tr h="483636">
+                <a:tc>
+                  <a:txBody>
+                    <a:bodyPr/>
+                    <a:lstStyle/>
+                    <a:p>
+                      <a:pPr algn="ctr" fontAlgn="ctr">
+                        <a:lnSpc>
+                          <a:spcPct val="100000"/>
+                        </a:lnSpc>
+                      </a:pPr>
+                      <a:r>
+                        <a:rPr lang="pt-BR" sz="1400" b="1" u="none" strike="noStrike" dirty="0"/>
+                        <a:t>18/set</a:t>
+                      </a:r>
+                      <a:endParaRPr lang="pt-BR" sz="1400" b="1" i="0" u="none" strike="noStrike" dirty="0">
+                        <a:solidFill>
+                          <a:schemeClr val="tx1"/>
+                        </a:solidFill>
+                        <a:latin typeface="Calibri"/>
+                      </a:endParaRPr>
+                    </a:p>
+                  </a:txBody>
+                  <a:tcPr marL="9525" marR="9525" marT="9525" marB="0" anchor="ctr"/>
+                </a:tc>
+                <a:tc>
+                  <a:txBody>
+                    <a:bodyPr/>
+                    <a:lstStyle/>
+                    <a:p>
+                      <a:pPr algn="ctr" fontAlgn="b">
+                        <a:lnSpc>
+                          <a:spcPct val="100000"/>
+                        </a:lnSpc>
+                      </a:pPr>
+                      <a:r>
+                        <a:rPr lang="pt-BR" sz="1400" u="none" strike="noStrike" dirty="0"/>
+                        <a:t>2º relatório</a:t>
+                      </a:r>
+                      <a:endParaRPr lang="pt-BR" sz="1400" b="0" i="0" u="none" strike="noStrike" dirty="0">
+                        <a:solidFill>
+                          <a:schemeClr val="tx1"/>
+                        </a:solidFill>
+                        <a:latin typeface="Calibri"/>
+                      </a:endParaRPr>
+                    </a:p>
+                  </a:txBody>
+                  <a:tcPr marL="9525" marR="9525" marT="9525" marB="0" anchor="ctr"/>
+                </a:tc>
+              </a:tr>
+              <a:tr h="483636">
+                <a:tc>
+                  <a:txBody>
+                    <a:bodyPr/>
+                    <a:lstStyle/>
+                    <a:p>
+                      <a:pPr algn="ctr" fontAlgn="ctr">
+                        <a:lnSpc>
+                          <a:spcPct val="100000"/>
+                        </a:lnSpc>
+                      </a:pPr>
+                      <a:r>
+                        <a:rPr lang="pt-BR" sz="1400" b="1" u="none" strike="noStrike" dirty="0"/>
+                        <a:t>29/set</a:t>
+                      </a:r>
+                      <a:endParaRPr lang="pt-BR" sz="1400" b="1" i="0" u="none" strike="noStrike" dirty="0">
+                        <a:solidFill>
+                          <a:schemeClr val="tx1"/>
+                        </a:solidFill>
+                        <a:latin typeface="Calibri"/>
+                      </a:endParaRPr>
+                    </a:p>
+                  </a:txBody>
+                  <a:tcPr marL="9525" marR="9525" marT="9525" marB="0" anchor="ctr"/>
+                </a:tc>
+                <a:tc>
+                  <a:txBody>
+                    <a:bodyPr/>
+                    <a:lstStyle/>
+                    <a:p>
+                      <a:pPr algn="ctr" fontAlgn="b">
+                        <a:lnSpc>
+                          <a:spcPct val="100000"/>
+                        </a:lnSpc>
+                      </a:pPr>
+                      <a:r>
+                        <a:rPr lang="pt-BR" sz="1400" u="none" strike="noStrike" dirty="0"/>
+                        <a:t>3º relatório</a:t>
+                      </a:r>
+                      <a:endParaRPr lang="pt-BR" sz="1400" b="0" i="0" u="none" strike="noStrike" dirty="0">
+                        <a:solidFill>
+                          <a:schemeClr val="tx1"/>
+                        </a:solidFill>
+                        <a:latin typeface="Calibri"/>
+                      </a:endParaRPr>
+                    </a:p>
+                  </a:txBody>
+                  <a:tcPr marL="9525" marR="9525" marT="9525" marB="0" anchor="ctr"/>
+                </a:tc>
+              </a:tr>
+              <a:tr h="483636">
+                <a:tc>
+                  <a:txBody>
+                    <a:bodyPr/>
+                    <a:lstStyle/>
+                    <a:p>
+                      <a:pPr algn="ctr" fontAlgn="ctr">
+                        <a:lnSpc>
+                          <a:spcPct val="100000"/>
+                        </a:lnSpc>
+                      </a:pPr>
+                      <a:r>
+                        <a:rPr lang="pt-BR" sz="1400" b="1" u="none" strike="noStrike" dirty="0"/>
+                        <a:t>07/out</a:t>
+                      </a:r>
+                      <a:endParaRPr lang="pt-BR" sz="1400" b="1" i="0" u="none" strike="noStrike" dirty="0">
+                        <a:solidFill>
+                          <a:schemeClr val="tx1"/>
+                        </a:solidFill>
+                        <a:latin typeface="Calibri"/>
+                      </a:endParaRPr>
+                    </a:p>
+                  </a:txBody>
+                  <a:tcPr marL="9525" marR="9525" marT="9525" marB="0" anchor="ctr"/>
+                </a:tc>
+                <a:tc>
+                  <a:txBody>
+                    <a:bodyPr/>
+                    <a:lstStyle/>
+                    <a:p>
+                      <a:pPr algn="ctr" fontAlgn="b">
+                        <a:lnSpc>
+                          <a:spcPct val="100000"/>
+                        </a:lnSpc>
+                      </a:pPr>
+                      <a:r>
+                        <a:rPr lang="pt-BR" sz="1400" u="none" strike="noStrike" dirty="0"/>
+                        <a:t>4º relatório</a:t>
+                      </a:r>
+                      <a:endParaRPr lang="pt-BR" sz="1400" b="0" i="0" u="none" strike="noStrike" dirty="0">
+                        <a:solidFill>
+                          <a:schemeClr val="tx1"/>
+                        </a:solidFill>
+                        <a:latin typeface="Calibri"/>
+                      </a:endParaRPr>
+                    </a:p>
+                  </a:txBody>
+                  <a:tcPr marL="9525" marR="9525" marT="9525" marB="0" anchor="ctr"/>
+                </a:tc>
+              </a:tr>
+            </a:tbl>
+          </a:graphicData>
+        </a:graphic>
+      </p:graphicFrame>
+      <p:graphicFrame>
+        <p:nvGraphicFramePr>
+          <p:cNvPr id="6" name="Tabela 5"/>
+          <p:cNvGraphicFramePr>
+            <a:graphicFrameLocks noGrp="1"/>
+          </p:cNvGraphicFramePr>
+          <p:nvPr>
+            <p:extLst>
+              <p:ext uri="{D42A27DB-BD31-4B8C-83A1-F6EECF244321}">
+                <p14:modId xmlns:p14="http://schemas.microsoft.com/office/powerpoint/2010/main" val="1668738509"/>
+              </p:ext>
+            </p:extLst>
+          </p:nvPr>
+        </p:nvGraphicFramePr>
+        <p:xfrm>
+          <a:off x="4644008" y="2924944"/>
+          <a:ext cx="3384376" cy="3240361"/>
+        </p:xfrm>
+        <a:graphic>
+          <a:graphicData uri="http://schemas.openxmlformats.org/drawingml/2006/table">
+            <a:tbl>
+              <a:tblPr>
+                <a:tableStyleId>{775DCB02-9BB8-47FD-8907-85C794F793BA}</a:tableStyleId>
+              </a:tblPr>
+              <a:tblGrid>
+                <a:gridCol w="1152885"/>
+                <a:gridCol w="2231491"/>
+              </a:tblGrid>
+              <a:tr h="511916">
+                <a:tc>
+                  <a:txBody>
+                    <a:bodyPr/>
+                    <a:lstStyle/>
+                    <a:p>
+                      <a:pPr algn="ctr" fontAlgn="b">
+                        <a:lnSpc>
+                          <a:spcPct val="100000"/>
+                        </a:lnSpc>
+                      </a:pPr>
+                      <a:r>
+                        <a:rPr lang="pt-BR" sz="1400" b="1" u="none" strike="noStrike" dirty="0" smtClean="0"/>
+                        <a:t>Dia </a:t>
+                      </a:r>
+                      <a:endParaRPr lang="pt-BR" sz="1400" b="1" i="0" u="none" strike="noStrike" dirty="0">
+                        <a:solidFill>
+                          <a:schemeClr val="tx1"/>
+                        </a:solidFill>
+                        <a:latin typeface="Calibri"/>
+                      </a:endParaRPr>
+                    </a:p>
+                  </a:txBody>
+                  <a:tcPr marL="9525" marR="9525" marT="9525" marB="0" anchor="ctr"/>
+                </a:tc>
+                <a:tc>
+                  <a:txBody>
+                    <a:bodyPr/>
+                    <a:lstStyle/>
+                    <a:p>
+                      <a:pPr algn="ctr" fontAlgn="b">
+                        <a:lnSpc>
+                          <a:spcPct val="100000"/>
+                        </a:lnSpc>
+                      </a:pPr>
+                      <a:r>
+                        <a:rPr lang="pt-BR" sz="1400" b="1" u="none" strike="noStrike" dirty="0"/>
+                        <a:t>Atividades</a:t>
+                      </a:r>
+                      <a:endParaRPr lang="pt-BR" sz="1400" b="1" i="0" u="none" strike="noStrike" dirty="0">
+                        <a:solidFill>
+                          <a:schemeClr val="tx1"/>
+                        </a:solidFill>
+                        <a:latin typeface="Calibri"/>
+                      </a:endParaRPr>
+                    </a:p>
+                  </a:txBody>
+                  <a:tcPr marL="9525" marR="9525" marT="9525" marB="0" anchor="ctr"/>
+                </a:tc>
+              </a:tr>
+              <a:tr h="680781">
+                <a:tc>
+                  <a:txBody>
+                    <a:bodyPr/>
+                    <a:lstStyle/>
+                    <a:p>
+                      <a:pPr algn="ctr" fontAlgn="ctr">
+                        <a:lnSpc>
+                          <a:spcPct val="100000"/>
+                        </a:lnSpc>
+                      </a:pPr>
+                      <a:r>
+                        <a:rPr lang="pt-BR" sz="1400" b="1" u="none" strike="noStrike" dirty="0"/>
+                        <a:t>14/out</a:t>
+                      </a:r>
+                      <a:endParaRPr lang="pt-BR" sz="1400" b="1" i="0" u="none" strike="noStrike" dirty="0">
+                        <a:solidFill>
+                          <a:schemeClr val="tx1"/>
+                        </a:solidFill>
+                        <a:latin typeface="Calibri"/>
+                      </a:endParaRPr>
+                    </a:p>
+                  </a:txBody>
+                  <a:tcPr marL="9525" marR="9525" marT="9525" marB="0" anchor="ctr"/>
+                </a:tc>
+                <a:tc>
+                  <a:txBody>
+                    <a:bodyPr/>
+                    <a:lstStyle/>
+                    <a:p>
+                      <a:pPr algn="ctr" fontAlgn="b">
+                        <a:lnSpc>
+                          <a:spcPct val="100000"/>
+                        </a:lnSpc>
+                      </a:pPr>
+                      <a:r>
+                        <a:rPr lang="pt-BR" sz="1400" u="none" strike="noStrike" dirty="0" smtClean="0"/>
+                        <a:t>Mudança </a:t>
+                      </a:r>
+                      <a:r>
+                        <a:rPr lang="pt-BR" sz="1400" u="none" strike="noStrike" dirty="0"/>
+                        <a:t>de repositório</a:t>
+                      </a:r>
+                      <a:endParaRPr lang="pt-BR" sz="1400" b="0" i="0" u="none" strike="noStrike" dirty="0">
+                        <a:solidFill>
+                          <a:schemeClr val="tx1"/>
+                        </a:solidFill>
+                        <a:latin typeface="Calibri"/>
+                      </a:endParaRPr>
+                    </a:p>
+                  </a:txBody>
+                  <a:tcPr marL="9525" marR="9525" marT="9525" marB="0" anchor="ctr"/>
+                </a:tc>
+              </a:tr>
+              <a:tr h="511916">
+                <a:tc>
+                  <a:txBody>
+                    <a:bodyPr/>
+                    <a:lstStyle/>
+                    <a:p>
+                      <a:pPr algn="ctr" fontAlgn="ctr">
+                        <a:lnSpc>
+                          <a:spcPct val="100000"/>
+                        </a:lnSpc>
+                      </a:pPr>
+                      <a:r>
+                        <a:rPr lang="pt-BR" sz="1400" b="1" u="none" strike="noStrike" dirty="0"/>
+                        <a:t>14/out</a:t>
+                      </a:r>
+                      <a:endParaRPr lang="pt-BR" sz="1400" b="1" i="0" u="none" strike="noStrike" dirty="0">
+                        <a:solidFill>
+                          <a:schemeClr val="tx1"/>
+                        </a:solidFill>
+                        <a:latin typeface="Calibri"/>
+                      </a:endParaRPr>
+                    </a:p>
+                  </a:txBody>
+                  <a:tcPr marL="9525" marR="9525" marT="9525" marB="0" anchor="ctr"/>
+                </a:tc>
+                <a:tc>
+                  <a:txBody>
+                    <a:bodyPr/>
+                    <a:lstStyle/>
+                    <a:p>
+                      <a:pPr algn="ctr" fontAlgn="b">
+                        <a:lnSpc>
+                          <a:spcPct val="100000"/>
+                        </a:lnSpc>
+                      </a:pPr>
+                      <a:r>
+                        <a:rPr lang="pt-BR" sz="1400" u="none" strike="noStrike" dirty="0" smtClean="0"/>
+                        <a:t>5º relatório</a:t>
+                      </a:r>
+                      <a:endParaRPr lang="pt-BR" sz="1400" b="0" i="0" u="none" strike="noStrike" dirty="0">
+                        <a:solidFill>
+                          <a:schemeClr val="tx1"/>
+                        </a:solidFill>
+                        <a:latin typeface="Calibri"/>
+                      </a:endParaRPr>
+                    </a:p>
+                  </a:txBody>
+                  <a:tcPr marL="9525" marR="9525" marT="9525" marB="0" anchor="ctr"/>
+                </a:tc>
+              </a:tr>
+              <a:tr h="511916">
+                <a:tc>
+                  <a:txBody>
+                    <a:bodyPr/>
+                    <a:lstStyle/>
+                    <a:p>
+                      <a:pPr algn="ctr" fontAlgn="ctr">
+                        <a:lnSpc>
+                          <a:spcPct val="100000"/>
+                        </a:lnSpc>
+                      </a:pPr>
+                      <a:r>
+                        <a:rPr lang="pt-BR" sz="1400" b="1" u="none" strike="noStrike" dirty="0"/>
+                        <a:t>21/out</a:t>
+                      </a:r>
+                      <a:endParaRPr lang="pt-BR" sz="1400" b="1" i="0" u="none" strike="noStrike" dirty="0">
+                        <a:solidFill>
+                          <a:schemeClr val="tx1"/>
+                        </a:solidFill>
+                        <a:latin typeface="Calibri"/>
+                      </a:endParaRPr>
+                    </a:p>
+                  </a:txBody>
+                  <a:tcPr marL="9525" marR="9525" marT="9525" marB="0" anchor="ctr"/>
+                </a:tc>
+                <a:tc>
+                  <a:txBody>
+                    <a:bodyPr/>
+                    <a:lstStyle/>
+                    <a:p>
+                      <a:pPr algn="ctr" fontAlgn="b">
+                        <a:lnSpc>
+                          <a:spcPct val="100000"/>
+                        </a:lnSpc>
+                      </a:pPr>
+                      <a:r>
+                        <a:rPr lang="pt-BR" sz="1400" u="none" strike="noStrike" dirty="0"/>
+                        <a:t>6º relatório</a:t>
+                      </a:r>
+                      <a:endParaRPr lang="pt-BR" sz="1400" b="0" i="0" u="none" strike="noStrike" dirty="0">
+                        <a:solidFill>
+                          <a:schemeClr val="tx1"/>
+                        </a:solidFill>
+                        <a:latin typeface="Calibri"/>
+                      </a:endParaRPr>
+                    </a:p>
+                  </a:txBody>
+                  <a:tcPr marL="9525" marR="9525" marT="9525" marB="0" anchor="ctr"/>
+                </a:tc>
+              </a:tr>
+              <a:tr h="511916">
+                <a:tc>
+                  <a:txBody>
+                    <a:bodyPr/>
+                    <a:lstStyle/>
+                    <a:p>
+                      <a:pPr algn="ctr" fontAlgn="ctr">
+                        <a:lnSpc>
+                          <a:spcPct val="100000"/>
+                        </a:lnSpc>
+                      </a:pPr>
+                      <a:r>
+                        <a:rPr lang="pt-BR" sz="1400" b="1" u="none" strike="noStrike" dirty="0"/>
+                        <a:t>26/out</a:t>
+                      </a:r>
+                      <a:endParaRPr lang="pt-BR" sz="1400" b="1" i="0" u="none" strike="noStrike" dirty="0">
+                        <a:solidFill>
+                          <a:schemeClr val="tx1"/>
+                        </a:solidFill>
+                        <a:latin typeface="Calibri"/>
+                      </a:endParaRPr>
+                    </a:p>
+                  </a:txBody>
+                  <a:tcPr marL="9525" marR="9525" marT="9525" marB="0" anchor="ctr"/>
+                </a:tc>
+                <a:tc>
+                  <a:txBody>
+                    <a:bodyPr/>
+                    <a:lstStyle/>
+                    <a:p>
+                      <a:pPr algn="ctr" fontAlgn="b">
+                        <a:lnSpc>
+                          <a:spcPct val="100000"/>
+                        </a:lnSpc>
+                      </a:pPr>
+                      <a:r>
+                        <a:rPr lang="pt-BR" sz="1400" u="none" strike="noStrike" dirty="0" smtClean="0"/>
+                        <a:t>7º relatório</a:t>
+                      </a:r>
+                      <a:endParaRPr lang="pt-BR" sz="1400" b="0" i="0" u="none" strike="noStrike" dirty="0">
+                        <a:solidFill>
+                          <a:schemeClr val="tx1"/>
+                        </a:solidFill>
+                        <a:latin typeface="Calibri"/>
+                      </a:endParaRPr>
+                    </a:p>
+                  </a:txBody>
+                  <a:tcPr marL="9525" marR="9525" marT="9525" marB="0" anchor="ctr"/>
+                </a:tc>
+              </a:tr>
+              <a:tr h="511916">
+                <a:tc>
+                  <a:txBody>
+                    <a:bodyPr/>
+                    <a:lstStyle/>
+                    <a:p>
+                      <a:pPr algn="ctr" fontAlgn="ctr">
+                        <a:lnSpc>
+                          <a:spcPct val="100000"/>
+                        </a:lnSpc>
+                      </a:pPr>
+                      <a:r>
+                        <a:rPr lang="pt-BR" sz="1400" b="1" u="none" strike="noStrike" dirty="0"/>
+                        <a:t>03/dez</a:t>
+                      </a:r>
+                      <a:endParaRPr lang="pt-BR" sz="1400" b="1" i="0" u="none" strike="noStrike" dirty="0">
+                        <a:solidFill>
+                          <a:schemeClr val="tx1"/>
+                        </a:solidFill>
+                        <a:latin typeface="Calibri"/>
+                      </a:endParaRPr>
+                    </a:p>
+                  </a:txBody>
+                  <a:tcPr marL="9525" marR="9525" marT="9525" marB="0" anchor="ctr"/>
+                </a:tc>
+                <a:tc>
+                  <a:txBody>
+                    <a:bodyPr/>
+                    <a:lstStyle/>
+                    <a:p>
+                      <a:pPr algn="ctr" fontAlgn="b">
+                        <a:lnSpc>
+                          <a:spcPct val="100000"/>
+                        </a:lnSpc>
+                      </a:pPr>
+                      <a:r>
+                        <a:rPr lang="pt-BR" sz="1400" u="none" strike="noStrike" dirty="0"/>
+                        <a:t>Apresentação</a:t>
+                      </a:r>
+                      <a:endParaRPr lang="pt-BR" sz="1400" b="0" i="0" u="none" strike="noStrike" dirty="0">
+                        <a:solidFill>
+                          <a:schemeClr val="tx1"/>
+                        </a:solidFill>
+                        <a:latin typeface="Calibri"/>
+                      </a:endParaRPr>
+                    </a:p>
+                  </a:txBody>
+                  <a:tcPr marL="9525" marR="9525" marT="9525" marB="0" anchor="ctr"/>
+                </a:tc>
+              </a:tr>
+            </a:tbl>
+          </a:graphicData>
+        </a:graphic>
+      </p:graphicFrame>
+    </p:spTree>
+  </p:cSld>
+  <p:clrMapOvr>
+    <a:masterClrMapping/>
+  </p:clrMapOvr>
+  <p:timing>
+    <p:tnLst>
+      <p:par>
+        <p:cTn xmlns:p14="http://schemas.microsoft.com/office/powerpoint/2010/main" id="1" dur="indefinite" restart="never" nodeType="tmRoot"/>
+      </p:par>
+    </p:tnLst>
+  </p:timing>
+</p:sld>
+</file>
+
+<file path=ppt/slides/slide9.xml><?xml version="1.0" encoding="utf-8"?>
+<p:sld xmlns:a="http://schemas.openxmlformats.org/drawingml/2006/main" xmlns:r="http://schemas.openxmlformats.org/officeDocument/2006/relationships" xmlns:p="http://schemas.openxmlformats.org/presentationml/2006/main">
+  <p:cSld>
+    <p:spTree>
+      <p:nvGrpSpPr>
+        <p:cNvPr id="1" name=""/>
+        <p:cNvGrpSpPr/>
+        <p:nvPr/>
+      </p:nvGrpSpPr>
+      <p:grpSpPr>
+        <a:xfrm>
+          <a:off x="0" y="0"/>
+          <a:ext cx="0" cy="0"/>
+          <a:chOff x="0" y="0"/>
+          <a:chExt cx="0" cy="0"/>
+        </a:xfrm>
+      </p:grpSpPr>
+      <p:sp>
+        <p:nvSpPr>
+          <p:cNvPr id="2" name="Título 1"/>
+          <p:cNvSpPr>
+            <a:spLocks noGrp="1"/>
+          </p:cNvSpPr>
+          <p:nvPr>
+            <p:ph type="ctrTitle"/>
+          </p:nvPr>
+        </p:nvSpPr>
+        <p:spPr>
+          <a:xfrm>
+            <a:off x="539552" y="692696"/>
+            <a:ext cx="7772400" cy="1470025"/>
+          </a:xfrm>
+        </p:spPr>
+        <p:txBody>
+          <a:bodyPr/>
+          <a:lstStyle/>
+          <a:p>
+            <a:r>
+              <a:rPr lang="pt-BR" sz="6000" dirty="0" smtClean="0"/>
+              <a:t>Dificuldades enfrentadas</a:t>
+            </a:r>
+            <a:endParaRPr lang="pt-BR" sz="6000" dirty="0"/>
+          </a:p>
+        </p:txBody>
+      </p:sp>
+      <p:sp>
+        <p:nvSpPr>
+          <p:cNvPr id="4" name="CaixaDeTexto 3"/>
           <p:cNvSpPr txBox="1"/>
           <p:nvPr/>
         </p:nvSpPr>
         <p:spPr>
           <a:xfrm>
-            <a:off x="4714876" y="3000372"/>
-            <a:ext cx="3071834" cy="1477328"/>
+            <a:off x="827584" y="3140968"/>
+            <a:ext cx="7632848" cy="2677656"/>
           </a:xfrm>
           <a:prstGeom prst="rect">
             <a:avLst/>
@@ -8524,28 +8504,49 @@
           </a:bodyPr>
           <a:lstStyle/>
           <a:p>
-            <a:pPr>
-              <a:buFont typeface="Arial" pitchFamily="34" charset="0"/>
-              <a:buChar char="•"/>
+            <a:pPr marL="285750" indent="-285750">
+              <a:buFontTx/>
+              <a:buChar char="-"/>
             </a:pPr>
             <a:r>
-              <a:rPr lang="pt-BR" dirty="0" smtClean="0"/>
-              <a:t>Aprimorar relacionamentos entre as classes;</a:t>
-            </a:r>
-          </a:p>
-          <a:p>
-            <a:endParaRPr lang="pt-BR" dirty="0"/>
-          </a:p>
-          <a:p>
-            <a:pPr>
-              <a:buFont typeface="Arial" pitchFamily="34" charset="0"/>
-              <a:buChar char="•"/>
+              <a:rPr lang="pt-BR" sz="2400" dirty="0" smtClean="0"/>
+              <a:t>Aplicação dos conceitos aprendidos na disciplina para o contexto do trabalho.</a:t>
+            </a:r>
+          </a:p>
+          <a:p>
+            <a:endParaRPr lang="pt-BR" sz="2400" dirty="0" smtClean="0"/>
+          </a:p>
+          <a:p>
+            <a:pPr marL="285750" indent="-285750">
+              <a:buFontTx/>
+              <a:buChar char="-"/>
             </a:pPr>
             <a:r>
-              <a:rPr lang="pt-BR" dirty="0" smtClean="0"/>
-              <a:t>Melhorar interfaces(swing) para com o publico final.</a:t>
-            </a:r>
-            <a:endParaRPr lang="pt-BR" dirty="0"/>
+              <a:rPr lang="pt-BR" sz="2400" dirty="0" smtClean="0"/>
+              <a:t>Entendimento de como funciona um sistema para controle </a:t>
+            </a:r>
+            <a:r>
+              <a:rPr lang="pt-BR" sz="2400" smtClean="0"/>
+              <a:t>de voo e </a:t>
+            </a:r>
+            <a:r>
+              <a:rPr lang="pt-BR" sz="2400" dirty="0" smtClean="0"/>
+              <a:t>as nomenclaturas.</a:t>
+            </a:r>
+          </a:p>
+          <a:p>
+            <a:endParaRPr lang="pt-BR" sz="2400" dirty="0" smtClean="0"/>
+          </a:p>
+          <a:p>
+            <a:pPr marL="285750" indent="-285750">
+              <a:buFontTx/>
+              <a:buChar char="-"/>
+            </a:pPr>
+            <a:r>
+              <a:rPr lang="pt-BR" sz="2400" dirty="0" smtClean="0"/>
+              <a:t>Outras...</a:t>
+            </a:r>
+            <a:endParaRPr lang="pt-BR" sz="2400" dirty="0"/>
           </a:p>
         </p:txBody>
       </p:sp>
@@ -8600,7 +8601,7 @@
     </a:clrScheme>
     <a:fontScheme name="Íon">
       <a:majorFont>
-        <a:latin typeface="Century Gothic" panose="020B0502020202020204"/>
+        <a:latin typeface="Century Gothic"/>
         <a:ea typeface=""/>
         <a:cs typeface=""/>
         <a:font script="Jpan" typeface="メイリオ"/>
@@ -8635,7 +8636,7 @@
         <a:font script="Geor" typeface="Sylfaen"/>
       </a:majorFont>
       <a:minorFont>
-        <a:latin typeface="Century Gothic" panose="020B0502020202020204"/>
+        <a:latin typeface="Century Gothic"/>
         <a:ea typeface=""/>
         <a:cs typeface=""/>
         <a:font script="Jpan" typeface="メイリオ"/>
@@ -8817,7 +8818,7 @@
   <a:extraClrSchemeLst/>
   <a:extLst>
     <a:ext uri="{05A4C25C-085E-4340-85A3-A5531E510DB2}">
-      <thm15:themeFamily xmlns:thm15="http://schemas.microsoft.com/office/thememl/2012/main" name="Ion" id="{B8441ADB-2E43-4AF7-B97A-BD870242C6A8}" vid="{292E63A9-BB86-4E3D-B92A-7223C6510D2E}"/>
+      <thm15:themeFamily xmlns:thm15="http://schemas.microsoft.com/office/thememl/2012/main" xmlns="" name="Ion" id="{B8441ADB-2E43-4AF7-B97A-BD870242C6A8}" vid="{292E63A9-BB86-4E3D-B92A-7223C6510D2E}"/>
     </a:ext>
   </a:extLst>
 </a:theme>

</xml_diff>

<commit_message>
Relatório: até a parte de JUnit
</commit_message>
<xml_diff>
--- a/Apresentação/Apresentação Grupo 7_MOD.pptx
+++ b/Apresentação/Apresentação Grupo 7_MOD.pptx
@@ -14,8 +14,16 @@
     <p:sldId id="259" r:id="rId8"/>
     <p:sldId id="258" r:id="rId9"/>
     <p:sldId id="260" r:id="rId10"/>
-    <p:sldId id="261" r:id="rId11"/>
-    <p:sldId id="262" r:id="rId12"/>
+    <p:sldId id="268" r:id="rId11"/>
+    <p:sldId id="269" r:id="rId12"/>
+    <p:sldId id="270" r:id="rId13"/>
+    <p:sldId id="261" r:id="rId14"/>
+    <p:sldId id="267" r:id="rId15"/>
+    <p:sldId id="271" r:id="rId16"/>
+    <p:sldId id="272" r:id="rId17"/>
+    <p:sldId id="273" r:id="rId18"/>
+    <p:sldId id="274" r:id="rId19"/>
+    <p:sldId id="262" r:id="rId20"/>
   </p:sldIdLst>
   <p:sldSz cx="9144000" cy="6858000" type="screen4x3"/>
   <p:notesSz cx="6858000" cy="9144000"/>
@@ -6347,6 +6355,13 @@
   <p:clrMapOvr>
     <a:masterClrMapping/>
   </p:clrMapOvr>
+  <p:timing>
+    <p:tnLst>
+      <p:par>
+        <p:cTn xmlns:p14="http://schemas.microsoft.com/office/powerpoint/2010/main" id="1" dur="indefinite" restart="never" nodeType="tmRoot"/>
+      </p:par>
+    </p:tnLst>
+  </p:timing>
 </p:sld>
 </file>
 
@@ -6379,7 +6394,7 @@
         </p:nvSpPr>
         <p:spPr>
           <a:xfrm>
-            <a:off x="253752" y="44624"/>
+            <a:off x="539552" y="692696"/>
             <a:ext cx="7772400" cy="1470025"/>
           </a:xfrm>
         </p:spPr>
@@ -6389,7 +6404,15 @@
           <a:p>
             <a:r>
               <a:rPr lang="pt-BR" sz="6000" dirty="0" smtClean="0"/>
-              <a:t>Resultados obtidos</a:t>
+              <a:t>Reposit</a:t>
+            </a:r>
+            <a:r>
+              <a:rPr lang="pt-BR" sz="6000" dirty="0" smtClean="0"/>
+              <a:t>órios </a:t>
+            </a:r>
+            <a:r>
+              <a:rPr lang="pt-BR" sz="6000" dirty="0" err="1" smtClean="0"/>
+              <a:t>GitHub</a:t>
             </a:r>
             <a:endParaRPr lang="pt-BR" sz="6000" dirty="0"/>
           </a:p>
@@ -6397,14 +6420,14 @@
       </p:sp>
       <p:sp>
         <p:nvSpPr>
-          <p:cNvPr id="6" name="CaixaDeTexto 5"/>
+          <p:cNvPr id="4" name="CaixaDeTexto 3"/>
           <p:cNvSpPr txBox="1"/>
           <p:nvPr/>
         </p:nvSpPr>
         <p:spPr>
           <a:xfrm>
-            <a:off x="3059832" y="6454380"/>
-            <a:ext cx="3316909" cy="369332"/>
+            <a:off x="755576" y="2348880"/>
+            <a:ext cx="7632848" cy="400110"/>
           </a:xfrm>
           <a:prstGeom prst="rect">
             <a:avLst/>
@@ -6412,41 +6435,63 @@
           <a:noFill/>
         </p:spPr>
         <p:txBody>
-          <a:bodyPr wrap="none" rtlCol="0">
+          <a:bodyPr wrap="square" rtlCol="0">
             <a:spAutoFit/>
           </a:bodyPr>
           <a:lstStyle/>
           <a:p>
-            <a:r>
-              <a:rPr lang="pt-BR" b="1" dirty="0" smtClean="0"/>
-              <a:t>Fig. 01 </a:t>
-            </a:r>
-            <a:r>
-              <a:rPr lang="pt-BR" dirty="0" smtClean="0"/>
-              <a:t>Modelagem em UML</a:t>
-            </a:r>
-            <a:endParaRPr lang="pt-BR" dirty="0"/>
+            <a:pPr marL="285750" indent="-285750">
+              <a:buFontTx/>
+              <a:buChar char="-"/>
+            </a:pPr>
+            <a:r>
+              <a:rPr lang="pt-BR" sz="2000" dirty="0" smtClean="0"/>
+              <a:t>Inicialmente: </a:t>
+            </a:r>
+            <a:r>
+              <a:rPr lang="en-US" sz="2000" dirty="0">
+                <a:hlinkClick r:id="rId2"/>
+              </a:rPr>
+              <a:t>https://github.com/rafa7lima/</a:t>
+            </a:r>
+            <a:r>
+              <a:rPr lang="en-US" sz="2000" dirty="0" smtClean="0">
+                <a:hlinkClick r:id="rId2"/>
+              </a:rPr>
+              <a:t>Sistema_OO</a:t>
+            </a:r>
+            <a:r>
+              <a:rPr lang="en-US" sz="2000" dirty="0" smtClean="0"/>
+              <a:t> </a:t>
+            </a:r>
+            <a:endParaRPr lang="pt-BR" sz="2000" dirty="0" smtClean="0"/>
           </a:p>
         </p:txBody>
       </p:sp>
       <p:pic>
         <p:nvPicPr>
-          <p:cNvPr id="3" name="Picture 2"/>
+          <p:cNvPr id="3" name="Picture 2" descr="Captura de Tela 2013-12-03 às 00.28.43.png"/>
           <p:cNvPicPr>
             <a:picLocks noChangeAspect="1"/>
           </p:cNvPicPr>
           <p:nvPr/>
         </p:nvPicPr>
         <p:blipFill>
-          <a:blip r:embed="rId2"/>
+          <a:blip r:embed="rId3">
+            <a:extLst>
+              <a:ext uri="{28A0092B-C50C-407E-A947-70E740481C1C}">
+                <a14:useLocalDpi xmlns:a14="http://schemas.microsoft.com/office/drawing/2010/main" val="0"/>
+              </a:ext>
+            </a:extLst>
+          </a:blip>
           <a:stretch>
             <a:fillRect/>
           </a:stretch>
         </p:blipFill>
         <p:spPr>
           <a:xfrm>
-            <a:off x="1763688" y="1772816"/>
-            <a:ext cx="5397500" cy="4622800"/>
+            <a:off x="1403648" y="3068960"/>
+            <a:ext cx="6531350" cy="3789040"/>
           </a:xfrm>
           <a:prstGeom prst="rect">
             <a:avLst/>
@@ -6454,10 +6499,22 @@
         </p:spPr>
       </p:pic>
     </p:spTree>
+    <p:extLst>
+      <p:ext uri="{BB962C8B-B14F-4D97-AF65-F5344CB8AC3E}">
+        <p14:creationId xmlns:p14="http://schemas.microsoft.com/office/powerpoint/2010/main" val="2037327473"/>
+      </p:ext>
+    </p:extLst>
   </p:cSld>
   <p:clrMapOvr>
     <a:masterClrMapping/>
   </p:clrMapOvr>
+  <p:timing>
+    <p:tnLst>
+      <p:par>
+        <p:cTn xmlns:p14="http://schemas.microsoft.com/office/powerpoint/2010/main" id="1" dur="indefinite" restart="never" nodeType="tmRoot"/>
+      </p:par>
+    </p:tnLst>
+  </p:timing>
 </p:sld>
 </file>
 
@@ -6490,7 +6547,7 @@
         </p:nvSpPr>
         <p:spPr>
           <a:xfrm>
-            <a:off x="467544" y="404664"/>
+            <a:off x="539552" y="692696"/>
             <a:ext cx="7772400" cy="1470025"/>
           </a:xfrm>
         </p:spPr>
@@ -6500,7 +6557,15 @@
           <a:p>
             <a:r>
               <a:rPr lang="pt-BR" sz="6000" dirty="0" smtClean="0"/>
-              <a:t>Objetivos Futuros</a:t>
+              <a:t>Reposit</a:t>
+            </a:r>
+            <a:r>
+              <a:rPr lang="pt-BR" sz="6000" dirty="0" smtClean="0"/>
+              <a:t>órios </a:t>
+            </a:r>
+            <a:r>
+              <a:rPr lang="pt-BR" sz="6000" dirty="0" err="1" smtClean="0"/>
+              <a:t>GitHub</a:t>
             </a:r>
             <a:endParaRPr lang="pt-BR" sz="6000" dirty="0"/>
           </a:p>
@@ -6514,8 +6579,8 @@
         </p:nvSpPr>
         <p:spPr>
           <a:xfrm>
-            <a:off x="1214414" y="3000372"/>
-            <a:ext cx="2357454" cy="2031325"/>
+            <a:off x="755576" y="2348880"/>
+            <a:ext cx="7632848" cy="400110"/>
           </a:xfrm>
           <a:prstGeom prst="rect">
             <a:avLst/>
@@ -6528,46 +6593,155 @@
           </a:bodyPr>
           <a:lstStyle/>
           <a:p>
-            <a:pPr>
-              <a:buFont typeface="Arial" pitchFamily="34" charset="0"/>
-              <a:buChar char="•"/>
+            <a:pPr marL="285750" indent="-285750">
+              <a:buFontTx/>
+              <a:buChar char="-"/>
             </a:pPr>
             <a:r>
-              <a:rPr lang="pt-BR" dirty="0" smtClean="0"/>
-              <a:t>Melhorar Teste de unidade;</a:t>
-            </a:r>
-          </a:p>
-          <a:p>
-            <a:endParaRPr lang="pt-BR" dirty="0"/>
-          </a:p>
-          <a:p>
-            <a:pPr>
-              <a:buFont typeface="Arial" pitchFamily="34" charset="0"/>
-              <a:buChar char="•"/>
-            </a:pPr>
-            <a:r>
-              <a:rPr lang="pt-BR" dirty="0" smtClean="0"/>
-              <a:t>Utilizar um banco de Dados;</a:t>
-            </a:r>
-          </a:p>
-          <a:p>
-            <a:endParaRPr lang="pt-BR" dirty="0"/>
-          </a:p>
-          <a:p>
-            <a:endParaRPr lang="pt-BR" dirty="0"/>
-          </a:p>
-        </p:txBody>
-      </p:sp>
-      <p:sp>
-        <p:nvSpPr>
-          <p:cNvPr id="6" name="CaixaDeTexto 5"/>
+              <a:rPr lang="pt-BR" sz="2000" dirty="0" smtClean="0"/>
+              <a:t>...Ent</a:t>
+            </a:r>
+            <a:r>
+              <a:rPr lang="pt-BR" sz="2000" dirty="0" smtClean="0"/>
+              <a:t>ão</a:t>
+            </a:r>
+            <a:r>
+              <a:rPr lang="pt-BR" sz="2000" dirty="0" smtClean="0"/>
+              <a:t>: </a:t>
+            </a:r>
+            <a:r>
+              <a:rPr lang="en-US" sz="2000" dirty="0">
+                <a:hlinkClick r:id="rId2"/>
+              </a:rPr>
+              <a:t>https://github.com/rafa7lima/</a:t>
+            </a:r>
+            <a:r>
+              <a:rPr lang="en-US" sz="2000" dirty="0" smtClean="0">
+                <a:hlinkClick r:id="rId2"/>
+              </a:rPr>
+              <a:t>SistemaVoo2.0</a:t>
+            </a:r>
+            <a:r>
+              <a:rPr lang="en-US" sz="2000" dirty="0" smtClean="0"/>
+              <a:t> </a:t>
+            </a:r>
+            <a:endParaRPr lang="pt-BR" sz="2000" dirty="0" smtClean="0"/>
+          </a:p>
+        </p:txBody>
+      </p:sp>
+      <p:pic>
+        <p:nvPicPr>
+          <p:cNvPr id="5" name="Picture 4" descr="Captura de Tela 2013-12-03 às 00.29.36.png"/>
+          <p:cNvPicPr>
+            <a:picLocks noChangeAspect="1"/>
+          </p:cNvPicPr>
+          <p:nvPr/>
+        </p:nvPicPr>
+        <p:blipFill>
+          <a:blip r:embed="rId3">
+            <a:extLst>
+              <a:ext uri="{28A0092B-C50C-407E-A947-70E740481C1C}">
+                <a14:useLocalDpi xmlns:a14="http://schemas.microsoft.com/office/drawing/2010/main" val="0"/>
+              </a:ext>
+            </a:extLst>
+          </a:blip>
+          <a:stretch>
+            <a:fillRect/>
+          </a:stretch>
+        </p:blipFill>
+        <p:spPr>
+          <a:xfrm>
+            <a:off x="755576" y="3027416"/>
+            <a:ext cx="7236296" cy="3830584"/>
+          </a:xfrm>
+          <a:prstGeom prst="rect">
+            <a:avLst/>
+          </a:prstGeom>
+        </p:spPr>
+      </p:pic>
+    </p:spTree>
+    <p:extLst>
+      <p:ext uri="{BB962C8B-B14F-4D97-AF65-F5344CB8AC3E}">
+        <p14:creationId xmlns:p14="http://schemas.microsoft.com/office/powerpoint/2010/main" val="3578755224"/>
+      </p:ext>
+    </p:extLst>
+  </p:cSld>
+  <p:clrMapOvr>
+    <a:masterClrMapping/>
+  </p:clrMapOvr>
+  <p:timing>
+    <p:tnLst>
+      <p:par>
+        <p:cTn xmlns:p14="http://schemas.microsoft.com/office/powerpoint/2010/main" id="1" dur="indefinite" restart="never" nodeType="tmRoot"/>
+      </p:par>
+    </p:tnLst>
+  </p:timing>
+</p:sld>
+</file>
+
+<file path=ppt/slides/slide12.xml><?xml version="1.0" encoding="utf-8"?>
+<p:sld xmlns:a="http://schemas.openxmlformats.org/drawingml/2006/main" xmlns:r="http://schemas.openxmlformats.org/officeDocument/2006/relationships" xmlns:p="http://schemas.openxmlformats.org/presentationml/2006/main">
+  <p:cSld>
+    <p:spTree>
+      <p:nvGrpSpPr>
+        <p:cNvPr id="1" name=""/>
+        <p:cNvGrpSpPr/>
+        <p:nvPr/>
+      </p:nvGrpSpPr>
+      <p:grpSpPr>
+        <a:xfrm>
+          <a:off x="0" y="0"/>
+          <a:ext cx="0" cy="0"/>
+          <a:chOff x="0" y="0"/>
+          <a:chExt cx="0" cy="0"/>
+        </a:xfrm>
+      </p:grpSpPr>
+      <p:sp>
+        <p:nvSpPr>
+          <p:cNvPr id="2" name="Título 1"/>
+          <p:cNvSpPr>
+            <a:spLocks noGrp="1"/>
+          </p:cNvSpPr>
+          <p:nvPr>
+            <p:ph type="ctrTitle"/>
+          </p:nvPr>
+        </p:nvSpPr>
+        <p:spPr>
+          <a:xfrm>
+            <a:off x="539552" y="692696"/>
+            <a:ext cx="7772400" cy="1470025"/>
+          </a:xfrm>
+        </p:spPr>
+        <p:txBody>
+          <a:bodyPr/>
+          <a:lstStyle/>
+          <a:p>
+            <a:r>
+              <a:rPr lang="pt-BR" sz="6000" dirty="0" smtClean="0"/>
+              <a:t>Reposit</a:t>
+            </a:r>
+            <a:r>
+              <a:rPr lang="pt-BR" sz="6000" dirty="0" smtClean="0"/>
+              <a:t>órios </a:t>
+            </a:r>
+            <a:r>
+              <a:rPr lang="pt-BR" sz="6000" dirty="0" err="1" smtClean="0"/>
+              <a:t>GitHub</a:t>
+            </a:r>
+            <a:endParaRPr lang="pt-BR" sz="6000" dirty="0"/>
+          </a:p>
+        </p:txBody>
+      </p:sp>
+      <p:sp>
+        <p:nvSpPr>
+          <p:cNvPr id="4" name="CaixaDeTexto 3"/>
           <p:cNvSpPr txBox="1"/>
           <p:nvPr/>
         </p:nvSpPr>
         <p:spPr>
           <a:xfrm>
-            <a:off x="4714876" y="3000372"/>
-            <a:ext cx="3071834" cy="1477328"/>
+            <a:off x="755576" y="2348880"/>
+            <a:ext cx="7632848" cy="400110"/>
           </a:xfrm>
           <a:prstGeom prst="rect">
             <a:avLst/>
@@ -6580,36 +6754,1326 @@
           </a:bodyPr>
           <a:lstStyle/>
           <a:p>
-            <a:pPr>
-              <a:buFont typeface="Arial" pitchFamily="34" charset="0"/>
-              <a:buChar char="•"/>
+            <a:pPr marL="285750" indent="-285750">
+              <a:buFontTx/>
+              <a:buChar char="-"/>
             </a:pPr>
             <a:r>
+              <a:rPr lang="pt-BR" sz="2000" dirty="0" smtClean="0"/>
+              <a:t>...Ent</a:t>
+            </a:r>
+            <a:r>
+              <a:rPr lang="pt-BR" sz="2000" dirty="0" smtClean="0"/>
+              <a:t>ão</a:t>
+            </a:r>
+            <a:r>
+              <a:rPr lang="pt-BR" sz="2000" dirty="0" smtClean="0"/>
+              <a:t>: </a:t>
+            </a:r>
+            <a:r>
+              <a:rPr lang="en-US" sz="2000" dirty="0">
+                <a:hlinkClick r:id="rId2"/>
+              </a:rPr>
+              <a:t>https://github.com/rafa7lima/</a:t>
+            </a:r>
+            <a:r>
+              <a:rPr lang="en-US" sz="2000" dirty="0" smtClean="0">
+                <a:hlinkClick r:id="rId2"/>
+              </a:rPr>
+              <a:t>SistemaVoo2.0</a:t>
+            </a:r>
+            <a:r>
+              <a:rPr lang="en-US" sz="2000" dirty="0" smtClean="0"/>
+              <a:t>  </a:t>
+            </a:r>
+            <a:endParaRPr lang="pt-BR" sz="2000" dirty="0" smtClean="0"/>
+          </a:p>
+        </p:txBody>
+      </p:sp>
+      <p:pic>
+        <p:nvPicPr>
+          <p:cNvPr id="3" name="Picture 2" descr="Captura de Tela 2013-12-03 às 00.30.01.png"/>
+          <p:cNvPicPr>
+            <a:picLocks noChangeAspect="1"/>
+          </p:cNvPicPr>
+          <p:nvPr/>
+        </p:nvPicPr>
+        <p:blipFill>
+          <a:blip r:embed="rId3">
+            <a:extLst>
+              <a:ext uri="{28A0092B-C50C-407E-A947-70E740481C1C}">
+                <a14:useLocalDpi xmlns:a14="http://schemas.microsoft.com/office/drawing/2010/main" val="0"/>
+              </a:ext>
+            </a:extLst>
+          </a:blip>
+          <a:stretch>
+            <a:fillRect/>
+          </a:stretch>
+        </p:blipFill>
+        <p:spPr>
+          <a:xfrm>
+            <a:off x="899592" y="3068960"/>
+            <a:ext cx="7092280" cy="3369275"/>
+          </a:xfrm>
+          <a:prstGeom prst="rect">
+            <a:avLst/>
+          </a:prstGeom>
+        </p:spPr>
+      </p:pic>
+    </p:spTree>
+    <p:extLst>
+      <p:ext uri="{BB962C8B-B14F-4D97-AF65-F5344CB8AC3E}">
+        <p14:creationId xmlns:p14="http://schemas.microsoft.com/office/powerpoint/2010/main" val="2040101332"/>
+      </p:ext>
+    </p:extLst>
+  </p:cSld>
+  <p:clrMapOvr>
+    <a:masterClrMapping/>
+  </p:clrMapOvr>
+  <p:timing>
+    <p:tnLst>
+      <p:par>
+        <p:cTn xmlns:p14="http://schemas.microsoft.com/office/powerpoint/2010/main" id="1" dur="indefinite" restart="never" nodeType="tmRoot"/>
+      </p:par>
+    </p:tnLst>
+  </p:timing>
+</p:sld>
+</file>
+
+<file path=ppt/slides/slide13.xml><?xml version="1.0" encoding="utf-8"?>
+<p:sld xmlns:a="http://schemas.openxmlformats.org/drawingml/2006/main" xmlns:r="http://schemas.openxmlformats.org/officeDocument/2006/relationships" xmlns:p="http://schemas.openxmlformats.org/presentationml/2006/main">
+  <p:cSld>
+    <p:spTree>
+      <p:nvGrpSpPr>
+        <p:cNvPr id="1" name=""/>
+        <p:cNvGrpSpPr/>
+        <p:nvPr/>
+      </p:nvGrpSpPr>
+      <p:grpSpPr>
+        <a:xfrm>
+          <a:off x="0" y="0"/>
+          <a:ext cx="0" cy="0"/>
+          <a:chOff x="0" y="0"/>
+          <a:chExt cx="0" cy="0"/>
+        </a:xfrm>
+      </p:grpSpPr>
+      <p:sp>
+        <p:nvSpPr>
+          <p:cNvPr id="2" name="Título 1"/>
+          <p:cNvSpPr>
+            <a:spLocks noGrp="1"/>
+          </p:cNvSpPr>
+          <p:nvPr>
+            <p:ph type="ctrTitle"/>
+          </p:nvPr>
+        </p:nvSpPr>
+        <p:spPr>
+          <a:xfrm>
+            <a:off x="253752" y="44624"/>
+            <a:ext cx="7772400" cy="1470025"/>
+          </a:xfrm>
+        </p:spPr>
+        <p:txBody>
+          <a:bodyPr/>
+          <a:lstStyle/>
+          <a:p>
+            <a:r>
+              <a:rPr lang="pt-BR" sz="6000" dirty="0" smtClean="0"/>
+              <a:t>Resultados obtidos</a:t>
+            </a:r>
+            <a:endParaRPr lang="pt-BR" sz="6000" dirty="0"/>
+          </a:p>
+        </p:txBody>
+      </p:sp>
+      <p:sp>
+        <p:nvSpPr>
+          <p:cNvPr id="6" name="CaixaDeTexto 5"/>
+          <p:cNvSpPr txBox="1"/>
+          <p:nvPr/>
+        </p:nvSpPr>
+        <p:spPr>
+          <a:xfrm>
+            <a:off x="3059832" y="6454380"/>
+            <a:ext cx="3316909" cy="369332"/>
+          </a:xfrm>
+          <a:prstGeom prst="rect">
+            <a:avLst/>
+          </a:prstGeom>
+          <a:noFill/>
+        </p:spPr>
+        <p:txBody>
+          <a:bodyPr wrap="none" rtlCol="0">
+            <a:spAutoFit/>
+          </a:bodyPr>
+          <a:lstStyle/>
+          <a:p>
+            <a:r>
+              <a:rPr lang="pt-BR" b="1" dirty="0" smtClean="0"/>
+              <a:t>Fig. 01 </a:t>
+            </a:r>
+            <a:r>
               <a:rPr lang="pt-BR" dirty="0" smtClean="0"/>
-              <a:t>Aprimorar relacionamentos entre as classes;</a:t>
-            </a:r>
-          </a:p>
-          <a:p>
+              <a:t>Modelagem em UML</a:t>
+            </a:r>
             <a:endParaRPr lang="pt-BR" dirty="0"/>
           </a:p>
-          <a:p>
-            <a:pPr>
-              <a:buFont typeface="Arial" pitchFamily="34" charset="0"/>
-              <a:buChar char="•"/>
-            </a:pPr>
-            <a:r>
-              <a:rPr lang="pt-BR" dirty="0" smtClean="0"/>
-              <a:t>Melhorar interfaces(swing) para com o publico final.</a:t>
-            </a:r>
-            <a:endParaRPr lang="pt-BR" dirty="0"/>
-          </a:p>
-        </p:txBody>
-      </p:sp>
+        </p:txBody>
+      </p:sp>
+      <p:pic>
+        <p:nvPicPr>
+          <p:cNvPr id="3" name="Picture 2"/>
+          <p:cNvPicPr>
+            <a:picLocks noChangeAspect="1"/>
+          </p:cNvPicPr>
+          <p:nvPr/>
+        </p:nvPicPr>
+        <p:blipFill>
+          <a:blip r:embed="rId2"/>
+          <a:stretch>
+            <a:fillRect/>
+          </a:stretch>
+        </p:blipFill>
+        <p:spPr>
+          <a:xfrm>
+            <a:off x="1763688" y="1772816"/>
+            <a:ext cx="5397500" cy="4622800"/>
+          </a:xfrm>
+          <a:prstGeom prst="rect">
+            <a:avLst/>
+          </a:prstGeom>
+        </p:spPr>
+      </p:pic>
     </p:spTree>
   </p:cSld>
   <p:clrMapOvr>
     <a:masterClrMapping/>
   </p:clrMapOvr>
+  <p:timing>
+    <p:tnLst>
+      <p:par>
+        <p:cTn xmlns:p14="http://schemas.microsoft.com/office/powerpoint/2010/main" id="1" dur="indefinite" restart="never" nodeType="tmRoot"/>
+      </p:par>
+    </p:tnLst>
+  </p:timing>
+</p:sld>
+</file>
+
+<file path=ppt/slides/slide14.xml><?xml version="1.0" encoding="utf-8"?>
+<p:sld xmlns:a="http://schemas.openxmlformats.org/drawingml/2006/main" xmlns:r="http://schemas.openxmlformats.org/officeDocument/2006/relationships" xmlns:p="http://schemas.openxmlformats.org/presentationml/2006/main">
+  <p:cSld>
+    <p:spTree>
+      <p:nvGrpSpPr>
+        <p:cNvPr id="1" name=""/>
+        <p:cNvGrpSpPr/>
+        <p:nvPr/>
+      </p:nvGrpSpPr>
+      <p:grpSpPr>
+        <a:xfrm>
+          <a:off x="0" y="0"/>
+          <a:ext cx="0" cy="0"/>
+          <a:chOff x="0" y="0"/>
+          <a:chExt cx="0" cy="0"/>
+        </a:xfrm>
+      </p:grpSpPr>
+      <p:sp>
+        <p:nvSpPr>
+          <p:cNvPr id="2" name="Título 1"/>
+          <p:cNvSpPr>
+            <a:spLocks noGrp="1"/>
+          </p:cNvSpPr>
+          <p:nvPr>
+            <p:ph type="ctrTitle"/>
+          </p:nvPr>
+        </p:nvSpPr>
+        <p:spPr>
+          <a:xfrm>
+            <a:off x="253752" y="44624"/>
+            <a:ext cx="7772400" cy="1470025"/>
+          </a:xfrm>
+        </p:spPr>
+        <p:txBody>
+          <a:bodyPr/>
+          <a:lstStyle/>
+          <a:p>
+            <a:r>
+              <a:rPr lang="pt-BR" sz="6000" dirty="0" smtClean="0"/>
+              <a:t>Resultados obtidos</a:t>
+            </a:r>
+            <a:endParaRPr lang="pt-BR" sz="6000" dirty="0"/>
+          </a:p>
+        </p:txBody>
+      </p:sp>
+      <p:sp>
+        <p:nvSpPr>
+          <p:cNvPr id="7" name="CaixaDeTexto 3"/>
+          <p:cNvSpPr txBox="1"/>
+          <p:nvPr/>
+        </p:nvSpPr>
+        <p:spPr>
+          <a:xfrm>
+            <a:off x="827584" y="2060848"/>
+            <a:ext cx="7632848" cy="1631216"/>
+          </a:xfrm>
+          <a:prstGeom prst="rect">
+            <a:avLst/>
+          </a:prstGeom>
+          <a:noFill/>
+        </p:spPr>
+        <p:txBody>
+          <a:bodyPr wrap="square" rtlCol="0">
+            <a:spAutoFit/>
+          </a:bodyPr>
+          <a:lstStyle/>
+          <a:p>
+            <a:pPr marL="285750" indent="-285750">
+              <a:buFontTx/>
+              <a:buChar char="-"/>
+            </a:pPr>
+            <a:r>
+              <a:rPr lang="pt-BR" sz="2000" dirty="0" smtClean="0"/>
+              <a:t>Inicialmente, e durante praticamente todo o semestre, todas as implementa</a:t>
+            </a:r>
+            <a:r>
+              <a:rPr lang="pt-BR" sz="2000" dirty="0" smtClean="0"/>
+              <a:t>ções realizadas </a:t>
+            </a:r>
+            <a:r>
+              <a:rPr lang="pt-BR" sz="2000" dirty="0" smtClean="0"/>
+              <a:t>apareciam na </a:t>
+            </a:r>
+            <a:r>
+              <a:rPr lang="pt-BR" sz="2000" i="1" dirty="0" err="1" smtClean="0"/>
+              <a:t>main</a:t>
+            </a:r>
+            <a:r>
+              <a:rPr lang="pt-BR" sz="2000" i="1" dirty="0" smtClean="0"/>
+              <a:t>. </a:t>
+            </a:r>
+            <a:r>
+              <a:rPr lang="pt-BR" sz="2000" dirty="0" smtClean="0"/>
+              <a:t>A </a:t>
+            </a:r>
+            <a:r>
+              <a:rPr lang="pt-BR" sz="2000" i="1" dirty="0" err="1" smtClean="0"/>
+              <a:t>main</a:t>
+            </a:r>
+            <a:r>
+              <a:rPr lang="pt-BR" sz="2000" i="1" dirty="0"/>
+              <a:t> </a:t>
+            </a:r>
+            <a:r>
+              <a:rPr lang="pt-BR" sz="2000" dirty="0" smtClean="0"/>
+              <a:t>consiste em um </a:t>
+            </a:r>
+            <a:r>
+              <a:rPr lang="pt-BR" sz="2000" i="1" dirty="0" smtClean="0"/>
+              <a:t>Loop</a:t>
+            </a:r>
+            <a:r>
+              <a:rPr lang="pt-BR" sz="2000" dirty="0" smtClean="0"/>
+              <a:t>, gerado por </a:t>
+            </a:r>
+            <a:r>
+              <a:rPr lang="pt-BR" sz="2000" i="1" dirty="0" smtClean="0"/>
+              <a:t>Switch(case) </a:t>
+            </a:r>
+            <a:r>
+              <a:rPr lang="pt-BR" sz="2000" dirty="0" smtClean="0"/>
+              <a:t>que permite acessar as funcionalidades do Sistema via Console: </a:t>
+            </a:r>
+            <a:endParaRPr lang="pt-BR" sz="2000" dirty="0"/>
+          </a:p>
+        </p:txBody>
+      </p:sp>
+    </p:spTree>
+    <p:extLst>
+      <p:ext uri="{BB962C8B-B14F-4D97-AF65-F5344CB8AC3E}">
+        <p14:creationId xmlns:p14="http://schemas.microsoft.com/office/powerpoint/2010/main" val="837563875"/>
+      </p:ext>
+    </p:extLst>
+  </p:cSld>
+  <p:clrMapOvr>
+    <a:masterClrMapping/>
+  </p:clrMapOvr>
+  <p:timing>
+    <p:tnLst>
+      <p:par>
+        <p:cTn xmlns:p14="http://schemas.microsoft.com/office/powerpoint/2010/main" id="1" dur="indefinite" restart="never" nodeType="tmRoot"/>
+      </p:par>
+    </p:tnLst>
+  </p:timing>
+</p:sld>
+</file>
+
+<file path=ppt/slides/slide15.xml><?xml version="1.0" encoding="utf-8"?>
+<p:sld xmlns:a="http://schemas.openxmlformats.org/drawingml/2006/main" xmlns:r="http://schemas.openxmlformats.org/officeDocument/2006/relationships" xmlns:p="http://schemas.openxmlformats.org/presentationml/2006/main">
+  <p:cSld>
+    <p:spTree>
+      <p:nvGrpSpPr>
+        <p:cNvPr id="1" name=""/>
+        <p:cNvGrpSpPr/>
+        <p:nvPr/>
+      </p:nvGrpSpPr>
+      <p:grpSpPr>
+        <a:xfrm>
+          <a:off x="0" y="0"/>
+          <a:ext cx="0" cy="0"/>
+          <a:chOff x="0" y="0"/>
+          <a:chExt cx="0" cy="0"/>
+        </a:xfrm>
+      </p:grpSpPr>
+      <p:sp>
+        <p:nvSpPr>
+          <p:cNvPr id="2" name="Título 1"/>
+          <p:cNvSpPr>
+            <a:spLocks noGrp="1"/>
+          </p:cNvSpPr>
+          <p:nvPr>
+            <p:ph type="ctrTitle"/>
+          </p:nvPr>
+        </p:nvSpPr>
+        <p:spPr>
+          <a:xfrm>
+            <a:off x="253752" y="44624"/>
+            <a:ext cx="7772400" cy="1470025"/>
+          </a:xfrm>
+        </p:spPr>
+        <p:txBody>
+          <a:bodyPr/>
+          <a:lstStyle/>
+          <a:p>
+            <a:r>
+              <a:rPr lang="pt-BR" sz="6000" dirty="0" smtClean="0"/>
+              <a:t>Resultados obtidos</a:t>
+            </a:r>
+            <a:endParaRPr lang="pt-BR" sz="6000" dirty="0"/>
+          </a:p>
+        </p:txBody>
+      </p:sp>
+      <p:pic>
+        <p:nvPicPr>
+          <p:cNvPr id="3" name="Picture 2" descr="Captura de Tela 2013-12-03 às 00.35.28.png"/>
+          <p:cNvPicPr>
+            <a:picLocks noChangeAspect="1"/>
+          </p:cNvPicPr>
+          <p:nvPr/>
+        </p:nvPicPr>
+        <p:blipFill>
+          <a:blip r:embed="rId2">
+            <a:extLst>
+              <a:ext uri="{28A0092B-C50C-407E-A947-70E740481C1C}">
+                <a14:useLocalDpi xmlns:a14="http://schemas.microsoft.com/office/drawing/2010/main" val="0"/>
+              </a:ext>
+            </a:extLst>
+          </a:blip>
+          <a:stretch>
+            <a:fillRect/>
+          </a:stretch>
+        </p:blipFill>
+        <p:spPr>
+          <a:xfrm>
+            <a:off x="4427984" y="1556792"/>
+            <a:ext cx="4580866" cy="5143249"/>
+          </a:xfrm>
+          <a:prstGeom prst="rect">
+            <a:avLst/>
+          </a:prstGeom>
+        </p:spPr>
+      </p:pic>
+      <p:pic>
+        <p:nvPicPr>
+          <p:cNvPr id="4" name="Picture 3" descr="Captura de Tela 2013-12-03 às 00.36.51.png"/>
+          <p:cNvPicPr>
+            <a:picLocks noChangeAspect="1"/>
+          </p:cNvPicPr>
+          <p:nvPr/>
+        </p:nvPicPr>
+        <p:blipFill>
+          <a:blip r:embed="rId3">
+            <a:extLst>
+              <a:ext uri="{28A0092B-C50C-407E-A947-70E740481C1C}">
+                <a14:useLocalDpi xmlns:a14="http://schemas.microsoft.com/office/drawing/2010/main" val="0"/>
+              </a:ext>
+            </a:extLst>
+          </a:blip>
+          <a:stretch>
+            <a:fillRect/>
+          </a:stretch>
+        </p:blipFill>
+        <p:spPr>
+          <a:xfrm>
+            <a:off x="107504" y="1556792"/>
+            <a:ext cx="4198662" cy="2408188"/>
+          </a:xfrm>
+          <a:prstGeom prst="rect">
+            <a:avLst/>
+          </a:prstGeom>
+        </p:spPr>
+      </p:pic>
+    </p:spTree>
+    <p:extLst>
+      <p:ext uri="{BB962C8B-B14F-4D97-AF65-F5344CB8AC3E}">
+        <p14:creationId xmlns:p14="http://schemas.microsoft.com/office/powerpoint/2010/main" val="3827529402"/>
+      </p:ext>
+    </p:extLst>
+  </p:cSld>
+  <p:clrMapOvr>
+    <a:masterClrMapping/>
+  </p:clrMapOvr>
+  <p:timing>
+    <p:tnLst>
+      <p:par>
+        <p:cTn xmlns:p14="http://schemas.microsoft.com/office/powerpoint/2010/main" id="1" dur="indefinite" restart="never" nodeType="tmRoot"/>
+      </p:par>
+    </p:tnLst>
+  </p:timing>
+</p:sld>
+</file>
+
+<file path=ppt/slides/slide16.xml><?xml version="1.0" encoding="utf-8"?>
+<p:sld xmlns:a="http://schemas.openxmlformats.org/drawingml/2006/main" xmlns:r="http://schemas.openxmlformats.org/officeDocument/2006/relationships" xmlns:p="http://schemas.openxmlformats.org/presentationml/2006/main">
+  <p:cSld>
+    <p:spTree>
+      <p:nvGrpSpPr>
+        <p:cNvPr id="1" name=""/>
+        <p:cNvGrpSpPr/>
+        <p:nvPr/>
+      </p:nvGrpSpPr>
+      <p:grpSpPr>
+        <a:xfrm>
+          <a:off x="0" y="0"/>
+          <a:ext cx="0" cy="0"/>
+          <a:chOff x="0" y="0"/>
+          <a:chExt cx="0" cy="0"/>
+        </a:xfrm>
+      </p:grpSpPr>
+      <p:sp>
+        <p:nvSpPr>
+          <p:cNvPr id="2" name="Título 1"/>
+          <p:cNvSpPr>
+            <a:spLocks noGrp="1"/>
+          </p:cNvSpPr>
+          <p:nvPr>
+            <p:ph type="ctrTitle"/>
+          </p:nvPr>
+        </p:nvSpPr>
+        <p:spPr>
+          <a:xfrm>
+            <a:off x="253752" y="44624"/>
+            <a:ext cx="7772400" cy="1470025"/>
+          </a:xfrm>
+        </p:spPr>
+        <p:txBody>
+          <a:bodyPr/>
+          <a:lstStyle/>
+          <a:p>
+            <a:r>
+              <a:rPr lang="pt-BR" sz="6000" dirty="0" smtClean="0"/>
+              <a:t>Resultados obtidos</a:t>
+            </a:r>
+            <a:endParaRPr lang="pt-BR" sz="6000" dirty="0"/>
+          </a:p>
+        </p:txBody>
+      </p:sp>
+      <p:pic>
+        <p:nvPicPr>
+          <p:cNvPr id="5" name="Picture 4" descr="Captura de Tela 2013-12-03 às 00.38.30.png"/>
+          <p:cNvPicPr>
+            <a:picLocks noChangeAspect="1"/>
+          </p:cNvPicPr>
+          <p:nvPr/>
+        </p:nvPicPr>
+        <p:blipFill>
+          <a:blip r:embed="rId2">
+            <a:extLst>
+              <a:ext uri="{28A0092B-C50C-407E-A947-70E740481C1C}">
+                <a14:useLocalDpi xmlns:a14="http://schemas.microsoft.com/office/drawing/2010/main" val="0"/>
+              </a:ext>
+            </a:extLst>
+          </a:blip>
+          <a:stretch>
+            <a:fillRect/>
+          </a:stretch>
+        </p:blipFill>
+        <p:spPr>
+          <a:xfrm>
+            <a:off x="323528" y="3140968"/>
+            <a:ext cx="5029200" cy="1485900"/>
+          </a:xfrm>
+          <a:prstGeom prst="rect">
+            <a:avLst/>
+          </a:prstGeom>
+        </p:spPr>
+      </p:pic>
+      <p:pic>
+        <p:nvPicPr>
+          <p:cNvPr id="6" name="Picture 5" descr="Captura de Tela 2013-12-03 às 00.39.00.png"/>
+          <p:cNvPicPr>
+            <a:picLocks noChangeAspect="1"/>
+          </p:cNvPicPr>
+          <p:nvPr/>
+        </p:nvPicPr>
+        <p:blipFill>
+          <a:blip r:embed="rId3">
+            <a:extLst>
+              <a:ext uri="{28A0092B-C50C-407E-A947-70E740481C1C}">
+                <a14:useLocalDpi xmlns:a14="http://schemas.microsoft.com/office/drawing/2010/main" val="0"/>
+              </a:ext>
+            </a:extLst>
+          </a:blip>
+          <a:stretch>
+            <a:fillRect/>
+          </a:stretch>
+        </p:blipFill>
+        <p:spPr>
+          <a:xfrm>
+            <a:off x="5148064" y="1772816"/>
+            <a:ext cx="3276600" cy="1003300"/>
+          </a:xfrm>
+          <a:prstGeom prst="rect">
+            <a:avLst/>
+          </a:prstGeom>
+        </p:spPr>
+      </p:pic>
+      <p:pic>
+        <p:nvPicPr>
+          <p:cNvPr id="7" name="Picture 6" descr="Captura de Tela 2013-12-03 às 00.39.32.png"/>
+          <p:cNvPicPr>
+            <a:picLocks noChangeAspect="1"/>
+          </p:cNvPicPr>
+          <p:nvPr/>
+        </p:nvPicPr>
+        <p:blipFill>
+          <a:blip r:embed="rId4">
+            <a:extLst>
+              <a:ext uri="{28A0092B-C50C-407E-A947-70E740481C1C}">
+                <a14:useLocalDpi xmlns:a14="http://schemas.microsoft.com/office/drawing/2010/main" val="0"/>
+              </a:ext>
+            </a:extLst>
+          </a:blip>
+          <a:stretch>
+            <a:fillRect/>
+          </a:stretch>
+        </p:blipFill>
+        <p:spPr>
+          <a:xfrm>
+            <a:off x="3851920" y="5013176"/>
+            <a:ext cx="4826000" cy="406400"/>
+          </a:xfrm>
+          <a:prstGeom prst="rect">
+            <a:avLst/>
+          </a:prstGeom>
+        </p:spPr>
+      </p:pic>
+      <p:pic>
+        <p:nvPicPr>
+          <p:cNvPr id="8" name="Picture 7" descr="Captura de Tela 2013-12-03 às 00.40.10.png"/>
+          <p:cNvPicPr>
+            <a:picLocks noChangeAspect="1"/>
+          </p:cNvPicPr>
+          <p:nvPr/>
+        </p:nvPicPr>
+        <p:blipFill>
+          <a:blip r:embed="rId5">
+            <a:extLst>
+              <a:ext uri="{28A0092B-C50C-407E-A947-70E740481C1C}">
+                <a14:useLocalDpi xmlns:a14="http://schemas.microsoft.com/office/drawing/2010/main" val="0"/>
+              </a:ext>
+            </a:extLst>
+          </a:blip>
+          <a:stretch>
+            <a:fillRect/>
+          </a:stretch>
+        </p:blipFill>
+        <p:spPr>
+          <a:xfrm>
+            <a:off x="1115616" y="5733256"/>
+            <a:ext cx="2311400" cy="431800"/>
+          </a:xfrm>
+          <a:prstGeom prst="rect">
+            <a:avLst/>
+          </a:prstGeom>
+        </p:spPr>
+      </p:pic>
+      <p:cxnSp>
+        <p:nvCxnSpPr>
+          <p:cNvPr id="10" name="Straight Arrow Connector 9"/>
+          <p:cNvCxnSpPr>
+            <a:stCxn id="6" idx="2"/>
+          </p:cNvCxnSpPr>
+          <p:nvPr/>
+        </p:nvCxnSpPr>
+        <p:spPr>
+          <a:xfrm flipH="1">
+            <a:off x="5508104" y="2776116"/>
+            <a:ext cx="1278260" cy="1012924"/>
+          </a:xfrm>
+          <a:prstGeom prst="straightConnector1">
+            <a:avLst/>
+          </a:prstGeom>
+          <a:ln>
+            <a:solidFill>
+              <a:srgbClr val="0000FF"/>
+            </a:solidFill>
+            <a:tailEnd type="arrow"/>
+          </a:ln>
+        </p:spPr>
+        <p:style>
+          <a:lnRef idx="2">
+            <a:schemeClr val="accent1"/>
+          </a:lnRef>
+          <a:fillRef idx="0">
+            <a:schemeClr val="accent1"/>
+          </a:fillRef>
+          <a:effectRef idx="1">
+            <a:schemeClr val="accent1"/>
+          </a:effectRef>
+          <a:fontRef idx="minor">
+            <a:schemeClr val="tx1"/>
+          </a:fontRef>
+        </p:style>
+      </p:cxnSp>
+      <p:cxnSp>
+        <p:nvCxnSpPr>
+          <p:cNvPr id="13" name="Straight Arrow Connector 12"/>
+          <p:cNvCxnSpPr>
+            <a:stCxn id="6" idx="2"/>
+          </p:cNvCxnSpPr>
+          <p:nvPr/>
+        </p:nvCxnSpPr>
+        <p:spPr>
+          <a:xfrm>
+            <a:off x="6786364" y="2776116"/>
+            <a:ext cx="17884" cy="2021036"/>
+          </a:xfrm>
+          <a:prstGeom prst="straightConnector1">
+            <a:avLst/>
+          </a:prstGeom>
+          <a:ln>
+            <a:solidFill>
+              <a:srgbClr val="0000FF"/>
+            </a:solidFill>
+            <a:tailEnd type="arrow"/>
+          </a:ln>
+        </p:spPr>
+        <p:style>
+          <a:lnRef idx="2">
+            <a:schemeClr val="accent1"/>
+          </a:lnRef>
+          <a:fillRef idx="0">
+            <a:schemeClr val="accent1"/>
+          </a:fillRef>
+          <a:effectRef idx="1">
+            <a:schemeClr val="accent1"/>
+          </a:effectRef>
+          <a:fontRef idx="minor">
+            <a:schemeClr val="tx1"/>
+          </a:fontRef>
+        </p:style>
+      </p:cxnSp>
+      <p:cxnSp>
+        <p:nvCxnSpPr>
+          <p:cNvPr id="15" name="Straight Arrow Connector 14"/>
+          <p:cNvCxnSpPr/>
+          <p:nvPr/>
+        </p:nvCxnSpPr>
+        <p:spPr>
+          <a:xfrm flipH="1">
+            <a:off x="3059832" y="5373216"/>
+            <a:ext cx="576064" cy="288032"/>
+          </a:xfrm>
+          <a:prstGeom prst="straightConnector1">
+            <a:avLst/>
+          </a:prstGeom>
+          <a:ln>
+            <a:solidFill>
+              <a:srgbClr val="0000FF"/>
+            </a:solidFill>
+            <a:tailEnd type="arrow"/>
+          </a:ln>
+        </p:spPr>
+        <p:style>
+          <a:lnRef idx="2">
+            <a:schemeClr val="accent1"/>
+          </a:lnRef>
+          <a:fillRef idx="0">
+            <a:schemeClr val="accent1"/>
+          </a:fillRef>
+          <a:effectRef idx="1">
+            <a:schemeClr val="accent1"/>
+          </a:effectRef>
+          <a:fontRef idx="minor">
+            <a:schemeClr val="tx1"/>
+          </a:fontRef>
+        </p:style>
+      </p:cxnSp>
+      <p:sp>
+        <p:nvSpPr>
+          <p:cNvPr id="16" name="Rectangle 15"/>
+          <p:cNvSpPr/>
+          <p:nvPr/>
+        </p:nvSpPr>
+        <p:spPr>
+          <a:xfrm>
+            <a:off x="323528" y="3933056"/>
+            <a:ext cx="1008112" cy="144016"/>
+          </a:xfrm>
+          <a:prstGeom prst="rect">
+            <a:avLst/>
+          </a:prstGeom>
+          <a:solidFill>
+            <a:srgbClr val="3366FF"/>
+          </a:solidFill>
+          <a:ln>
+            <a:solidFill>
+              <a:srgbClr val="0000FF"/>
+            </a:solidFill>
+          </a:ln>
+        </p:spPr>
+        <p:style>
+          <a:lnRef idx="1">
+            <a:schemeClr val="accent1"/>
+          </a:lnRef>
+          <a:fillRef idx="3">
+            <a:schemeClr val="accent1"/>
+          </a:fillRef>
+          <a:effectRef idx="2">
+            <a:schemeClr val="accent1"/>
+          </a:effectRef>
+          <a:fontRef idx="minor">
+            <a:schemeClr val="lt1"/>
+          </a:fontRef>
+        </p:style>
+        <p:txBody>
+          <a:bodyPr rtlCol="0" anchor="ctr"/>
+          <a:lstStyle/>
+          <a:p>
+            <a:pPr algn="ctr"/>
+            <a:endParaRPr lang="pt-BR"/>
+          </a:p>
+        </p:txBody>
+      </p:sp>
+    </p:spTree>
+    <p:extLst>
+      <p:ext uri="{BB962C8B-B14F-4D97-AF65-F5344CB8AC3E}">
+        <p14:creationId xmlns:p14="http://schemas.microsoft.com/office/powerpoint/2010/main" val="2269425724"/>
+      </p:ext>
+    </p:extLst>
+  </p:cSld>
+  <p:clrMapOvr>
+    <a:masterClrMapping/>
+  </p:clrMapOvr>
+  <p:timing>
+    <p:tnLst>
+      <p:par>
+        <p:cTn xmlns:p14="http://schemas.microsoft.com/office/powerpoint/2010/main" id="1" dur="indefinite" restart="never" nodeType="tmRoot"/>
+      </p:par>
+    </p:tnLst>
+  </p:timing>
+</p:sld>
+</file>
+
+<file path=ppt/slides/slide17.xml><?xml version="1.0" encoding="utf-8"?>
+<p:sld xmlns:a="http://schemas.openxmlformats.org/drawingml/2006/main" xmlns:r="http://schemas.openxmlformats.org/officeDocument/2006/relationships" xmlns:p="http://schemas.openxmlformats.org/presentationml/2006/main">
+  <p:cSld>
+    <p:spTree>
+      <p:nvGrpSpPr>
+        <p:cNvPr id="1" name=""/>
+        <p:cNvGrpSpPr/>
+        <p:nvPr/>
+      </p:nvGrpSpPr>
+      <p:grpSpPr>
+        <a:xfrm>
+          <a:off x="0" y="0"/>
+          <a:ext cx="0" cy="0"/>
+          <a:chOff x="0" y="0"/>
+          <a:chExt cx="0" cy="0"/>
+        </a:xfrm>
+      </p:grpSpPr>
+      <p:sp>
+        <p:nvSpPr>
+          <p:cNvPr id="2" name="Título 1"/>
+          <p:cNvSpPr>
+            <a:spLocks noGrp="1"/>
+          </p:cNvSpPr>
+          <p:nvPr>
+            <p:ph type="ctrTitle"/>
+          </p:nvPr>
+        </p:nvSpPr>
+        <p:spPr>
+          <a:xfrm>
+            <a:off x="253752" y="44624"/>
+            <a:ext cx="7772400" cy="1470025"/>
+          </a:xfrm>
+        </p:spPr>
+        <p:txBody>
+          <a:bodyPr/>
+          <a:lstStyle/>
+          <a:p>
+            <a:r>
+              <a:rPr lang="pt-BR" sz="6000" dirty="0" smtClean="0"/>
+              <a:t>Resultados obtidos</a:t>
+            </a:r>
+            <a:endParaRPr lang="pt-BR" sz="6000" dirty="0"/>
+          </a:p>
+        </p:txBody>
+      </p:sp>
+      <p:sp>
+        <p:nvSpPr>
+          <p:cNvPr id="7" name="CaixaDeTexto 3"/>
+          <p:cNvSpPr txBox="1"/>
+          <p:nvPr/>
+        </p:nvSpPr>
+        <p:spPr>
+          <a:xfrm>
+            <a:off x="827584" y="2060848"/>
+            <a:ext cx="7632848" cy="1938992"/>
+          </a:xfrm>
+          <a:prstGeom prst="rect">
+            <a:avLst/>
+          </a:prstGeom>
+          <a:noFill/>
+        </p:spPr>
+        <p:txBody>
+          <a:bodyPr wrap="square" rtlCol="0">
+            <a:spAutoFit/>
+          </a:bodyPr>
+          <a:lstStyle/>
+          <a:p>
+            <a:pPr marL="285750" indent="-285750">
+              <a:buFontTx/>
+              <a:buChar char="-"/>
+            </a:pPr>
+            <a:r>
+              <a:rPr lang="pt-BR" sz="2000" dirty="0" smtClean="0"/>
+              <a:t>Alguns m</a:t>
+            </a:r>
+            <a:r>
+              <a:rPr lang="pt-BR" sz="2000" dirty="0" smtClean="0"/>
+              <a:t>étodos implementados:</a:t>
+            </a:r>
+          </a:p>
+          <a:p>
+            <a:pPr marL="742950" lvl="1" indent="-285750">
+              <a:buFontTx/>
+              <a:buChar char="-"/>
+            </a:pPr>
+            <a:r>
+              <a:rPr lang="pt-BR" sz="2000" dirty="0" smtClean="0"/>
+              <a:t>Ler: </a:t>
+            </a:r>
+            <a:r>
+              <a:rPr lang="pt-BR" sz="2000" dirty="0" err="1" smtClean="0"/>
+              <a:t>lerString</a:t>
+            </a:r>
+            <a:r>
+              <a:rPr lang="pt-BR" sz="2000" dirty="0" smtClean="0"/>
+              <a:t>() e </a:t>
+            </a:r>
+            <a:r>
+              <a:rPr lang="pt-BR" sz="2000" dirty="0" err="1" smtClean="0"/>
+              <a:t>ler.LerInteiro</a:t>
+            </a:r>
+            <a:r>
+              <a:rPr lang="pt-BR" sz="2000" dirty="0" smtClean="0"/>
+              <a:t>()</a:t>
+            </a:r>
+          </a:p>
+          <a:p>
+            <a:pPr marL="742950" lvl="1" indent="-285750">
+              <a:buFontTx/>
+              <a:buChar char="-"/>
+            </a:pPr>
+            <a:r>
+              <a:rPr lang="pt-BR" sz="2000" dirty="0" smtClean="0"/>
+              <a:t>Menus do cliente e de cada tipo de funcion</a:t>
+            </a:r>
+            <a:r>
+              <a:rPr lang="pt-BR" sz="2000" dirty="0" smtClean="0"/>
+              <a:t>ário;</a:t>
+            </a:r>
+          </a:p>
+          <a:p>
+            <a:pPr marL="742950" lvl="1" indent="-285750">
+              <a:buFontTx/>
+              <a:buChar char="-"/>
+            </a:pPr>
+            <a:r>
+              <a:rPr lang="pt-BR" sz="2000" dirty="0" smtClean="0"/>
+              <a:t>Entidades: cadastrar(</a:t>
+            </a:r>
+            <a:r>
+              <a:rPr lang="pt-BR" sz="2000" dirty="0" err="1" smtClean="0"/>
+              <a:t>String</a:t>
+            </a:r>
+            <a:r>
+              <a:rPr lang="pt-BR" sz="2000" dirty="0" smtClean="0"/>
+              <a:t> </a:t>
+            </a:r>
+            <a:r>
+              <a:rPr lang="pt-BR" sz="2000" dirty="0" err="1" smtClean="0"/>
+              <a:t>cpf</a:t>
+            </a:r>
+            <a:r>
+              <a:rPr lang="pt-BR" sz="2000" dirty="0" smtClean="0"/>
+              <a:t>);</a:t>
+            </a:r>
+          </a:p>
+          <a:p>
+            <a:pPr marL="742950" lvl="1" indent="-285750">
+              <a:buFontTx/>
+              <a:buChar char="-"/>
+            </a:pPr>
+            <a:r>
+              <a:rPr lang="pt-BR" sz="2000" dirty="0" err="1" smtClean="0"/>
+              <a:t>TesteCpf</a:t>
+            </a:r>
+            <a:r>
+              <a:rPr lang="pt-BR" sz="2000" dirty="0" smtClean="0"/>
+              <a:t>: </a:t>
+            </a:r>
+            <a:r>
+              <a:rPr lang="pt-BR" sz="2000" dirty="0" err="1" smtClean="0"/>
+              <a:t>validarCpf</a:t>
+            </a:r>
+            <a:r>
+              <a:rPr lang="pt-BR" sz="2000" dirty="0" smtClean="0"/>
+              <a:t>(</a:t>
+            </a:r>
+            <a:r>
+              <a:rPr lang="pt-BR" sz="2000" dirty="0" err="1" smtClean="0"/>
+              <a:t>String</a:t>
+            </a:r>
+            <a:r>
+              <a:rPr lang="pt-BR" sz="2000" dirty="0" smtClean="0"/>
+              <a:t> </a:t>
+            </a:r>
+            <a:r>
+              <a:rPr lang="pt-BR" sz="2000" dirty="0" err="1" smtClean="0"/>
+              <a:t>cpf</a:t>
+            </a:r>
+            <a:r>
+              <a:rPr lang="pt-BR" sz="2000" dirty="0" smtClean="0"/>
+              <a:t>);</a:t>
+            </a:r>
+          </a:p>
+          <a:p>
+            <a:pPr marL="742950" lvl="1" indent="-285750">
+              <a:buFontTx/>
+              <a:buChar char="-"/>
+            </a:pPr>
+            <a:r>
+              <a:rPr lang="pt-BR" sz="2000" dirty="0" smtClean="0"/>
+              <a:t>Pesquisa: pesquisar();</a:t>
+            </a:r>
+          </a:p>
+        </p:txBody>
+      </p:sp>
+    </p:spTree>
+    <p:extLst>
+      <p:ext uri="{BB962C8B-B14F-4D97-AF65-F5344CB8AC3E}">
+        <p14:creationId xmlns:p14="http://schemas.microsoft.com/office/powerpoint/2010/main" val="2700852580"/>
+      </p:ext>
+    </p:extLst>
+  </p:cSld>
+  <p:clrMapOvr>
+    <a:masterClrMapping/>
+  </p:clrMapOvr>
+  <p:timing>
+    <p:tnLst>
+      <p:par>
+        <p:cTn xmlns:p14="http://schemas.microsoft.com/office/powerpoint/2010/main" id="1" dur="indefinite" restart="never" nodeType="tmRoot"/>
+      </p:par>
+    </p:tnLst>
+  </p:timing>
+</p:sld>
+</file>
+
+<file path=ppt/slides/slide18.xml><?xml version="1.0" encoding="utf-8"?>
+<p:sld xmlns:a="http://schemas.openxmlformats.org/drawingml/2006/main" xmlns:r="http://schemas.openxmlformats.org/officeDocument/2006/relationships" xmlns:p="http://schemas.openxmlformats.org/presentationml/2006/main">
+  <p:cSld>
+    <p:spTree>
+      <p:nvGrpSpPr>
+        <p:cNvPr id="1" name=""/>
+        <p:cNvGrpSpPr/>
+        <p:nvPr/>
+      </p:nvGrpSpPr>
+      <p:grpSpPr>
+        <a:xfrm>
+          <a:off x="0" y="0"/>
+          <a:ext cx="0" cy="0"/>
+          <a:chOff x="0" y="0"/>
+          <a:chExt cx="0" cy="0"/>
+        </a:xfrm>
+      </p:grpSpPr>
+      <p:sp>
+        <p:nvSpPr>
+          <p:cNvPr id="2" name="Título 1"/>
+          <p:cNvSpPr>
+            <a:spLocks noGrp="1"/>
+          </p:cNvSpPr>
+          <p:nvPr>
+            <p:ph type="ctrTitle"/>
+          </p:nvPr>
+        </p:nvSpPr>
+        <p:spPr>
+          <a:xfrm>
+            <a:off x="253752" y="44624"/>
+            <a:ext cx="7772400" cy="1470025"/>
+          </a:xfrm>
+        </p:spPr>
+        <p:txBody>
+          <a:bodyPr/>
+          <a:lstStyle/>
+          <a:p>
+            <a:r>
+              <a:rPr lang="pt-BR" sz="6000" dirty="0" smtClean="0"/>
+              <a:t>Testes </a:t>
+            </a:r>
+            <a:r>
+              <a:rPr lang="pt-BR" sz="6000" dirty="0" err="1" smtClean="0"/>
+              <a:t>JUnit</a:t>
+            </a:r>
+            <a:endParaRPr lang="pt-BR" sz="6000" dirty="0"/>
+          </a:p>
+        </p:txBody>
+      </p:sp>
+      <p:pic>
+        <p:nvPicPr>
+          <p:cNvPr id="3" name="Picture 2" descr="Captura de Tela 2013-12-03 às 00.49.31.png"/>
+          <p:cNvPicPr>
+            <a:picLocks noChangeAspect="1"/>
+          </p:cNvPicPr>
+          <p:nvPr/>
+        </p:nvPicPr>
+        <p:blipFill>
+          <a:blip r:embed="rId2">
+            <a:extLst>
+              <a:ext uri="{28A0092B-C50C-407E-A947-70E740481C1C}">
+                <a14:useLocalDpi xmlns:a14="http://schemas.microsoft.com/office/drawing/2010/main" val="0"/>
+              </a:ext>
+            </a:extLst>
+          </a:blip>
+          <a:stretch>
+            <a:fillRect/>
+          </a:stretch>
+        </p:blipFill>
+        <p:spPr>
+          <a:xfrm>
+            <a:off x="6156176" y="-7355"/>
+            <a:ext cx="2808312" cy="3276364"/>
+          </a:xfrm>
+          <a:prstGeom prst="rect">
+            <a:avLst/>
+          </a:prstGeom>
+        </p:spPr>
+      </p:pic>
+      <p:pic>
+        <p:nvPicPr>
+          <p:cNvPr id="4" name="Picture 3" descr="Captura de Tela 2013-12-03 às 00.50.21.png"/>
+          <p:cNvPicPr>
+            <a:picLocks noChangeAspect="1"/>
+          </p:cNvPicPr>
+          <p:nvPr/>
+        </p:nvPicPr>
+        <p:blipFill>
+          <a:blip r:embed="rId3">
+            <a:extLst>
+              <a:ext uri="{28A0092B-C50C-407E-A947-70E740481C1C}">
+                <a14:useLocalDpi xmlns:a14="http://schemas.microsoft.com/office/drawing/2010/main" val="0"/>
+              </a:ext>
+            </a:extLst>
+          </a:blip>
+          <a:stretch>
+            <a:fillRect/>
+          </a:stretch>
+        </p:blipFill>
+        <p:spPr>
+          <a:xfrm>
+            <a:off x="17740" y="3544601"/>
+            <a:ext cx="9144000" cy="3278488"/>
+          </a:xfrm>
+          <a:prstGeom prst="rect">
+            <a:avLst/>
+          </a:prstGeom>
+        </p:spPr>
+      </p:pic>
+    </p:spTree>
+    <p:extLst>
+      <p:ext uri="{BB962C8B-B14F-4D97-AF65-F5344CB8AC3E}">
+        <p14:creationId xmlns:p14="http://schemas.microsoft.com/office/powerpoint/2010/main" val="2549466454"/>
+      </p:ext>
+    </p:extLst>
+  </p:cSld>
+  <p:clrMapOvr>
+    <a:masterClrMapping/>
+  </p:clrMapOvr>
+  <p:timing>
+    <p:tnLst>
+      <p:par>
+        <p:cTn xmlns:p14="http://schemas.microsoft.com/office/powerpoint/2010/main" id="1" dur="indefinite" restart="never" nodeType="tmRoot"/>
+      </p:par>
+    </p:tnLst>
+  </p:timing>
+</p:sld>
+</file>
+
+<file path=ppt/slides/slide19.xml><?xml version="1.0" encoding="utf-8"?>
+<p:sld xmlns:a="http://schemas.openxmlformats.org/drawingml/2006/main" xmlns:r="http://schemas.openxmlformats.org/officeDocument/2006/relationships" xmlns:p="http://schemas.openxmlformats.org/presentationml/2006/main">
+  <p:cSld>
+    <p:spTree>
+      <p:nvGrpSpPr>
+        <p:cNvPr id="1" name=""/>
+        <p:cNvGrpSpPr/>
+        <p:nvPr/>
+      </p:nvGrpSpPr>
+      <p:grpSpPr>
+        <a:xfrm>
+          <a:off x="0" y="0"/>
+          <a:ext cx="0" cy="0"/>
+          <a:chOff x="0" y="0"/>
+          <a:chExt cx="0" cy="0"/>
+        </a:xfrm>
+      </p:grpSpPr>
+      <p:sp>
+        <p:nvSpPr>
+          <p:cNvPr id="2" name="Título 1"/>
+          <p:cNvSpPr>
+            <a:spLocks noGrp="1"/>
+          </p:cNvSpPr>
+          <p:nvPr>
+            <p:ph type="ctrTitle"/>
+          </p:nvPr>
+        </p:nvSpPr>
+        <p:spPr>
+          <a:xfrm>
+            <a:off x="467544" y="404664"/>
+            <a:ext cx="7772400" cy="1470025"/>
+          </a:xfrm>
+        </p:spPr>
+        <p:txBody>
+          <a:bodyPr/>
+          <a:lstStyle/>
+          <a:p>
+            <a:r>
+              <a:rPr lang="pt-BR" sz="6000" dirty="0" smtClean="0"/>
+              <a:t>Objetivos Futuros</a:t>
+            </a:r>
+            <a:endParaRPr lang="pt-BR" sz="6000" dirty="0"/>
+          </a:p>
+        </p:txBody>
+      </p:sp>
+      <p:sp>
+        <p:nvSpPr>
+          <p:cNvPr id="4" name="CaixaDeTexto 3"/>
+          <p:cNvSpPr txBox="1"/>
+          <p:nvPr/>
+        </p:nvSpPr>
+        <p:spPr>
+          <a:xfrm>
+            <a:off x="1214414" y="3000372"/>
+            <a:ext cx="2357454" cy="2031325"/>
+          </a:xfrm>
+          <a:prstGeom prst="rect">
+            <a:avLst/>
+          </a:prstGeom>
+          <a:noFill/>
+        </p:spPr>
+        <p:txBody>
+          <a:bodyPr wrap="square" rtlCol="0">
+            <a:spAutoFit/>
+          </a:bodyPr>
+          <a:lstStyle/>
+          <a:p>
+            <a:pPr>
+              <a:buFont typeface="Arial" pitchFamily="34" charset="0"/>
+              <a:buChar char="•"/>
+            </a:pPr>
+            <a:r>
+              <a:rPr lang="pt-BR" dirty="0" smtClean="0"/>
+              <a:t>Melhorar Teste de unidade;</a:t>
+            </a:r>
+          </a:p>
+          <a:p>
+            <a:endParaRPr lang="pt-BR" dirty="0"/>
+          </a:p>
+          <a:p>
+            <a:pPr>
+              <a:buFont typeface="Arial" pitchFamily="34" charset="0"/>
+              <a:buChar char="•"/>
+            </a:pPr>
+            <a:r>
+              <a:rPr lang="pt-BR" dirty="0" smtClean="0"/>
+              <a:t>Utilizar um banco de Dados;</a:t>
+            </a:r>
+          </a:p>
+          <a:p>
+            <a:endParaRPr lang="pt-BR" dirty="0"/>
+          </a:p>
+          <a:p>
+            <a:endParaRPr lang="pt-BR" dirty="0"/>
+          </a:p>
+        </p:txBody>
+      </p:sp>
+      <p:sp>
+        <p:nvSpPr>
+          <p:cNvPr id="6" name="CaixaDeTexto 5"/>
+          <p:cNvSpPr txBox="1"/>
+          <p:nvPr/>
+        </p:nvSpPr>
+        <p:spPr>
+          <a:xfrm>
+            <a:off x="4714876" y="3000372"/>
+            <a:ext cx="3071834" cy="1477328"/>
+          </a:xfrm>
+          <a:prstGeom prst="rect">
+            <a:avLst/>
+          </a:prstGeom>
+          <a:noFill/>
+        </p:spPr>
+        <p:txBody>
+          <a:bodyPr wrap="square" rtlCol="0">
+            <a:spAutoFit/>
+          </a:bodyPr>
+          <a:lstStyle/>
+          <a:p>
+            <a:pPr>
+              <a:buFont typeface="Arial" pitchFamily="34" charset="0"/>
+              <a:buChar char="•"/>
+            </a:pPr>
+            <a:r>
+              <a:rPr lang="pt-BR" dirty="0" smtClean="0"/>
+              <a:t>Aprimorar relacionamentos entre as classes;</a:t>
+            </a:r>
+          </a:p>
+          <a:p>
+            <a:endParaRPr lang="pt-BR" dirty="0"/>
+          </a:p>
+          <a:p>
+            <a:pPr>
+              <a:buFont typeface="Arial" pitchFamily="34" charset="0"/>
+              <a:buChar char="•"/>
+            </a:pPr>
+            <a:r>
+              <a:rPr lang="pt-BR" dirty="0" smtClean="0"/>
+              <a:t>Melhorar interfaces(swing) para com o publico final.</a:t>
+            </a:r>
+            <a:endParaRPr lang="pt-BR" dirty="0"/>
+          </a:p>
+        </p:txBody>
+      </p:sp>
+    </p:spTree>
+  </p:cSld>
+  <p:clrMapOvr>
+    <a:masterClrMapping/>
+  </p:clrMapOvr>
+  <p:timing>
+    <p:tnLst>
+      <p:par>
+        <p:cTn xmlns:p14="http://schemas.microsoft.com/office/powerpoint/2010/main" id="1" dur="indefinite" restart="never" nodeType="tmRoot"/>
+      </p:par>
+    </p:tnLst>
+  </p:timing>
 </p:sld>
 </file>
 
@@ -6675,7 +8139,7 @@
         <p:spPr>
           <a:xfrm>
             <a:off x="1428728" y="3000372"/>
-            <a:ext cx="3071834" cy="3139321"/>
+            <a:ext cx="4655440" cy="3477875"/>
           </a:xfrm>
           <a:prstGeom prst="rect">
             <a:avLst/>
@@ -6689,60 +8153,60 @@
           <a:lstStyle/>
           <a:p>
             <a:r>
-              <a:rPr lang="pt-BR" dirty="0" smtClean="0"/>
+              <a:rPr lang="pt-BR" sz="2000" dirty="0" smtClean="0"/>
               <a:t>Introdu</a:t>
             </a:r>
             <a:r>
-              <a:rPr lang="pt-BR" dirty="0" smtClean="0"/>
+              <a:rPr lang="pt-BR" sz="2000" dirty="0" smtClean="0"/>
               <a:t>ção e Motivação;</a:t>
             </a:r>
           </a:p>
           <a:p>
-            <a:endParaRPr lang="pt-BR" dirty="0"/>
-          </a:p>
-          <a:p>
-            <a:r>
-              <a:rPr lang="pt-BR" dirty="0" smtClean="0"/>
+            <a:endParaRPr lang="pt-BR" sz="2000" dirty="0"/>
+          </a:p>
+          <a:p>
+            <a:r>
+              <a:rPr lang="pt-BR" sz="2000" dirty="0" smtClean="0"/>
               <a:t>Metodologia</a:t>
             </a:r>
             <a:r>
-              <a:rPr lang="pt-BR" dirty="0" smtClean="0"/>
+              <a:rPr lang="pt-BR" sz="2000" dirty="0" smtClean="0"/>
               <a:t>;</a:t>
             </a:r>
           </a:p>
           <a:p>
-            <a:endParaRPr lang="pt-BR" dirty="0" smtClean="0"/>
-          </a:p>
-          <a:p>
-            <a:r>
-              <a:rPr lang="pt-BR" dirty="0" smtClean="0"/>
+            <a:endParaRPr lang="pt-BR" sz="2000" dirty="0" smtClean="0"/>
+          </a:p>
+          <a:p>
+            <a:r>
+              <a:rPr lang="pt-BR" sz="2000" dirty="0" smtClean="0"/>
               <a:t>Cronograma;</a:t>
             </a:r>
           </a:p>
           <a:p>
-            <a:endParaRPr lang="pt-BR" dirty="0" smtClean="0"/>
-          </a:p>
-          <a:p>
-            <a:r>
-              <a:rPr lang="pt-BR" dirty="0" smtClean="0"/>
+            <a:endParaRPr lang="pt-BR" sz="2000" dirty="0" smtClean="0"/>
+          </a:p>
+          <a:p>
+            <a:r>
+              <a:rPr lang="pt-BR" sz="2000" dirty="0" smtClean="0"/>
               <a:t>Dificuldades enfrentadas;</a:t>
             </a:r>
           </a:p>
           <a:p>
-            <a:endParaRPr lang="pt-BR" dirty="0" smtClean="0"/>
-          </a:p>
-          <a:p>
-            <a:r>
-              <a:rPr lang="pt-BR" dirty="0" smtClean="0"/>
+            <a:endParaRPr lang="pt-BR" sz="2000" dirty="0" smtClean="0"/>
+          </a:p>
+          <a:p>
+            <a:r>
+              <a:rPr lang="pt-BR" sz="2000" dirty="0" smtClean="0"/>
               <a:t>Resultado Obtido;</a:t>
             </a:r>
           </a:p>
           <a:p>
-            <a:endParaRPr lang="pt-BR" dirty="0"/>
-          </a:p>
-          <a:p>
-            <a:r>
-              <a:rPr lang="pt-BR" dirty="0" smtClean="0"/>
+            <a:endParaRPr lang="pt-BR" sz="2000" dirty="0"/>
+          </a:p>
+          <a:p>
+            <a:r>
+              <a:rPr lang="pt-BR" sz="2000" dirty="0" smtClean="0"/>
               <a:t>Projeção Futura;</a:t>
             </a:r>
           </a:p>
@@ -6753,6 +8217,13 @@
   <p:clrMapOvr>
     <a:masterClrMapping/>
   </p:clrMapOvr>
+  <p:timing>
+    <p:tnLst>
+      <p:par>
+        <p:cTn xmlns:p14="http://schemas.microsoft.com/office/powerpoint/2010/main" id="1" dur="indefinite" restart="never" nodeType="tmRoot"/>
+      </p:par>
+    </p:tnLst>
+  </p:timing>
 </p:sld>
 </file>
 
@@ -6814,7 +8285,7 @@
         <p:spPr>
           <a:xfrm>
             <a:off x="395536" y="2348880"/>
-            <a:ext cx="7488832" cy="4247317"/>
+            <a:ext cx="8208912" cy="4647426"/>
           </a:xfrm>
           <a:prstGeom prst="rect">
             <a:avLst/>
@@ -6828,21 +8299,21 @@
           <a:lstStyle/>
           <a:p>
             <a:r>
-              <a:rPr lang="pt-BR" dirty="0" smtClean="0"/>
+              <a:rPr lang="pt-BR" sz="2000" dirty="0" smtClean="0"/>
               <a:t>- </a:t>
             </a:r>
             <a:r>
-              <a:rPr lang="pt-BR" dirty="0" smtClean="0"/>
+              <a:rPr lang="pt-BR" sz="2000" dirty="0" smtClean="0"/>
               <a:t>Modelar e implementar um sistema de compra (possivelmente online) de passagens a</a:t>
             </a:r>
             <a:r>
-              <a:rPr lang="pt-BR" dirty="0" smtClean="0"/>
+              <a:rPr lang="pt-BR" sz="2000" dirty="0" smtClean="0"/>
               <a:t>éreas de uma empresa fictícia.</a:t>
             </a:r>
-            <a:endParaRPr lang="pt-BR" dirty="0" smtClean="0"/>
-          </a:p>
-          <a:p>
-            <a:endParaRPr lang="pt-BR" dirty="0" smtClean="0"/>
+            <a:endParaRPr lang="pt-BR" sz="2000" dirty="0" smtClean="0"/>
+          </a:p>
+          <a:p>
+            <a:endParaRPr lang="pt-BR" sz="2000" dirty="0" smtClean="0"/>
           </a:p>
           <a:p>
             <a:pPr marL="285750" indent="-285750">
@@ -6850,10 +8321,10 @@
               <a:buChar char="-"/>
             </a:pPr>
             <a:r>
-              <a:rPr lang="pt-BR" dirty="0" smtClean="0"/>
+              <a:rPr lang="pt-BR" sz="2000" b="1" dirty="0" smtClean="0"/>
               <a:t>Requisitos (para o cliente):</a:t>
             </a:r>
-            <a:endParaRPr lang="pt-BR" dirty="0" smtClean="0"/>
+            <a:endParaRPr lang="pt-BR" sz="2000" b="1" dirty="0" smtClean="0"/>
           </a:p>
           <a:p>
             <a:pPr marL="742950" lvl="1" indent="-285750">
@@ -6861,15 +8332,15 @@
               <a:buChar char="-"/>
             </a:pPr>
             <a:r>
-              <a:rPr lang="pt-BR" dirty="0" smtClean="0"/>
+              <a:rPr lang="pt-BR" sz="2000" dirty="0" smtClean="0"/>
               <a:t>Permitir uma </a:t>
             </a:r>
             <a:r>
-              <a:rPr lang="pt-BR" dirty="0" smtClean="0"/>
+              <a:rPr lang="pt-BR" sz="2000" dirty="0" smtClean="0"/>
               <a:t>busca detalhada dos voos dispon</a:t>
             </a:r>
             <a:r>
-              <a:rPr lang="pt-BR" dirty="0" smtClean="0"/>
+              <a:rPr lang="pt-BR" sz="2000" dirty="0" smtClean="0"/>
               <a:t>íveis;</a:t>
             </a:r>
           </a:p>
@@ -6879,7 +8350,7 @@
               <a:buChar char="-"/>
             </a:pPr>
             <a:r>
-              <a:rPr lang="pt-BR" dirty="0" smtClean="0"/>
+              <a:rPr lang="pt-BR" sz="2000" dirty="0" smtClean="0"/>
               <a:t>O usuário pode escolher entre buscar somente voo de ida ou buscar o par de passagens de ida e volta;</a:t>
             </a:r>
           </a:p>
@@ -6889,7 +8360,7 @@
               <a:buChar char="-"/>
             </a:pPr>
             <a:r>
-              <a:rPr lang="pt-BR" dirty="0" smtClean="0"/>
+              <a:rPr lang="pt-BR" sz="2000" dirty="0" smtClean="0"/>
               <a:t>A busca é baseada nos aeroportos de origem e destino, nas datas de ida e de volta, e na quantidade de passageiros que comprarão passagens;</a:t>
             </a:r>
           </a:p>
@@ -6899,15 +8370,15 @@
               <a:buChar char="-"/>
             </a:pPr>
             <a:r>
-              <a:rPr lang="pt-BR" dirty="0" smtClean="0"/>
+              <a:rPr lang="pt-BR" sz="2000" dirty="0" smtClean="0"/>
               <a:t>Registrar novos clientes e permitir </a:t>
             </a:r>
             <a:r>
-              <a:rPr lang="pt-BR" dirty="0" err="1" smtClean="0"/>
+              <a:rPr lang="pt-BR" sz="2000" dirty="0" err="1" smtClean="0"/>
               <a:t>login</a:t>
             </a:r>
             <a:r>
-              <a:rPr lang="pt-BR" dirty="0" smtClean="0"/>
+              <a:rPr lang="pt-BR" sz="2000" dirty="0" smtClean="0"/>
               <a:t> de clientes cadastrados;</a:t>
             </a:r>
           </a:p>
@@ -6917,7 +8388,7 @@
               <a:buChar char="-"/>
             </a:pPr>
             <a:r>
-              <a:rPr lang="pt-BR" dirty="0" smtClean="0"/>
+              <a:rPr lang="pt-BR" sz="2000" dirty="0" smtClean="0"/>
               <a:t>Permitir a compra de passagens.</a:t>
             </a:r>
           </a:p>
@@ -6943,6 +8414,13 @@
   <p:clrMapOvr>
     <a:masterClrMapping/>
   </p:clrMapOvr>
+  <p:timing>
+    <p:tnLst>
+      <p:par>
+        <p:cTn xmlns:p14="http://schemas.microsoft.com/office/powerpoint/2010/main" id="1" dur="indefinite" restart="never" nodeType="tmRoot"/>
+      </p:par>
+    </p:tnLst>
+  </p:timing>
 </p:sld>
 </file>
 
@@ -7004,7 +8482,7 @@
         <p:spPr>
           <a:xfrm>
             <a:off x="395536" y="2348880"/>
-            <a:ext cx="7488832" cy="2308324"/>
+            <a:ext cx="7488832" cy="2800767"/>
           </a:xfrm>
           <a:prstGeom prst="rect">
             <a:avLst/>
@@ -7022,18 +8500,18 @@
               <a:buChar char="-"/>
             </a:pPr>
             <a:r>
-              <a:rPr lang="pt-BR" dirty="0" smtClean="0"/>
+              <a:rPr lang="pt-BR" sz="2000" b="1" dirty="0" smtClean="0"/>
               <a:t>Requisitos (para os funcion</a:t>
             </a:r>
             <a:r>
-              <a:rPr lang="pt-BR" dirty="0" smtClean="0"/>
+              <a:rPr lang="pt-BR" sz="2000" b="1" dirty="0" smtClean="0"/>
               <a:t>ários da empresa</a:t>
             </a:r>
             <a:r>
-              <a:rPr lang="pt-BR" dirty="0" smtClean="0"/>
+              <a:rPr lang="pt-BR" sz="2000" b="1" dirty="0" smtClean="0"/>
               <a:t>):</a:t>
             </a:r>
-            <a:endParaRPr lang="pt-BR" dirty="0" smtClean="0"/>
+            <a:endParaRPr lang="pt-BR" sz="2000" b="1" dirty="0" smtClean="0"/>
           </a:p>
           <a:p>
             <a:pPr marL="742950" lvl="1" indent="-285750">
@@ -7041,15 +8519,15 @@
               <a:buChar char="-"/>
             </a:pPr>
             <a:r>
-              <a:rPr lang="pt-BR" dirty="0" smtClean="0"/>
+              <a:rPr lang="pt-BR" sz="2000" dirty="0" smtClean="0"/>
               <a:t>Atendente: permitir </a:t>
             </a:r>
             <a:r>
-              <a:rPr lang="pt-BR" dirty="0" smtClean="0"/>
+              <a:rPr lang="pt-BR" sz="2000" dirty="0" smtClean="0"/>
               <a:t>a</a:t>
             </a:r>
             <a:r>
-              <a:rPr lang="pt-BR" dirty="0" smtClean="0"/>
+              <a:rPr lang="pt-BR" sz="2000" dirty="0" smtClean="0"/>
               <a:t>ções como realizar check-in, despachar bagagens, etc.</a:t>
             </a:r>
           </a:p>
@@ -7059,7 +8537,7 @@
               <a:buChar char="-"/>
             </a:pPr>
             <a:r>
-              <a:rPr lang="pt-BR" dirty="0" smtClean="0"/>
+              <a:rPr lang="pt-BR" sz="2000" dirty="0" smtClean="0"/>
               <a:t>Operador: permitir cadastrar voos no banco de dados;</a:t>
             </a:r>
           </a:p>
@@ -7069,7 +8547,7 @@
               <a:buChar char="-"/>
             </a:pPr>
             <a:r>
-              <a:rPr lang="pt-BR" dirty="0" smtClean="0"/>
+              <a:rPr lang="pt-BR" sz="2000" dirty="0" smtClean="0"/>
               <a:t>Administrador: permitir remover voos que foram cadastrados, remover passageiros, etc.</a:t>
             </a:r>
           </a:p>
@@ -7369,7 +8847,7 @@
         <p:spPr>
           <a:xfrm>
             <a:off x="395536" y="2348880"/>
-            <a:ext cx="3384376" cy="2031325"/>
+            <a:ext cx="3384376" cy="3231654"/>
           </a:xfrm>
           <a:prstGeom prst="rect">
             <a:avLst/>
@@ -7387,12 +8865,16 @@
               <a:buChar char="-"/>
             </a:pPr>
             <a:r>
-              <a:rPr lang="pt-BR" dirty="0" smtClean="0"/>
+              <a:rPr lang="pt-BR" sz="2400" b="1" dirty="0" smtClean="0"/>
               <a:t>Motiv</a:t>
             </a:r>
             <a:r>
-              <a:rPr lang="pt-BR" dirty="0" smtClean="0"/>
-              <a:t>ação: limitação nos recursos oferecidos por esses serviços, principalmente nos sites das empresas brasileiras.</a:t>
+              <a:rPr lang="pt-BR" sz="2400" b="1" dirty="0" smtClean="0"/>
+              <a:t>ação</a:t>
+            </a:r>
+            <a:r>
+              <a:rPr lang="pt-BR" sz="2400" dirty="0" smtClean="0"/>
+              <a:t>: limitação nos recursos oferecidos por esses serviços, principalmente nos sites das empresas brasileiras.</a:t>
             </a:r>
           </a:p>
           <a:p>
@@ -7528,7 +9010,7 @@
         <p:spPr>
           <a:xfrm>
             <a:off x="395536" y="2060848"/>
-            <a:ext cx="7488832" cy="3139321"/>
+            <a:ext cx="7488832" cy="3477875"/>
           </a:xfrm>
           <a:prstGeom prst="rect">
             <a:avLst/>
@@ -7542,12 +9024,12 @@
           <a:lstStyle/>
           <a:p>
             <a:r>
-              <a:rPr lang="pt-BR" dirty="0" smtClean="0"/>
+              <a:rPr lang="pt-BR" sz="2000" dirty="0" smtClean="0"/>
               <a:t>- Processo Evolutivo</a:t>
             </a:r>
           </a:p>
           <a:p>
-            <a:endParaRPr lang="pt-BR" dirty="0" smtClean="0"/>
+            <a:endParaRPr lang="pt-BR" sz="2000" dirty="0" smtClean="0"/>
           </a:p>
           <a:p>
             <a:pPr marL="285750" indent="-285750">
@@ -7555,14 +9037,14 @@
               <a:buChar char="-"/>
             </a:pPr>
             <a:r>
-              <a:rPr lang="pt-BR" dirty="0" smtClean="0"/>
+              <a:rPr lang="pt-BR" sz="2000" dirty="0" smtClean="0"/>
               <a:t>Ferramentas utilizadas</a:t>
             </a:r>
             <a:r>
-              <a:rPr lang="pt-BR" dirty="0"/>
+              <a:rPr lang="pt-BR" sz="2000" dirty="0"/>
               <a:t>:</a:t>
             </a:r>
-            <a:endParaRPr lang="pt-BR" dirty="0" smtClean="0"/>
+            <a:endParaRPr lang="pt-BR" sz="2000" dirty="0" smtClean="0"/>
           </a:p>
           <a:p>
             <a:pPr marL="742950" lvl="1" indent="-285750">
@@ -7570,10 +9052,10 @@
               <a:buChar char="-"/>
             </a:pPr>
             <a:r>
-              <a:rPr lang="pt-BR" dirty="0" smtClean="0"/>
+              <a:rPr lang="pt-BR" sz="2000" dirty="0" smtClean="0"/>
               <a:t>Eclipse (IDE).</a:t>
             </a:r>
-            <a:endParaRPr lang="pt-BR" dirty="0" smtClean="0"/>
+            <a:endParaRPr lang="pt-BR" sz="2000" dirty="0" smtClean="0"/>
           </a:p>
           <a:p>
             <a:pPr marL="742950" lvl="1" indent="-285750">
@@ -7581,19 +9063,19 @@
               <a:buChar char="-"/>
             </a:pPr>
             <a:r>
-              <a:rPr lang="pt-BR" dirty="0" err="1" smtClean="0"/>
+              <a:rPr lang="pt-BR" sz="2000" dirty="0" err="1" smtClean="0"/>
               <a:t>Github</a:t>
             </a:r>
             <a:r>
-              <a:rPr lang="pt-BR" dirty="0"/>
+              <a:rPr lang="pt-BR" sz="2000" dirty="0"/>
               <a:t> </a:t>
             </a:r>
             <a:r>
-              <a:rPr lang="pt-BR" dirty="0" smtClean="0"/>
+              <a:rPr lang="pt-BR" sz="2000" dirty="0" smtClean="0"/>
               <a:t> (Repositório remoto)</a:t>
             </a:r>
             <a:r>
-              <a:rPr lang="pt-BR" dirty="0" smtClean="0"/>
+              <a:rPr lang="pt-BR" sz="2000" dirty="0" smtClean="0"/>
               <a:t>.</a:t>
             </a:r>
           </a:p>
@@ -7603,18 +9085,18 @@
               <a:buChar char="-"/>
             </a:pPr>
             <a:r>
-              <a:rPr lang="pt-BR" dirty="0" err="1" smtClean="0"/>
+              <a:rPr lang="pt-BR" sz="2000" dirty="0" err="1" smtClean="0"/>
               <a:t>JUnit</a:t>
             </a:r>
             <a:r>
-              <a:rPr lang="pt-BR" dirty="0"/>
+              <a:rPr lang="pt-BR" sz="2000" dirty="0"/>
               <a:t> </a:t>
             </a:r>
             <a:r>
-              <a:rPr lang="pt-BR" dirty="0" smtClean="0"/>
+              <a:rPr lang="pt-BR" sz="2000" dirty="0" smtClean="0"/>
               <a:t>(Testes de unidade).</a:t>
             </a:r>
-            <a:endParaRPr lang="pt-BR" dirty="0" smtClean="0"/>
+            <a:endParaRPr lang="pt-BR" sz="2000" dirty="0" smtClean="0"/>
           </a:p>
           <a:p>
             <a:pPr marL="742950" lvl="1" indent="-285750">
@@ -7622,15 +9104,15 @@
               <a:buChar char="-"/>
             </a:pPr>
             <a:r>
-              <a:rPr lang="pt-BR" dirty="0" err="1" smtClean="0"/>
+              <a:rPr lang="pt-BR" sz="2000" dirty="0" err="1" smtClean="0"/>
               <a:t>Eclemma</a:t>
             </a:r>
             <a:r>
-              <a:rPr lang="pt-BR" dirty="0" smtClean="0"/>
+              <a:rPr lang="pt-BR" sz="2000" dirty="0" smtClean="0"/>
               <a:t> (Cobertura da parte de testes)</a:t>
             </a:r>
             <a:r>
-              <a:rPr lang="pt-BR" dirty="0" smtClean="0"/>
+              <a:rPr lang="pt-BR" sz="2000" dirty="0" smtClean="0"/>
               <a:t>.</a:t>
             </a:r>
           </a:p>
@@ -7640,19 +9122,19 @@
               <a:buChar char="-"/>
             </a:pPr>
             <a:r>
-              <a:rPr lang="pt-BR" dirty="0" err="1" smtClean="0"/>
+              <a:rPr lang="pt-BR" sz="2000" dirty="0" err="1" smtClean="0"/>
               <a:t>Astah</a:t>
             </a:r>
             <a:r>
-              <a:rPr lang="pt-BR" dirty="0" smtClean="0"/>
+              <a:rPr lang="pt-BR" sz="2000" dirty="0" smtClean="0"/>
               <a:t> </a:t>
             </a:r>
             <a:r>
-              <a:rPr lang="pt-BR" dirty="0" smtClean="0"/>
+              <a:rPr lang="pt-BR" sz="2000" dirty="0" smtClean="0"/>
               <a:t>(Ferramenta para a modelagem em UML)</a:t>
             </a:r>
             <a:r>
-              <a:rPr lang="pt-BR" dirty="0" smtClean="0"/>
+              <a:rPr lang="pt-BR" sz="2000" dirty="0" smtClean="0"/>
               <a:t>.</a:t>
             </a:r>
           </a:p>
@@ -7662,23 +9144,23 @@
               <a:buChar char="-"/>
             </a:pPr>
             <a:r>
-              <a:rPr lang="pt-BR" dirty="0" err="1" smtClean="0"/>
+              <a:rPr lang="pt-BR" sz="2000" dirty="0" err="1" smtClean="0"/>
               <a:t>WindowBuilder</a:t>
             </a:r>
             <a:r>
-              <a:rPr lang="pt-BR" dirty="0" smtClean="0"/>
+              <a:rPr lang="pt-BR" sz="2000" dirty="0" smtClean="0"/>
               <a:t> </a:t>
             </a:r>
             <a:r>
-              <a:rPr lang="pt-BR" dirty="0" smtClean="0"/>
+              <a:rPr lang="pt-BR" sz="2000" dirty="0" smtClean="0"/>
               <a:t>(Construir a interface gráfica).</a:t>
             </a:r>
           </a:p>
           <a:p>
-            <a:endParaRPr lang="pt-BR" dirty="0"/>
-          </a:p>
-          <a:p>
-            <a:endParaRPr lang="pt-BR" dirty="0"/>
+            <a:endParaRPr lang="pt-BR" sz="2000" dirty="0"/>
+          </a:p>
+          <a:p>
+            <a:endParaRPr lang="pt-BR" sz="2000" dirty="0"/>
           </a:p>
         </p:txBody>
       </p:sp>
@@ -8491,7 +9973,7 @@
         <p:spPr>
           <a:xfrm>
             <a:off x="827584" y="3140968"/>
-            <a:ext cx="7632848" cy="2677656"/>
+            <a:ext cx="7632848" cy="2246769"/>
           </a:xfrm>
           <a:prstGeom prst="rect">
             <a:avLst/>
@@ -8509,12 +9991,12 @@
               <a:buChar char="-"/>
             </a:pPr>
             <a:r>
-              <a:rPr lang="pt-BR" sz="2400" dirty="0" smtClean="0"/>
+              <a:rPr lang="pt-BR" sz="2000" dirty="0" smtClean="0"/>
               <a:t>Aplicação dos conceitos aprendidos na disciplina para o contexto do trabalho.</a:t>
             </a:r>
           </a:p>
           <a:p>
-            <a:endParaRPr lang="pt-BR" sz="2400" dirty="0" smtClean="0"/>
+            <a:endParaRPr lang="pt-BR" sz="2000" dirty="0" smtClean="0"/>
           </a:p>
           <a:p>
             <a:pPr marL="285750" indent="-285750">
@@ -8522,20 +10004,12 @@
               <a:buChar char="-"/>
             </a:pPr>
             <a:r>
-              <a:rPr lang="pt-BR" sz="2400" dirty="0" smtClean="0"/>
-              <a:t>Entendimento de como funciona um sistema para controle </a:t>
-            </a:r>
-            <a:r>
-              <a:rPr lang="pt-BR" sz="2400" smtClean="0"/>
-              <a:t>de voo e </a:t>
-            </a:r>
-            <a:r>
-              <a:rPr lang="pt-BR" sz="2400" dirty="0" smtClean="0"/>
-              <a:t>as nomenclaturas.</a:t>
-            </a:r>
-          </a:p>
-          <a:p>
-            <a:endParaRPr lang="pt-BR" sz="2400" dirty="0" smtClean="0"/>
+              <a:rPr lang="pt-BR" sz="2000" dirty="0" smtClean="0"/>
+              <a:t>Entendimento de como funciona um sistema para controle de voo e as nomenclaturas.</a:t>
+            </a:r>
+          </a:p>
+          <a:p>
+            <a:endParaRPr lang="pt-BR" sz="2000" dirty="0" smtClean="0"/>
           </a:p>
           <a:p>
             <a:pPr marL="285750" indent="-285750">
@@ -8543,10 +10017,10 @@
               <a:buChar char="-"/>
             </a:pPr>
             <a:r>
-              <a:rPr lang="pt-BR" sz="2400" dirty="0" smtClean="0"/>
+              <a:rPr lang="pt-BR" sz="2000" dirty="0" smtClean="0"/>
               <a:t>Outras...</a:t>
             </a:r>
-            <a:endParaRPr lang="pt-BR" sz="2400" dirty="0"/>
+            <a:endParaRPr lang="pt-BR" sz="2000" dirty="0"/>
           </a:p>
         </p:txBody>
       </p:sp>
@@ -8555,6 +10029,13 @@
   <p:clrMapOvr>
     <a:masterClrMapping/>
   </p:clrMapOvr>
+  <p:timing>
+    <p:tnLst>
+      <p:par>
+        <p:cTn xmlns:p14="http://schemas.microsoft.com/office/powerpoint/2010/main" id="1" dur="indefinite" restart="never" nodeType="tmRoot"/>
+      </p:par>
+    </p:tnLst>
+  </p:timing>
 </p:sld>
 </file>
 

</xml_diff>